<commit_message>
add homepage, and hide header on certain pages
</commit_message>
<xml_diff>
--- a/rapport.PPTX
+++ b/rapport.PPTX
@@ -5,10 +5,10 @@
     <p:sldMasterId id="2147483876" r:id="rId4"/>
   </p:sldMasterIdLst>
   <p:notesMasterIdLst>
-    <p:notesMasterId r:id="rId69"/>
+    <p:notesMasterId r:id="rId59"/>
   </p:notesMasterIdLst>
   <p:handoutMasterIdLst>
-    <p:handoutMasterId r:id="rId70"/>
+    <p:handoutMasterId r:id="rId60"/>
   </p:handoutMasterIdLst>
   <p:sldIdLst>
     <p:sldId id="256" r:id="rId5"/>
@@ -64,17 +64,7 @@
     <p:sldId id="366" r:id="rId55"/>
     <p:sldId id="316" r:id="rId56"/>
     <p:sldId id="347" r:id="rId57"/>
-    <p:sldId id="348" r:id="rId58"/>
-    <p:sldId id="371" r:id="rId59"/>
-    <p:sldId id="299" r:id="rId60"/>
-    <p:sldId id="374" r:id="rId61"/>
-    <p:sldId id="351" r:id="rId62"/>
-    <p:sldId id="324" r:id="rId63"/>
-    <p:sldId id="334" r:id="rId64"/>
-    <p:sldId id="349" r:id="rId65"/>
-    <p:sldId id="350" r:id="rId66"/>
-    <p:sldId id="322" r:id="rId67"/>
-    <p:sldId id="303" r:id="rId68"/>
+    <p:sldId id="303" r:id="rId58"/>
   </p:sldIdLst>
   <p:sldSz cx="12192000" cy="6858000"/>
   <p:notesSz cx="6858000" cy="9926638"/>
@@ -263,21 +253,10 @@
             <p14:sldId id="366"/>
             <p14:sldId id="316"/>
             <p14:sldId id="347"/>
-            <p14:sldId id="348"/>
-            <p14:sldId id="371"/>
-            <p14:sldId id="299"/>
           </p14:sldIdLst>
         </p14:section>
         <p14:section name="Tests" id="{2A1E5F8D-9C3F-44EA-B7C4-9D25DFEF77D5}">
-          <p14:sldIdLst>
-            <p14:sldId id="374"/>
-            <p14:sldId id="351"/>
-            <p14:sldId id="324"/>
-            <p14:sldId id="334"/>
-            <p14:sldId id="349"/>
-            <p14:sldId id="350"/>
-            <p14:sldId id="322"/>
-          </p14:sldIdLst>
+          <p14:sldIdLst/>
         </p14:section>
         <p14:section name="Conclusion" id="{07435913-793C-4D44-B94F-E25FF897E776}">
           <p14:sldIdLst>
@@ -410,7 +389,7 @@
           <a:p>
             <a:fld id="{8E9E7A7A-AB17-487C-9EC3-81C5DE33C772}" type="datetimeFigureOut">
               <a:rPr lang="fr-FR" smtClean="0"/>
-              <a:t>26/08/2021</a:t>
+              <a:t>30/08/2021</a:t>
             </a:fld>
             <a:endParaRPr lang="fr-FR"/>
           </a:p>
@@ -588,7 +567,7 @@
           <a:p>
             <a:fld id="{4A3D6330-6607-4266-91C5-92E4A45F29CC}" type="datetimeFigureOut">
               <a:rPr lang="fr-FR" smtClean="0"/>
-              <a:t>26/08/2021</a:t>
+              <a:t>30/08/2021</a:t>
             </a:fld>
             <a:endParaRPr lang="fr-FR"/>
           </a:p>
@@ -1826,7 +1805,7 @@
           <a:p>
             <a:fld id="{FF5FEE95-2E83-4D45-987C-F0DA7B5E64B4}" type="datetime1">
               <a:rPr lang="fr-FR" smtClean="0"/>
-              <a:t>26/08/2021</a:t>
+              <a:t>30/08/2021</a:t>
             </a:fld>
             <a:endParaRPr lang="fr-FR"/>
           </a:p>
@@ -2048,7 +2027,7 @@
           <a:p>
             <a:fld id="{FF5FEE95-2E83-4D45-987C-F0DA7B5E64B4}" type="datetime1">
               <a:rPr lang="fr-FR" smtClean="0"/>
-              <a:t>26/08/2021</a:t>
+              <a:t>30/08/2021</a:t>
             </a:fld>
             <a:endParaRPr lang="fr-FR"/>
           </a:p>
@@ -2229,7 +2208,7 @@
           <a:p>
             <a:fld id="{FF5FEE95-2E83-4D45-987C-F0DA7B5E64B4}" type="datetime1">
               <a:rPr lang="fr-FR" smtClean="0"/>
-              <a:t>26/08/2021</a:t>
+              <a:t>30/08/2021</a:t>
             </a:fld>
             <a:endParaRPr lang="fr-FR"/>
           </a:p>
@@ -2400,7 +2379,7 @@
           <a:p>
             <a:fld id="{FF5FEE95-2E83-4D45-987C-F0DA7B5E64B4}" type="datetime1">
               <a:rPr lang="fr-FR" smtClean="0"/>
-              <a:t>26/08/2021</a:t>
+              <a:t>30/08/2021</a:t>
             </a:fld>
             <a:endParaRPr lang="fr-FR"/>
           </a:p>
@@ -2652,7 +2631,7 @@
           <a:p>
             <a:fld id="{FF5FEE95-2E83-4D45-987C-F0DA7B5E64B4}" type="datetime1">
               <a:rPr lang="fr-FR" smtClean="0"/>
-              <a:t>26/08/2021</a:t>
+              <a:t>30/08/2021</a:t>
             </a:fld>
             <a:endParaRPr lang="fr-FR"/>
           </a:p>
@@ -2976,7 +2955,7 @@
           <a:p>
             <a:fld id="{FF5FEE95-2E83-4D45-987C-F0DA7B5E64B4}" type="datetime1">
               <a:rPr lang="fr-FR" smtClean="0"/>
-              <a:t>26/08/2021</a:t>
+              <a:t>30/08/2021</a:t>
             </a:fld>
             <a:endParaRPr lang="fr-FR"/>
           </a:p>
@@ -3401,7 +3380,7 @@
           <a:p>
             <a:fld id="{FF5FEE95-2E83-4D45-987C-F0DA7B5E64B4}" type="datetime1">
               <a:rPr lang="fr-FR" smtClean="0"/>
-              <a:t>26/08/2021</a:t>
+              <a:t>30/08/2021</a:t>
             </a:fld>
             <a:endParaRPr lang="fr-FR"/>
           </a:p>
@@ -3520,7 +3499,7 @@
           <a:p>
             <a:fld id="{FF5FEE95-2E83-4D45-987C-F0DA7B5E64B4}" type="datetime1">
               <a:rPr lang="fr-FR" smtClean="0"/>
-              <a:t>26/08/2021</a:t>
+              <a:t>30/08/2021</a:t>
             </a:fld>
             <a:endParaRPr lang="fr-FR"/>
           </a:p>
@@ -3616,7 +3595,7 @@
           <a:p>
             <a:fld id="{FF5FEE95-2E83-4D45-987C-F0DA7B5E64B4}" type="datetime1">
               <a:rPr lang="fr-FR" smtClean="0"/>
-              <a:t>26/08/2021</a:t>
+              <a:t>30/08/2021</a:t>
             </a:fld>
             <a:endParaRPr lang="fr-FR"/>
           </a:p>
@@ -3907,7 +3886,7 @@
           <a:p>
             <a:fld id="{FF5FEE95-2E83-4D45-987C-F0DA7B5E64B4}" type="datetime1">
               <a:rPr lang="fr-FR" smtClean="0"/>
-              <a:t>26/08/2021</a:t>
+              <a:t>30/08/2021</a:t>
             </a:fld>
             <a:endParaRPr lang="fr-FR"/>
           </a:p>
@@ -4180,7 +4159,7 @@
           <a:p>
             <a:fld id="{FF5FEE95-2E83-4D45-987C-F0DA7B5E64B4}" type="datetime1">
               <a:rPr lang="fr-FR" smtClean="0"/>
-              <a:t>26/08/2021</a:t>
+              <a:t>30/08/2021</a:t>
             </a:fld>
             <a:endParaRPr lang="fr-FR"/>
           </a:p>
@@ -4435,7 +4414,7 @@
           <a:p>
             <a:fld id="{FF5FEE95-2E83-4D45-987C-F0DA7B5E64B4}" type="datetime1">
               <a:rPr lang="fr-FR" smtClean="0"/>
-              <a:t>26/08/2021</a:t>
+              <a:t>30/08/2021</a:t>
             </a:fld>
             <a:endParaRPr lang="fr-FR"/>
           </a:p>
@@ -9539,11 +9518,7 @@
             </a:r>
             <a:r>
               <a:rPr lang="fr-FR" sz="1600" dirty="0" smtClean="0"/>
-              <a:t>……………………………....................... </a:t>
-            </a:r>
-            <a:r>
-              <a:rPr lang="fr-FR" sz="1600" dirty="0" smtClean="0"/>
-              <a:t>.p</a:t>
+              <a:t>……………………………....................... .p</a:t>
             </a:r>
             <a:r>
               <a:rPr lang="fr-FR" sz="1600" dirty="0"/>
@@ -9650,11 +9625,7 @@
             </a:r>
             <a:r>
               <a:rPr lang="fr-FR" sz="1600" dirty="0" smtClean="0"/>
-              <a:t>…………………………….. </a:t>
-            </a:r>
-            <a:r>
-              <a:rPr lang="fr-FR" sz="1600" dirty="0" smtClean="0"/>
-              <a:t>……p</a:t>
+              <a:t>…………………………….. ……p</a:t>
             </a:r>
             <a:r>
               <a:rPr lang="fr-FR" sz="1600" dirty="0"/>
@@ -9724,13 +9695,8 @@
             </a:r>
             <a:r>
               <a:rPr lang="fr-FR" sz="1600" dirty="0"/>
-              <a:t>. </a:t>
-            </a:r>
-            <a:r>
-              <a:rPr lang="fr-FR" sz="1600" dirty="0"/>
-              <a:t>8</a:t>
-            </a:r>
-            <a:endParaRPr lang="fr-FR" sz="1600" dirty="0"/>
+              <a:t>. 8</a:t>
+            </a:r>
           </a:p>
           <a:p>
             <a:pPr lvl="2">
@@ -9755,13 +9721,8 @@
             </a:r>
             <a:r>
               <a:rPr lang="fr-FR" sz="1600" dirty="0"/>
-              <a:t>. </a:t>
-            </a:r>
-            <a:r>
-              <a:rPr lang="fr-FR" sz="1600" dirty="0"/>
-              <a:t>9</a:t>
-            </a:r>
-            <a:endParaRPr lang="fr-FR" sz="1600" dirty="0"/>
+              <a:t>. 9</a:t>
+            </a:r>
           </a:p>
           <a:p>
             <a:pPr marL="560070" indent="-514350">
@@ -15985,7 +15946,7 @@
           <p:cNvPr id="2" name="Title 1">
             <a:extLst>
               <a:ext uri="{FF2B5EF4-FFF2-40B4-BE49-F238E27FC236}">
-                <a16:creationId xmlns:a16="http://schemas.microsoft.com/office/drawing/2014/main" id="{97B62DDF-7CA4-46D5-AE64-B8D8A05397CE}"/>
+                <a16:creationId xmlns:a16="http://schemas.microsoft.com/office/drawing/2014/main" id="{2D9BE37F-9AF0-44C0-886D-14D92A5E9052}"/>
               </a:ext>
             </a:extLst>
           </p:cNvPr>
@@ -15998,8 +15959,8 @@
         </p:nvSpPr>
         <p:spPr>
           <a:xfrm>
-            <a:off x="978195" y="1830933"/>
-            <a:ext cx="4162425" cy="1493520"/>
+            <a:off x="1143000" y="609600"/>
+            <a:ext cx="9875520" cy="704850"/>
           </a:xfrm>
         </p:spPr>
         <p:txBody>
@@ -16007,59 +15968,104 @@
           <a:lstStyle/>
           <a:p>
             <a:r>
-              <a:rPr lang="fr-FR" sz="3200" dirty="0"/>
-              <a:t>Synchronisation de l’application et du scheduler</a:t>
-            </a:r>
-          </a:p>
-        </p:txBody>
-      </p:sp>
-      <p:sp>
-        <p:nvSpPr>
-          <p:cNvPr id="4" name="Text Placeholder 3">
-            <a:extLst>
-              <a:ext uri="{FF2B5EF4-FFF2-40B4-BE49-F238E27FC236}">
-                <a16:creationId xmlns:a16="http://schemas.microsoft.com/office/drawing/2014/main" id="{5CD49CDB-3727-4612-A07D-9B2337EE07E8}"/>
-              </a:ext>
-            </a:extLst>
-          </p:cNvPr>
-          <p:cNvSpPr>
-            <a:spLocks noGrp="1"/>
-          </p:cNvSpPr>
-          <p:nvPr>
-            <p:ph type="body" sz="half" idx="2"/>
-          </p:nvPr>
-        </p:nvSpPr>
-        <p:spPr>
-          <a:xfrm>
-            <a:off x="1032699" y="3568293"/>
-            <a:ext cx="4162425" cy="1322684"/>
-          </a:xfrm>
-        </p:spPr>
-        <p:txBody>
-          <a:bodyPr/>
-          <a:lstStyle/>
-          <a:p>
-            <a:pPr algn="just"/>
-            <a:r>
               <a:rPr lang="fr-FR" dirty="0"/>
-              <a:t>app_plus_scheduler.py</a:t>
-            </a:r>
-          </a:p>
-          <a:p>
-            <a:pPr algn="just"/>
+              <a:t>Conclusion</a:t>
+            </a:r>
+          </a:p>
+        </p:txBody>
+      </p:sp>
+      <p:sp>
+        <p:nvSpPr>
+          <p:cNvPr id="3" name="Content Placeholder 2">
+            <a:extLst>
+              <a:ext uri="{FF2B5EF4-FFF2-40B4-BE49-F238E27FC236}">
+                <a16:creationId xmlns:a16="http://schemas.microsoft.com/office/drawing/2014/main" id="{CE097B3D-BE10-49DA-8991-C23783BC9299}"/>
+              </a:ext>
+            </a:extLst>
+          </p:cNvPr>
+          <p:cNvSpPr>
+            <a:spLocks noGrp="1"/>
+          </p:cNvSpPr>
+          <p:nvPr>
+            <p:ph idx="1"/>
+          </p:nvPr>
+        </p:nvSpPr>
+        <p:spPr>
+          <a:xfrm>
+            <a:off x="1143000" y="1457325"/>
+            <a:ext cx="9872871" cy="4638675"/>
+          </a:xfrm>
+        </p:spPr>
+        <p:txBody>
+          <a:bodyPr>
+            <a:normAutofit/>
+          </a:bodyPr>
+          <a:lstStyle/>
+          <a:p>
+            <a:pPr marL="45720" indent="0" algn="just">
+              <a:buNone/>
+            </a:pPr>
             <a:r>
               <a:rPr lang="fr-FR" dirty="0"/>
-              <a:t>Le module pour lancer en parallèle l’application Flask et la tâche de fonds périodique.</a:t>
-            </a:r>
-          </a:p>
-        </p:txBody>
-      </p:sp>
-      <p:sp>
-        <p:nvSpPr>
-          <p:cNvPr id="5" name="Slide Number Placeholder 4">
-            <a:extLst>
-              <a:ext uri="{FF2B5EF4-FFF2-40B4-BE49-F238E27FC236}">
-                <a16:creationId xmlns:a16="http://schemas.microsoft.com/office/drawing/2014/main" id="{864EDB35-B72A-4F18-A86B-3D64DD6E0008}"/>
+              <a:t>L’application web est en ligne avec la partie principale du backend en fonction (historisation et recherche), tout en ayant rempli un certains nombres de tests et de critères concernant le code.</a:t>
+            </a:r>
+          </a:p>
+          <a:p>
+            <a:pPr marL="45720" indent="0">
+              <a:buNone/>
+            </a:pPr>
+            <a:r>
+              <a:rPr lang="fr-FR" dirty="0"/>
+              <a:t>Vu la durée du stage (2 mois) et le temps nécessaire pour me former reste à faire :</a:t>
+            </a:r>
+          </a:p>
+          <a:p>
+            <a:pPr>
+              <a:buFont typeface="Wingdings" panose="05000000000000000000" pitchFamily="2" charset="2"/>
+              <a:buChar char="§"/>
+            </a:pPr>
+            <a:r>
+              <a:rPr lang="fr-FR" dirty="0"/>
+              <a:t>Compléter le Backend.</a:t>
+            </a:r>
+          </a:p>
+          <a:p>
+            <a:pPr>
+              <a:buFont typeface="Wingdings" panose="05000000000000000000" pitchFamily="2" charset="2"/>
+              <a:buChar char="§"/>
+            </a:pPr>
+            <a:r>
+              <a:rPr lang="fr-FR" dirty="0"/>
+              <a:t>Le Frontend : L’</a:t>
+            </a:r>
+            <a:r>
+              <a:rPr lang="fr-FR" dirty="0" err="1"/>
+              <a:t>authentication</a:t>
+            </a:r>
+            <a:r>
+              <a:rPr lang="fr-FR" dirty="0"/>
+              <a:t>.</a:t>
+            </a:r>
+          </a:p>
+          <a:p>
+            <a:pPr>
+              <a:buFont typeface="Wingdings" panose="05000000000000000000" pitchFamily="2" charset="2"/>
+              <a:buChar char="§"/>
+            </a:pPr>
+            <a:r>
+              <a:rPr lang="fr-FR" dirty="0"/>
+              <a:t>Mettre en place une base de données SAP Hana.</a:t>
+            </a:r>
+            <a:endParaRPr lang="fr-FR" b="1" dirty="0"/>
+          </a:p>
+        </p:txBody>
+      </p:sp>
+      <p:sp>
+        <p:nvSpPr>
+          <p:cNvPr id="4" name="Slide Number Placeholder 3">
+            <a:extLst>
+              <a:ext uri="{FF2B5EF4-FFF2-40B4-BE49-F238E27FC236}">
+                <a16:creationId xmlns:a16="http://schemas.microsoft.com/office/drawing/2014/main" id="{E2D53EDA-94B6-4BC2-9CF2-C2CE6F0E0F88}"/>
               </a:ext>
             </a:extLst>
           </p:cNvPr>
@@ -16083,846 +16089,10 @@
           </a:p>
         </p:txBody>
       </p:sp>
-      <p:pic>
-        <p:nvPicPr>
-          <p:cNvPr id="6" name="Picture 5">
-            <a:extLst>
-              <a:ext uri="{FF2B5EF4-FFF2-40B4-BE49-F238E27FC236}">
-                <a16:creationId xmlns:a16="http://schemas.microsoft.com/office/drawing/2014/main" id="{2202B604-C550-4736-862A-5215E5085C2C}"/>
-              </a:ext>
-            </a:extLst>
-          </p:cNvPr>
-          <p:cNvPicPr>
-            <a:picLocks noChangeAspect="1"/>
-          </p:cNvPicPr>
-          <p:nvPr/>
-        </p:nvPicPr>
-        <p:blipFill>
-          <a:blip r:embed="rId2"/>
-          <a:stretch>
-            <a:fillRect/>
-          </a:stretch>
-        </p:blipFill>
-        <p:spPr>
-          <a:xfrm>
-            <a:off x="6112243" y="1098330"/>
-            <a:ext cx="4528074" cy="4320000"/>
-          </a:xfrm>
-          <a:prstGeom prst="rect">
-            <a:avLst/>
-          </a:prstGeom>
-        </p:spPr>
-      </p:pic>
     </p:spTree>
     <p:extLst>
       <p:ext uri="{BB962C8B-B14F-4D97-AF65-F5344CB8AC3E}">
-        <p14:creationId xmlns:p14="http://schemas.microsoft.com/office/powerpoint/2010/main" val="2696249159"/>
-      </p:ext>
-    </p:extLst>
-  </p:cSld>
-  <p:clrMapOvr>
-    <a:masterClrMapping/>
-  </p:clrMapOvr>
-</p:sld>
-</file>
-
-<file path=ppt/slides/slide55.xml><?xml version="1.0" encoding="utf-8"?>
-<p:sld xmlns:a="http://schemas.openxmlformats.org/drawingml/2006/main" xmlns:r="http://schemas.openxmlformats.org/officeDocument/2006/relationships" xmlns:p="http://schemas.openxmlformats.org/presentationml/2006/main">
-  <p:cSld>
-    <p:spTree>
-      <p:nvGrpSpPr>
-        <p:cNvPr id="1" name=""/>
-        <p:cNvGrpSpPr/>
-        <p:nvPr/>
-      </p:nvGrpSpPr>
-      <p:grpSpPr>
-        <a:xfrm>
-          <a:off x="0" y="0"/>
-          <a:ext cx="0" cy="0"/>
-          <a:chOff x="0" y="0"/>
-          <a:chExt cx="0" cy="0"/>
-        </a:xfrm>
-      </p:grpSpPr>
-      <p:sp>
-        <p:nvSpPr>
-          <p:cNvPr id="6" name="Title 5">
-            <a:extLst>
-              <a:ext uri="{FF2B5EF4-FFF2-40B4-BE49-F238E27FC236}">
-                <a16:creationId xmlns:a16="http://schemas.microsoft.com/office/drawing/2014/main" id="{61FEAC0E-BBE6-415B-BA7B-CB03AEDEAC99}"/>
-              </a:ext>
-            </a:extLst>
-          </p:cNvPr>
-          <p:cNvSpPr>
-            <a:spLocks noGrp="1"/>
-          </p:cNvSpPr>
-          <p:nvPr>
-            <p:ph type="title"/>
-          </p:nvPr>
-        </p:nvSpPr>
-        <p:spPr>
-          <a:xfrm>
-            <a:off x="1143000" y="609600"/>
-            <a:ext cx="9875520" cy="528084"/>
-          </a:xfrm>
-        </p:spPr>
-        <p:txBody>
-          <a:bodyPr>
-            <a:noAutofit/>
-          </a:bodyPr>
-          <a:lstStyle/>
-          <a:p>
-            <a:r>
-              <a:rPr lang="fr-FR" sz="4000" dirty="0"/>
-              <a:t>Déploiement dans Cloud Foundry (SQLite)</a:t>
-            </a:r>
-          </a:p>
-        </p:txBody>
-      </p:sp>
-      <p:pic>
-        <p:nvPicPr>
-          <p:cNvPr id="13" name="Content Placeholder 5">
-            <a:extLst>
-              <a:ext uri="{FF2B5EF4-FFF2-40B4-BE49-F238E27FC236}">
-                <a16:creationId xmlns:a16="http://schemas.microsoft.com/office/drawing/2014/main" id="{1123C289-499B-440C-90E8-674724899FF8}"/>
-              </a:ext>
-            </a:extLst>
-          </p:cNvPr>
-          <p:cNvPicPr>
-            <a:picLocks noGrp="1" noChangeAspect="1"/>
-          </p:cNvPicPr>
-          <p:nvPr>
-            <p:ph idx="1"/>
-          </p:nvPr>
-        </p:nvPicPr>
-        <p:blipFill>
-          <a:blip r:embed="rId2"/>
-          <a:stretch>
-            <a:fillRect/>
-          </a:stretch>
-        </p:blipFill>
-        <p:spPr>
-          <a:xfrm>
-            <a:off x="1251005" y="2674388"/>
-            <a:ext cx="9376180" cy="3600000"/>
-          </a:xfrm>
-        </p:spPr>
-      </p:pic>
-      <p:sp>
-        <p:nvSpPr>
-          <p:cNvPr id="5" name="Slide Number Placeholder 4">
-            <a:extLst>
-              <a:ext uri="{FF2B5EF4-FFF2-40B4-BE49-F238E27FC236}">
-                <a16:creationId xmlns:a16="http://schemas.microsoft.com/office/drawing/2014/main" id="{BEE976FF-B0EA-4DB3-BA52-DE6BFE635041}"/>
-              </a:ext>
-            </a:extLst>
-          </p:cNvPr>
-          <p:cNvSpPr>
-            <a:spLocks noGrp="1"/>
-          </p:cNvSpPr>
-          <p:nvPr>
-            <p:ph type="sldNum" sz="quarter" idx="12"/>
-          </p:nvPr>
-        </p:nvSpPr>
-        <p:spPr/>
-        <p:txBody>
-          <a:bodyPr/>
-          <a:lstStyle/>
-          <a:p>
-            <a:fld id="{C52ED629-2BC0-4D25-969E-9ED78B40D7C7}" type="slidenum">
-              <a:rPr lang="fr-FR" smtClean="0"/>
-              <a:t>55</a:t>
-            </a:fld>
-            <a:endParaRPr lang="fr-FR"/>
-          </a:p>
-        </p:txBody>
-      </p:sp>
-      <p:sp>
-        <p:nvSpPr>
-          <p:cNvPr id="8" name="Title 1">
-            <a:extLst>
-              <a:ext uri="{FF2B5EF4-FFF2-40B4-BE49-F238E27FC236}">
-                <a16:creationId xmlns:a16="http://schemas.microsoft.com/office/drawing/2014/main" id="{817CA980-874D-4572-8929-C3EF8BF8B734}"/>
-              </a:ext>
-            </a:extLst>
-          </p:cNvPr>
-          <p:cNvSpPr txBox="1">
-            <a:spLocks/>
-          </p:cNvSpPr>
-          <p:nvPr/>
-        </p:nvSpPr>
-        <p:spPr>
-          <a:xfrm>
-            <a:off x="1143000" y="1300719"/>
-            <a:ext cx="9875520" cy="628184"/>
-          </a:xfrm>
-          <a:prstGeom prst="rect">
-            <a:avLst/>
-          </a:prstGeom>
-        </p:spPr>
-        <p:txBody>
-          <a:bodyPr vert="horz" lIns="91440" tIns="45720" rIns="91440" bIns="45720" rtlCol="0" anchor="ctr">
-            <a:noAutofit/>
-          </a:bodyPr>
-          <a:lstStyle>
-            <a:lvl1pPr algn="l" defTabSz="914400" rtl="0" eaLnBrk="1" latinLnBrk="0" hangingPunct="1">
-              <a:lnSpc>
-                <a:spcPct val="90000"/>
-              </a:lnSpc>
-              <a:spcBef>
-                <a:spcPct val="0"/>
-              </a:spcBef>
-              <a:buNone/>
-              <a:defRPr sz="4400" kern="1200">
-                <a:solidFill>
-                  <a:schemeClr val="accent1"/>
-                </a:solidFill>
-                <a:latin typeface="+mj-lt"/>
-                <a:ea typeface="+mj-ea"/>
-                <a:cs typeface="+mj-cs"/>
-              </a:defRPr>
-            </a:lvl1pPr>
-          </a:lstStyle>
-          <a:p>
-            <a:r>
-              <a:rPr lang="fr-FR" sz="1700" dirty="0"/>
-              <a:t>Les commandes pour le déploiement de l’application  :</a:t>
-            </a:r>
-            <a:br>
-              <a:rPr lang="fr-FR" sz="1700" dirty="0"/>
-            </a:br>
-            <a:r>
-              <a:rPr lang="fr-FR" sz="1700" dirty="0"/>
-              <a:t>$ </a:t>
-            </a:r>
-            <a:r>
-              <a:rPr lang="fr-FR" sz="1700" dirty="0" err="1"/>
-              <a:t>py</a:t>
-            </a:r>
-            <a:r>
-              <a:rPr lang="fr-FR" sz="1700" dirty="0"/>
-              <a:t> -m </a:t>
-            </a:r>
-            <a:r>
-              <a:rPr lang="fr-FR" sz="1700" dirty="0" err="1"/>
-              <a:t>pip</a:t>
-            </a:r>
-            <a:r>
-              <a:rPr lang="fr-FR" sz="1700" dirty="0"/>
-              <a:t> </a:t>
-            </a:r>
-            <a:r>
-              <a:rPr lang="fr-FR" sz="1700" dirty="0" err="1"/>
-              <a:t>install</a:t>
-            </a:r>
-            <a:r>
-              <a:rPr lang="fr-FR" sz="1700" dirty="0"/>
-              <a:t> --</a:t>
-            </a:r>
-            <a:r>
-              <a:rPr lang="fr-FR" sz="1700" dirty="0" err="1"/>
-              <a:t>requirement</a:t>
-            </a:r>
-            <a:r>
-              <a:rPr lang="fr-FR" sz="1700" dirty="0"/>
-              <a:t> requirements.txt</a:t>
-            </a:r>
-            <a:br>
-              <a:rPr lang="fr-FR" sz="1700" dirty="0"/>
-            </a:br>
-            <a:r>
-              <a:rPr lang="fr-FR" sz="1700" dirty="0"/>
-              <a:t>$ </a:t>
-            </a:r>
-            <a:r>
-              <a:rPr lang="fr-FR" sz="1700" dirty="0" err="1"/>
-              <a:t>cf</a:t>
-            </a:r>
-            <a:r>
-              <a:rPr lang="fr-FR" sz="1700" dirty="0"/>
-              <a:t> push -f </a:t>
-            </a:r>
-            <a:r>
-              <a:rPr lang="fr-FR" sz="1700" dirty="0" err="1"/>
-              <a:t>manifest.yml</a:t>
-            </a:r>
-            <a:endParaRPr lang="fr-FR" sz="1700" dirty="0"/>
-          </a:p>
-        </p:txBody>
-      </p:sp>
-      <p:sp>
-        <p:nvSpPr>
-          <p:cNvPr id="12" name="TextBox 11">
-            <a:extLst>
-              <a:ext uri="{FF2B5EF4-FFF2-40B4-BE49-F238E27FC236}">
-                <a16:creationId xmlns:a16="http://schemas.microsoft.com/office/drawing/2014/main" id="{5C7510E7-A8F6-43D5-9DF5-44781AD39F25}"/>
-              </a:ext>
-            </a:extLst>
-          </p:cNvPr>
-          <p:cNvSpPr txBox="1"/>
-          <p:nvPr/>
-        </p:nvSpPr>
-        <p:spPr>
-          <a:xfrm>
-            <a:off x="1187206" y="2243467"/>
-            <a:ext cx="9484185" cy="353943"/>
-          </a:xfrm>
-          <a:prstGeom prst="rect">
-            <a:avLst/>
-          </a:prstGeom>
-          <a:noFill/>
-        </p:spPr>
-        <p:txBody>
-          <a:bodyPr wrap="square" rtlCol="0">
-            <a:spAutoFit/>
-          </a:bodyPr>
-          <a:lstStyle/>
-          <a:p>
-            <a:r>
-              <a:rPr lang="fr-FR" sz="1700" dirty="0">
-                <a:solidFill>
-                  <a:srgbClr val="4A66AC"/>
-                </a:solidFill>
-              </a:rPr>
-              <a:t>L’état de l’application après le déploiement et le contenu du fichier </a:t>
-            </a:r>
-            <a:r>
-              <a:rPr lang="fr-FR" sz="1700" dirty="0" err="1">
-                <a:solidFill>
-                  <a:srgbClr val="4A66AC"/>
-                </a:solidFill>
-              </a:rPr>
-              <a:t>manifest.yml</a:t>
-            </a:r>
-            <a:endParaRPr lang="fr-FR" sz="1700" dirty="0">
-              <a:solidFill>
-                <a:srgbClr val="4A66AC"/>
-              </a:solidFill>
-            </a:endParaRPr>
-          </a:p>
-        </p:txBody>
-      </p:sp>
-    </p:spTree>
-    <p:extLst>
-      <p:ext uri="{BB962C8B-B14F-4D97-AF65-F5344CB8AC3E}">
-        <p14:creationId xmlns:p14="http://schemas.microsoft.com/office/powerpoint/2010/main" val="1242467404"/>
-      </p:ext>
-    </p:extLst>
-  </p:cSld>
-  <p:clrMapOvr>
-    <a:masterClrMapping/>
-  </p:clrMapOvr>
-</p:sld>
-</file>
-
-<file path=ppt/slides/slide56.xml><?xml version="1.0" encoding="utf-8"?>
-<p:sld xmlns:a="http://schemas.openxmlformats.org/drawingml/2006/main" xmlns:r="http://schemas.openxmlformats.org/officeDocument/2006/relationships" xmlns:p="http://schemas.openxmlformats.org/presentationml/2006/main">
-  <p:cSld>
-    <p:spTree>
-      <p:nvGrpSpPr>
-        <p:cNvPr id="1" name=""/>
-        <p:cNvGrpSpPr/>
-        <p:nvPr/>
-      </p:nvGrpSpPr>
-      <p:grpSpPr>
-        <a:xfrm>
-          <a:off x="0" y="0"/>
-          <a:ext cx="0" cy="0"/>
-          <a:chOff x="0" y="0"/>
-          <a:chExt cx="0" cy="0"/>
-        </a:xfrm>
-      </p:grpSpPr>
-      <p:sp>
-        <p:nvSpPr>
-          <p:cNvPr id="2" name="Title 1">
-            <a:extLst>
-              <a:ext uri="{FF2B5EF4-FFF2-40B4-BE49-F238E27FC236}">
-                <a16:creationId xmlns:a16="http://schemas.microsoft.com/office/drawing/2014/main" id="{9FA9C21B-91B8-4244-8EBB-06F33AEBFA2A}"/>
-              </a:ext>
-            </a:extLst>
-          </p:cNvPr>
-          <p:cNvSpPr>
-            <a:spLocks noGrp="1"/>
-          </p:cNvSpPr>
-          <p:nvPr>
-            <p:ph type="title"/>
-          </p:nvPr>
-        </p:nvSpPr>
-        <p:spPr>
-          <a:xfrm>
-            <a:off x="1143000" y="609600"/>
-            <a:ext cx="9875520" cy="566057"/>
-          </a:xfrm>
-        </p:spPr>
-        <p:txBody>
-          <a:bodyPr>
-            <a:normAutofit fontScale="90000"/>
-          </a:bodyPr>
-          <a:lstStyle/>
-          <a:p>
-            <a:r>
-              <a:rPr lang="fr-FR" dirty="0"/>
-              <a:t>Cockpit Cloud Foundry</a:t>
-            </a:r>
-          </a:p>
-        </p:txBody>
-      </p:sp>
-      <p:pic>
-        <p:nvPicPr>
-          <p:cNvPr id="6" name="Content Placeholder 5">
-            <a:extLst>
-              <a:ext uri="{FF2B5EF4-FFF2-40B4-BE49-F238E27FC236}">
-                <a16:creationId xmlns:a16="http://schemas.microsoft.com/office/drawing/2014/main" id="{0ADBEF4E-BE02-455E-A0A5-A86F585EB757}"/>
-              </a:ext>
-            </a:extLst>
-          </p:cNvPr>
-          <p:cNvPicPr>
-            <a:picLocks noGrp="1" noChangeAspect="1"/>
-          </p:cNvPicPr>
-          <p:nvPr>
-            <p:ph idx="1"/>
-          </p:nvPr>
-        </p:nvPicPr>
-        <p:blipFill>
-          <a:blip r:embed="rId2"/>
-          <a:stretch>
-            <a:fillRect/>
-          </a:stretch>
-        </p:blipFill>
-        <p:spPr>
-          <a:xfrm>
-            <a:off x="1143000" y="1261516"/>
-            <a:ext cx="9872663" cy="4685507"/>
-          </a:xfrm>
-        </p:spPr>
-      </p:pic>
-      <p:sp>
-        <p:nvSpPr>
-          <p:cNvPr id="4" name="Slide Number Placeholder 3">
-            <a:extLst>
-              <a:ext uri="{FF2B5EF4-FFF2-40B4-BE49-F238E27FC236}">
-                <a16:creationId xmlns:a16="http://schemas.microsoft.com/office/drawing/2014/main" id="{CC631A8C-BF3C-40E3-BB40-F2FB94F9914E}"/>
-              </a:ext>
-            </a:extLst>
-          </p:cNvPr>
-          <p:cNvSpPr>
-            <a:spLocks noGrp="1"/>
-          </p:cNvSpPr>
-          <p:nvPr>
-            <p:ph type="sldNum" sz="quarter" idx="12"/>
-          </p:nvPr>
-        </p:nvSpPr>
-        <p:spPr/>
-        <p:txBody>
-          <a:bodyPr/>
-          <a:lstStyle/>
-          <a:p>
-            <a:fld id="{C52ED629-2BC0-4D25-969E-9ED78B40D7C7}" type="slidenum">
-              <a:rPr lang="fr-FR" smtClean="0"/>
-              <a:t>56</a:t>
-            </a:fld>
-            <a:endParaRPr lang="fr-FR"/>
-          </a:p>
-        </p:txBody>
-      </p:sp>
-    </p:spTree>
-    <p:extLst>
-      <p:ext uri="{BB962C8B-B14F-4D97-AF65-F5344CB8AC3E}">
-        <p14:creationId xmlns:p14="http://schemas.microsoft.com/office/powerpoint/2010/main" val="4179508825"/>
-      </p:ext>
-    </p:extLst>
-  </p:cSld>
-  <p:clrMapOvr>
-    <a:masterClrMapping/>
-  </p:clrMapOvr>
-</p:sld>
-</file>
-
-<file path=ppt/slides/slide57.xml><?xml version="1.0" encoding="utf-8"?>
-<p:sld xmlns:a="http://schemas.openxmlformats.org/drawingml/2006/main" xmlns:r="http://schemas.openxmlformats.org/officeDocument/2006/relationships" xmlns:p="http://schemas.openxmlformats.org/presentationml/2006/main">
-  <p:cSld>
-    <p:spTree>
-      <p:nvGrpSpPr>
-        <p:cNvPr id="1" name=""/>
-        <p:cNvGrpSpPr/>
-        <p:nvPr/>
-      </p:nvGrpSpPr>
-      <p:grpSpPr>
-        <a:xfrm>
-          <a:off x="0" y="0"/>
-          <a:ext cx="0" cy="0"/>
-          <a:chOff x="0" y="0"/>
-          <a:chExt cx="0" cy="0"/>
-        </a:xfrm>
-      </p:grpSpPr>
-      <p:sp>
-        <p:nvSpPr>
-          <p:cNvPr id="6" name="Title 5">
-            <a:extLst>
-              <a:ext uri="{FF2B5EF4-FFF2-40B4-BE49-F238E27FC236}">
-                <a16:creationId xmlns:a16="http://schemas.microsoft.com/office/drawing/2014/main" id="{08CF4753-5E1B-447E-A690-077879B3A68D}"/>
-              </a:ext>
-            </a:extLst>
-          </p:cNvPr>
-          <p:cNvSpPr>
-            <a:spLocks noGrp="1"/>
-          </p:cNvSpPr>
-          <p:nvPr>
-            <p:ph type="title"/>
-          </p:nvPr>
-        </p:nvSpPr>
-        <p:spPr>
-          <a:xfrm>
-            <a:off x="1106424" y="1173575"/>
-            <a:ext cx="10100292" cy="2926080"/>
-          </a:xfrm>
-        </p:spPr>
-        <p:txBody>
-          <a:bodyPr/>
-          <a:lstStyle/>
-          <a:p>
-            <a:r>
-              <a:rPr lang="fr-FR" dirty="0"/>
-              <a:t>Tests et contrôles</a:t>
-            </a:r>
-          </a:p>
-        </p:txBody>
-      </p:sp>
-      <p:sp>
-        <p:nvSpPr>
-          <p:cNvPr id="5" name="Slide Number Placeholder 4">
-            <a:extLst>
-              <a:ext uri="{FF2B5EF4-FFF2-40B4-BE49-F238E27FC236}">
-                <a16:creationId xmlns:a16="http://schemas.microsoft.com/office/drawing/2014/main" id="{8C0981BC-17A1-4726-8576-D6CBCEF6DCDE}"/>
-              </a:ext>
-            </a:extLst>
-          </p:cNvPr>
-          <p:cNvSpPr>
-            <a:spLocks noGrp="1"/>
-          </p:cNvSpPr>
-          <p:nvPr>
-            <p:ph type="sldNum" sz="quarter" idx="12"/>
-          </p:nvPr>
-        </p:nvSpPr>
-        <p:spPr/>
-        <p:txBody>
-          <a:bodyPr/>
-          <a:lstStyle/>
-          <a:p>
-            <a:fld id="{C52ED629-2BC0-4D25-969E-9ED78B40D7C7}" type="slidenum">
-              <a:rPr lang="fr-FR" smtClean="0"/>
-              <a:t>57</a:t>
-            </a:fld>
-            <a:endParaRPr lang="fr-FR"/>
-          </a:p>
-        </p:txBody>
-      </p:sp>
-    </p:spTree>
-    <p:extLst>
-      <p:ext uri="{BB962C8B-B14F-4D97-AF65-F5344CB8AC3E}">
-        <p14:creationId xmlns:p14="http://schemas.microsoft.com/office/powerpoint/2010/main" val="2635143560"/>
-      </p:ext>
-    </p:extLst>
-  </p:cSld>
-  <p:clrMapOvr>
-    <a:masterClrMapping/>
-  </p:clrMapOvr>
-</p:sld>
-</file>
-
-<file path=ppt/slides/slide58.xml><?xml version="1.0" encoding="utf-8"?>
-<p:sld xmlns:a="http://schemas.openxmlformats.org/drawingml/2006/main" xmlns:r="http://schemas.openxmlformats.org/officeDocument/2006/relationships" xmlns:p="http://schemas.openxmlformats.org/presentationml/2006/main">
-  <p:cSld>
-    <p:spTree>
-      <p:nvGrpSpPr>
-        <p:cNvPr id="1" name=""/>
-        <p:cNvGrpSpPr/>
-        <p:nvPr/>
-      </p:nvGrpSpPr>
-      <p:grpSpPr>
-        <a:xfrm>
-          <a:off x="0" y="0"/>
-          <a:ext cx="0" cy="0"/>
-          <a:chOff x="0" y="0"/>
-          <a:chExt cx="0" cy="0"/>
-        </a:xfrm>
-      </p:grpSpPr>
-      <p:sp>
-        <p:nvSpPr>
-          <p:cNvPr id="2" name="Title 1">
-            <a:extLst>
-              <a:ext uri="{FF2B5EF4-FFF2-40B4-BE49-F238E27FC236}">
-                <a16:creationId xmlns:a16="http://schemas.microsoft.com/office/drawing/2014/main" id="{86F302C2-843C-49ED-9E03-ED2A7DC7B9E1}"/>
-              </a:ext>
-            </a:extLst>
-          </p:cNvPr>
-          <p:cNvSpPr>
-            <a:spLocks noGrp="1"/>
-          </p:cNvSpPr>
-          <p:nvPr>
-            <p:ph type="title"/>
-          </p:nvPr>
-        </p:nvSpPr>
-        <p:spPr>
-          <a:xfrm>
-            <a:off x="1143000" y="1097280"/>
-            <a:ext cx="3931920" cy="1569720"/>
-          </a:xfrm>
-        </p:spPr>
-        <p:txBody>
-          <a:bodyPr/>
-          <a:lstStyle/>
-          <a:p>
-            <a:r>
-              <a:rPr lang="fr-FR" sz="3200" dirty="0"/>
-              <a:t>Intégration continue</a:t>
-            </a:r>
-          </a:p>
-        </p:txBody>
-      </p:sp>
-      <p:sp>
-        <p:nvSpPr>
-          <p:cNvPr id="4" name="Text Placeholder 3">
-            <a:extLst>
-              <a:ext uri="{FF2B5EF4-FFF2-40B4-BE49-F238E27FC236}">
-                <a16:creationId xmlns:a16="http://schemas.microsoft.com/office/drawing/2014/main" id="{F6BB302E-284C-4396-A290-3CB2C1EC8287}"/>
-              </a:ext>
-            </a:extLst>
-          </p:cNvPr>
-          <p:cNvSpPr>
-            <a:spLocks noGrp="1"/>
-          </p:cNvSpPr>
-          <p:nvPr>
-            <p:ph type="body" sz="half" idx="2"/>
-          </p:nvPr>
-        </p:nvSpPr>
-        <p:spPr>
-          <a:xfrm>
-            <a:off x="1143000" y="2868133"/>
-            <a:ext cx="3931920" cy="2994660"/>
-          </a:xfrm>
-        </p:spPr>
-        <p:txBody>
-          <a:bodyPr/>
-          <a:lstStyle/>
-          <a:p>
-            <a:r>
-              <a:rPr lang="fr-FR" dirty="0"/>
-              <a:t>Exemple du module « Actions » de GitHub. </a:t>
-            </a:r>
-            <a:br>
-              <a:rPr lang="fr-FR" dirty="0"/>
-            </a:br>
-            <a:r>
-              <a:rPr lang="fr-FR" dirty="0"/>
-              <a:t/>
-            </a:r>
-            <a:br>
-              <a:rPr lang="fr-FR" dirty="0"/>
-            </a:br>
-            <a:r>
-              <a:rPr lang="fr-FR" dirty="0"/>
-              <a:t>Ce workflow se lance à l’arrivée de chaque code pour lequel il y a une demande de « Pull </a:t>
-            </a:r>
-            <a:r>
-              <a:rPr lang="fr-FR" dirty="0" err="1"/>
-              <a:t>Request</a:t>
-            </a:r>
-            <a:r>
-              <a:rPr lang="fr-FR" dirty="0"/>
-              <a:t> » sur la branche master.</a:t>
-            </a:r>
-          </a:p>
-        </p:txBody>
-      </p:sp>
-      <p:sp>
-        <p:nvSpPr>
-          <p:cNvPr id="5" name="Slide Number Placeholder 4">
-            <a:extLst>
-              <a:ext uri="{FF2B5EF4-FFF2-40B4-BE49-F238E27FC236}">
-                <a16:creationId xmlns:a16="http://schemas.microsoft.com/office/drawing/2014/main" id="{EBC2931B-BAF4-4477-8933-FFCD1491EBE7}"/>
-              </a:ext>
-            </a:extLst>
-          </p:cNvPr>
-          <p:cNvSpPr>
-            <a:spLocks noGrp="1"/>
-          </p:cNvSpPr>
-          <p:nvPr>
-            <p:ph type="sldNum" sz="quarter" idx="12"/>
-          </p:nvPr>
-        </p:nvSpPr>
-        <p:spPr/>
-        <p:txBody>
-          <a:bodyPr/>
-          <a:lstStyle/>
-          <a:p>
-            <a:fld id="{C52ED629-2BC0-4D25-969E-9ED78B40D7C7}" type="slidenum">
-              <a:rPr lang="fr-FR" smtClean="0"/>
-              <a:t>58</a:t>
-            </a:fld>
-            <a:endParaRPr lang="fr-FR"/>
-          </a:p>
-        </p:txBody>
-      </p:sp>
-      <p:pic>
-        <p:nvPicPr>
-          <p:cNvPr id="15" name="Picture 14">
-            <a:extLst>
-              <a:ext uri="{FF2B5EF4-FFF2-40B4-BE49-F238E27FC236}">
-                <a16:creationId xmlns:a16="http://schemas.microsoft.com/office/drawing/2014/main" id="{FCFA2337-B080-4DA2-A6A7-14F356E6B522}"/>
-              </a:ext>
-            </a:extLst>
-          </p:cNvPr>
-          <p:cNvPicPr>
-            <a:picLocks noChangeAspect="1"/>
-          </p:cNvPicPr>
-          <p:nvPr/>
-        </p:nvPicPr>
-        <p:blipFill>
-          <a:blip r:embed="rId2"/>
-          <a:stretch>
-            <a:fillRect/>
-          </a:stretch>
-        </p:blipFill>
-        <p:spPr>
-          <a:xfrm>
-            <a:off x="5856807" y="583106"/>
-            <a:ext cx="4197207" cy="5760000"/>
-          </a:xfrm>
-          <a:prstGeom prst="rect">
-            <a:avLst/>
-          </a:prstGeom>
-        </p:spPr>
-      </p:pic>
-    </p:spTree>
-    <p:extLst>
-      <p:ext uri="{BB962C8B-B14F-4D97-AF65-F5344CB8AC3E}">
-        <p14:creationId xmlns:p14="http://schemas.microsoft.com/office/powerpoint/2010/main" val="2648009843"/>
-      </p:ext>
-    </p:extLst>
-  </p:cSld>
-  <p:clrMapOvr>
-    <a:masterClrMapping/>
-  </p:clrMapOvr>
-</p:sld>
-</file>
-
-<file path=ppt/slides/slide59.xml><?xml version="1.0" encoding="utf-8"?>
-<p:sld xmlns:a="http://schemas.openxmlformats.org/drawingml/2006/main" xmlns:r="http://schemas.openxmlformats.org/officeDocument/2006/relationships" xmlns:p="http://schemas.openxmlformats.org/presentationml/2006/main">
-  <p:cSld>
-    <p:spTree>
-      <p:nvGrpSpPr>
-        <p:cNvPr id="1" name=""/>
-        <p:cNvGrpSpPr/>
-        <p:nvPr/>
-      </p:nvGrpSpPr>
-      <p:grpSpPr>
-        <a:xfrm>
-          <a:off x="0" y="0"/>
-          <a:ext cx="0" cy="0"/>
-          <a:chOff x="0" y="0"/>
-          <a:chExt cx="0" cy="0"/>
-        </a:xfrm>
-      </p:grpSpPr>
-      <p:sp>
-        <p:nvSpPr>
-          <p:cNvPr id="2" name="Title 1">
-            <a:extLst>
-              <a:ext uri="{FF2B5EF4-FFF2-40B4-BE49-F238E27FC236}">
-                <a16:creationId xmlns:a16="http://schemas.microsoft.com/office/drawing/2014/main" id="{FE98D3BB-4534-4507-A806-C628A192C6F5}"/>
-              </a:ext>
-            </a:extLst>
-          </p:cNvPr>
-          <p:cNvSpPr>
-            <a:spLocks noGrp="1"/>
-          </p:cNvSpPr>
-          <p:nvPr>
-            <p:ph type="title"/>
-          </p:nvPr>
-        </p:nvSpPr>
-        <p:spPr>
-          <a:xfrm>
-            <a:off x="1143000" y="609600"/>
-            <a:ext cx="9875520" cy="704850"/>
-          </a:xfrm>
-        </p:spPr>
-        <p:txBody>
-          <a:bodyPr>
-            <a:normAutofit/>
-          </a:bodyPr>
-          <a:lstStyle/>
-          <a:p>
-            <a:r>
-              <a:rPr lang="fr-FR" sz="4000" dirty="0"/>
-              <a:t>Le résultat du workflow dans GitHub</a:t>
-            </a:r>
-          </a:p>
-        </p:txBody>
-      </p:sp>
-      <p:pic>
-        <p:nvPicPr>
-          <p:cNvPr id="7" name="Content Placeholder 6">
-            <a:extLst>
-              <a:ext uri="{FF2B5EF4-FFF2-40B4-BE49-F238E27FC236}">
-                <a16:creationId xmlns:a16="http://schemas.microsoft.com/office/drawing/2014/main" id="{90823F51-7ED0-43FA-A7AC-648980CFD662}"/>
-              </a:ext>
-            </a:extLst>
-          </p:cNvPr>
-          <p:cNvPicPr>
-            <a:picLocks noGrp="1" noChangeAspect="1"/>
-          </p:cNvPicPr>
-          <p:nvPr>
-            <p:ph idx="1"/>
-          </p:nvPr>
-        </p:nvPicPr>
-        <p:blipFill>
-          <a:blip r:embed="rId2"/>
-          <a:stretch>
-            <a:fillRect/>
-          </a:stretch>
-        </p:blipFill>
-        <p:spPr>
-          <a:xfrm>
-            <a:off x="1304691" y="1844676"/>
-            <a:ext cx="9087317" cy="3708494"/>
-          </a:xfrm>
-          <a:prstGeom prst="rect">
-            <a:avLst/>
-          </a:prstGeom>
-        </p:spPr>
-      </p:pic>
-      <p:sp>
-        <p:nvSpPr>
-          <p:cNvPr id="4" name="Slide Number Placeholder 3">
-            <a:extLst>
-              <a:ext uri="{FF2B5EF4-FFF2-40B4-BE49-F238E27FC236}">
-                <a16:creationId xmlns:a16="http://schemas.microsoft.com/office/drawing/2014/main" id="{E98FB3A3-0377-482D-975B-8DD1D6C9678F}"/>
-              </a:ext>
-            </a:extLst>
-          </p:cNvPr>
-          <p:cNvSpPr>
-            <a:spLocks noGrp="1"/>
-          </p:cNvSpPr>
-          <p:nvPr>
-            <p:ph type="sldNum" sz="quarter" idx="12"/>
-          </p:nvPr>
-        </p:nvSpPr>
-        <p:spPr/>
-        <p:txBody>
-          <a:bodyPr/>
-          <a:lstStyle/>
-          <a:p>
-            <a:fld id="{C52ED629-2BC0-4D25-969E-9ED78B40D7C7}" type="slidenum">
-              <a:rPr lang="fr-FR" smtClean="0"/>
-              <a:t>59</a:t>
-            </a:fld>
-            <a:endParaRPr lang="fr-FR"/>
-          </a:p>
-        </p:txBody>
-      </p:sp>
-    </p:spTree>
-    <p:extLst>
-      <p:ext uri="{BB962C8B-B14F-4D97-AF65-F5344CB8AC3E}">
-        <p14:creationId xmlns:p14="http://schemas.microsoft.com/office/powerpoint/2010/main" val="316631459"/>
+        <p14:creationId xmlns:p14="http://schemas.microsoft.com/office/powerpoint/2010/main" val="898043026"/>
       </p:ext>
     </p:extLst>
   </p:cSld>
@@ -17046,11 +16216,7 @@
           <a:p>
             <a:r>
               <a:rPr lang="en-US" sz="1800" b="1" dirty="0" smtClean="0"/>
-              <a:t>Typescript </a:t>
-            </a:r>
-            <a:r>
-              <a:rPr lang="en-US" sz="1800" b="1" dirty="0" smtClean="0"/>
-              <a:t>4: </a:t>
+              <a:t>Typescript 4: </a:t>
             </a:r>
             <a:r>
               <a:rPr lang="fr-FR" sz="1800" dirty="0"/>
@@ -17079,7 +16245,6 @@
               <a:rPr lang="fr-FR" sz="1800" b="1" dirty="0" smtClean="0"/>
               <a:t>CSS3</a:t>
             </a:r>
-            <a:endParaRPr lang="fr-FR" sz="1800" b="1" dirty="0" smtClean="0"/>
           </a:p>
           <a:p>
             <a:r>
@@ -17135,772 +16300,6 @@
     <p:extLst>
       <p:ext uri="{BB962C8B-B14F-4D97-AF65-F5344CB8AC3E}">
         <p14:creationId xmlns:p14="http://schemas.microsoft.com/office/powerpoint/2010/main" val="4220190837"/>
-      </p:ext>
-    </p:extLst>
-  </p:cSld>
-  <p:clrMapOvr>
-    <a:masterClrMapping/>
-  </p:clrMapOvr>
-</p:sld>
-</file>
-
-<file path=ppt/slides/slide60.xml><?xml version="1.0" encoding="utf-8"?>
-<p:sld xmlns:a="http://schemas.openxmlformats.org/drawingml/2006/main" xmlns:r="http://schemas.openxmlformats.org/officeDocument/2006/relationships" xmlns:p="http://schemas.openxmlformats.org/presentationml/2006/main">
-  <p:cSld>
-    <p:spTree>
-      <p:nvGrpSpPr>
-        <p:cNvPr id="1" name=""/>
-        <p:cNvGrpSpPr/>
-        <p:nvPr/>
-      </p:nvGrpSpPr>
-      <p:grpSpPr>
-        <a:xfrm>
-          <a:off x="0" y="0"/>
-          <a:ext cx="0" cy="0"/>
-          <a:chOff x="0" y="0"/>
-          <a:chExt cx="0" cy="0"/>
-        </a:xfrm>
-      </p:grpSpPr>
-      <p:sp>
-        <p:nvSpPr>
-          <p:cNvPr id="3" name="Title 2">
-            <a:extLst>
-              <a:ext uri="{FF2B5EF4-FFF2-40B4-BE49-F238E27FC236}">
-                <a16:creationId xmlns:a16="http://schemas.microsoft.com/office/drawing/2014/main" id="{C9D2465D-BC31-40F8-97C9-218E19767277}"/>
-              </a:ext>
-            </a:extLst>
-          </p:cNvPr>
-          <p:cNvSpPr>
-            <a:spLocks noGrp="1"/>
-          </p:cNvSpPr>
-          <p:nvPr>
-            <p:ph type="title"/>
-          </p:nvPr>
-        </p:nvSpPr>
-        <p:spPr>
-          <a:xfrm>
-            <a:off x="1143000" y="609600"/>
-            <a:ext cx="9989288" cy="561975"/>
-          </a:xfrm>
-        </p:spPr>
-        <p:txBody>
-          <a:bodyPr>
-            <a:normAutofit fontScale="90000"/>
-          </a:bodyPr>
-          <a:lstStyle/>
-          <a:p>
-            <a:r>
-              <a:rPr lang="fr-FR" dirty="0" err="1"/>
-              <a:t>Unittest</a:t>
-            </a:r>
-            <a:r>
-              <a:rPr lang="fr-FR" dirty="0"/>
-              <a:t> et le rapport </a:t>
-            </a:r>
-            <a:r>
-              <a:rPr lang="fr-FR" dirty="0" err="1"/>
-              <a:t>coverage</a:t>
-            </a:r>
-            <a:r>
-              <a:rPr lang="fr-FR" dirty="0"/>
-              <a:t> dans GitHub</a:t>
-            </a:r>
-          </a:p>
-        </p:txBody>
-      </p:sp>
-      <p:pic>
-        <p:nvPicPr>
-          <p:cNvPr id="5" name="Content Placeholder 4">
-            <a:extLst>
-              <a:ext uri="{FF2B5EF4-FFF2-40B4-BE49-F238E27FC236}">
-                <a16:creationId xmlns:a16="http://schemas.microsoft.com/office/drawing/2014/main" id="{A23DF64D-5540-45A3-88D7-FB1566E2C2DF}"/>
-              </a:ext>
-            </a:extLst>
-          </p:cNvPr>
-          <p:cNvPicPr>
-            <a:picLocks noGrp="1" noChangeAspect="1"/>
-          </p:cNvPicPr>
-          <p:nvPr>
-            <p:ph idx="1"/>
-          </p:nvPr>
-        </p:nvPicPr>
-        <p:blipFill>
-          <a:blip r:embed="rId2"/>
-          <a:stretch>
-            <a:fillRect/>
-          </a:stretch>
-        </p:blipFill>
-        <p:spPr>
-          <a:xfrm>
-            <a:off x="1276350" y="1298122"/>
-            <a:ext cx="8667749" cy="4756394"/>
-          </a:xfrm>
-          <a:prstGeom prst="rect">
-            <a:avLst/>
-          </a:prstGeom>
-        </p:spPr>
-      </p:pic>
-      <p:sp>
-        <p:nvSpPr>
-          <p:cNvPr id="2" name="Slide Number Placeholder 1">
-            <a:extLst>
-              <a:ext uri="{FF2B5EF4-FFF2-40B4-BE49-F238E27FC236}">
-                <a16:creationId xmlns:a16="http://schemas.microsoft.com/office/drawing/2014/main" id="{6CD12ADC-22FF-4BF2-8AA5-0A8C52E822E2}"/>
-              </a:ext>
-            </a:extLst>
-          </p:cNvPr>
-          <p:cNvSpPr>
-            <a:spLocks noGrp="1"/>
-          </p:cNvSpPr>
-          <p:nvPr>
-            <p:ph type="sldNum" sz="quarter" idx="12"/>
-          </p:nvPr>
-        </p:nvSpPr>
-        <p:spPr/>
-        <p:txBody>
-          <a:bodyPr/>
-          <a:lstStyle/>
-          <a:p>
-            <a:fld id="{C52ED629-2BC0-4D25-969E-9ED78B40D7C7}" type="slidenum">
-              <a:rPr lang="fr-FR" smtClean="0"/>
-              <a:t>60</a:t>
-            </a:fld>
-            <a:endParaRPr lang="fr-FR"/>
-          </a:p>
-        </p:txBody>
-      </p:sp>
-    </p:spTree>
-    <p:extLst>
-      <p:ext uri="{BB962C8B-B14F-4D97-AF65-F5344CB8AC3E}">
-        <p14:creationId xmlns:p14="http://schemas.microsoft.com/office/powerpoint/2010/main" val="1337669088"/>
-      </p:ext>
-    </p:extLst>
-  </p:cSld>
-  <p:clrMapOvr>
-    <a:masterClrMapping/>
-  </p:clrMapOvr>
-</p:sld>
-</file>
-
-<file path=ppt/slides/slide61.xml><?xml version="1.0" encoding="utf-8"?>
-<p:sld xmlns:a="http://schemas.openxmlformats.org/drawingml/2006/main" xmlns:r="http://schemas.openxmlformats.org/officeDocument/2006/relationships" xmlns:p="http://schemas.openxmlformats.org/presentationml/2006/main">
-  <p:cSld>
-    <p:spTree>
-      <p:nvGrpSpPr>
-        <p:cNvPr id="1" name=""/>
-        <p:cNvGrpSpPr/>
-        <p:nvPr/>
-      </p:nvGrpSpPr>
-      <p:grpSpPr>
-        <a:xfrm>
-          <a:off x="0" y="0"/>
-          <a:ext cx="0" cy="0"/>
-          <a:chOff x="0" y="0"/>
-          <a:chExt cx="0" cy="0"/>
-        </a:xfrm>
-      </p:grpSpPr>
-      <p:sp>
-        <p:nvSpPr>
-          <p:cNvPr id="3" name="Title 2">
-            <a:extLst>
-              <a:ext uri="{FF2B5EF4-FFF2-40B4-BE49-F238E27FC236}">
-                <a16:creationId xmlns:a16="http://schemas.microsoft.com/office/drawing/2014/main" id="{446F9D36-F6D2-4FB8-BD83-2AC8709C815D}"/>
-              </a:ext>
-            </a:extLst>
-          </p:cNvPr>
-          <p:cNvSpPr>
-            <a:spLocks noGrp="1"/>
-          </p:cNvSpPr>
-          <p:nvPr>
-            <p:ph type="title"/>
-          </p:nvPr>
-        </p:nvSpPr>
-        <p:spPr>
-          <a:xfrm>
-            <a:off x="595859" y="1097280"/>
-            <a:ext cx="3931920" cy="1645920"/>
-          </a:xfrm>
-        </p:spPr>
-        <p:txBody>
-          <a:bodyPr/>
-          <a:lstStyle/>
-          <a:p>
-            <a:r>
-              <a:rPr lang="fr-FR" sz="3200" dirty="0"/>
-              <a:t>Des tests unitaires</a:t>
-            </a:r>
-          </a:p>
-        </p:txBody>
-      </p:sp>
-      <p:sp>
-        <p:nvSpPr>
-          <p:cNvPr id="5" name="Text Placeholder 4">
-            <a:extLst>
-              <a:ext uri="{FF2B5EF4-FFF2-40B4-BE49-F238E27FC236}">
-                <a16:creationId xmlns:a16="http://schemas.microsoft.com/office/drawing/2014/main" id="{D679174E-03B2-4D7D-8A9D-372CB8B943C0}"/>
-              </a:ext>
-            </a:extLst>
-          </p:cNvPr>
-          <p:cNvSpPr>
-            <a:spLocks noGrp="1"/>
-          </p:cNvSpPr>
-          <p:nvPr>
-            <p:ph type="body" sz="half" idx="2"/>
-          </p:nvPr>
-        </p:nvSpPr>
-        <p:spPr>
-          <a:xfrm>
-            <a:off x="635073" y="2898438"/>
-            <a:ext cx="3931920" cy="1035609"/>
-          </a:xfrm>
-        </p:spPr>
-        <p:txBody>
-          <a:bodyPr>
-            <a:noAutofit/>
-          </a:bodyPr>
-          <a:lstStyle/>
-          <a:p>
-            <a:r>
-              <a:rPr lang="fr-FR" dirty="0"/>
-              <a:t>Quelques exemples de tests unitaires du module test_monitor.py</a:t>
-            </a:r>
-          </a:p>
-          <a:p>
-            <a:r>
-              <a:rPr lang="fr-FR" dirty="0"/>
-              <a:t>Page ½.</a:t>
-            </a:r>
-          </a:p>
-        </p:txBody>
-      </p:sp>
-      <p:sp>
-        <p:nvSpPr>
-          <p:cNvPr id="2" name="Slide Number Placeholder 1">
-            <a:extLst>
-              <a:ext uri="{FF2B5EF4-FFF2-40B4-BE49-F238E27FC236}">
-                <a16:creationId xmlns:a16="http://schemas.microsoft.com/office/drawing/2014/main" id="{3EDDCF6C-A208-49C3-9D08-8DAC1DE85391}"/>
-              </a:ext>
-            </a:extLst>
-          </p:cNvPr>
-          <p:cNvSpPr>
-            <a:spLocks noGrp="1"/>
-          </p:cNvSpPr>
-          <p:nvPr>
-            <p:ph type="sldNum" sz="quarter" idx="12"/>
-          </p:nvPr>
-        </p:nvSpPr>
-        <p:spPr/>
-        <p:txBody>
-          <a:bodyPr/>
-          <a:lstStyle/>
-          <a:p>
-            <a:fld id="{C52ED629-2BC0-4D25-969E-9ED78B40D7C7}" type="slidenum">
-              <a:rPr lang="fr-FR" smtClean="0"/>
-              <a:t>61</a:t>
-            </a:fld>
-            <a:endParaRPr lang="fr-FR"/>
-          </a:p>
-        </p:txBody>
-      </p:sp>
-      <p:pic>
-        <p:nvPicPr>
-          <p:cNvPr id="6" name="Picture 5">
-            <a:extLst>
-              <a:ext uri="{FF2B5EF4-FFF2-40B4-BE49-F238E27FC236}">
-                <a16:creationId xmlns:a16="http://schemas.microsoft.com/office/drawing/2014/main" id="{720E8F8A-40E9-4313-AC19-4BA9A0C93141}"/>
-              </a:ext>
-            </a:extLst>
-          </p:cNvPr>
-          <p:cNvPicPr>
-            <a:picLocks noChangeAspect="1"/>
-          </p:cNvPicPr>
-          <p:nvPr/>
-        </p:nvPicPr>
-        <p:blipFill>
-          <a:blip r:embed="rId2"/>
-          <a:stretch>
-            <a:fillRect/>
-          </a:stretch>
-        </p:blipFill>
-        <p:spPr>
-          <a:xfrm>
-            <a:off x="4666474" y="951935"/>
-            <a:ext cx="6965543" cy="4762745"/>
-          </a:xfrm>
-          <a:prstGeom prst="rect">
-            <a:avLst/>
-          </a:prstGeom>
-        </p:spPr>
-      </p:pic>
-    </p:spTree>
-    <p:extLst>
-      <p:ext uri="{BB962C8B-B14F-4D97-AF65-F5344CB8AC3E}">
-        <p14:creationId xmlns:p14="http://schemas.microsoft.com/office/powerpoint/2010/main" val="1879394326"/>
-      </p:ext>
-    </p:extLst>
-  </p:cSld>
-  <p:clrMapOvr>
-    <a:masterClrMapping/>
-  </p:clrMapOvr>
-</p:sld>
-</file>
-
-<file path=ppt/slides/slide62.xml><?xml version="1.0" encoding="utf-8"?>
-<p:sld xmlns:a="http://schemas.openxmlformats.org/drawingml/2006/main" xmlns:r="http://schemas.openxmlformats.org/officeDocument/2006/relationships" xmlns:p="http://schemas.openxmlformats.org/presentationml/2006/main">
-  <p:cSld>
-    <p:spTree>
-      <p:nvGrpSpPr>
-        <p:cNvPr id="1" name=""/>
-        <p:cNvGrpSpPr/>
-        <p:nvPr/>
-      </p:nvGrpSpPr>
-      <p:grpSpPr>
-        <a:xfrm>
-          <a:off x="0" y="0"/>
-          <a:ext cx="0" cy="0"/>
-          <a:chOff x="0" y="0"/>
-          <a:chExt cx="0" cy="0"/>
-        </a:xfrm>
-      </p:grpSpPr>
-      <p:sp>
-        <p:nvSpPr>
-          <p:cNvPr id="2" name="Title 1">
-            <a:extLst>
-              <a:ext uri="{FF2B5EF4-FFF2-40B4-BE49-F238E27FC236}">
-                <a16:creationId xmlns:a16="http://schemas.microsoft.com/office/drawing/2014/main" id="{4960881C-4F72-454C-A8C1-6D1BA15E4B89}"/>
-              </a:ext>
-            </a:extLst>
-          </p:cNvPr>
-          <p:cNvSpPr>
-            <a:spLocks noGrp="1"/>
-          </p:cNvSpPr>
-          <p:nvPr>
-            <p:ph type="title"/>
-          </p:nvPr>
-        </p:nvSpPr>
-        <p:spPr>
-          <a:xfrm>
-            <a:off x="769309" y="1097280"/>
-            <a:ext cx="3931920" cy="1737360"/>
-          </a:xfrm>
-        </p:spPr>
-        <p:txBody>
-          <a:bodyPr/>
-          <a:lstStyle/>
-          <a:p>
-            <a:r>
-              <a:rPr lang="fr-FR" sz="3200" dirty="0"/>
-              <a:t>Tests unitaires suite</a:t>
-            </a:r>
-          </a:p>
-        </p:txBody>
-      </p:sp>
-      <p:sp>
-        <p:nvSpPr>
-          <p:cNvPr id="4" name="Text Placeholder 3">
-            <a:extLst>
-              <a:ext uri="{FF2B5EF4-FFF2-40B4-BE49-F238E27FC236}">
-                <a16:creationId xmlns:a16="http://schemas.microsoft.com/office/drawing/2014/main" id="{FEE69EA2-5101-43DB-A4BA-AD73B892C3D7}"/>
-              </a:ext>
-            </a:extLst>
-          </p:cNvPr>
-          <p:cNvSpPr>
-            <a:spLocks noGrp="1"/>
-          </p:cNvSpPr>
-          <p:nvPr>
-            <p:ph type="body" sz="half" idx="2"/>
-          </p:nvPr>
-        </p:nvSpPr>
-        <p:spPr>
-          <a:xfrm>
-            <a:off x="818042" y="2834640"/>
-            <a:ext cx="3883187" cy="897388"/>
-          </a:xfrm>
-        </p:spPr>
-        <p:txBody>
-          <a:bodyPr/>
-          <a:lstStyle/>
-          <a:p>
-            <a:r>
-              <a:rPr lang="fr-FR" dirty="0"/>
-              <a:t>test_monitor.py</a:t>
-            </a:r>
-          </a:p>
-          <a:p>
-            <a:r>
-              <a:rPr lang="fr-FR" dirty="0"/>
-              <a:t>page 2/2.</a:t>
-            </a:r>
-          </a:p>
-          <a:p>
-            <a:endParaRPr lang="fr-FR" dirty="0"/>
-          </a:p>
-        </p:txBody>
-      </p:sp>
-      <p:sp>
-        <p:nvSpPr>
-          <p:cNvPr id="5" name="Slide Number Placeholder 4">
-            <a:extLst>
-              <a:ext uri="{FF2B5EF4-FFF2-40B4-BE49-F238E27FC236}">
-                <a16:creationId xmlns:a16="http://schemas.microsoft.com/office/drawing/2014/main" id="{6AF34CA0-3E8B-425E-B3DB-04078EA59A02}"/>
-              </a:ext>
-            </a:extLst>
-          </p:cNvPr>
-          <p:cNvSpPr>
-            <a:spLocks noGrp="1"/>
-          </p:cNvSpPr>
-          <p:nvPr>
-            <p:ph type="sldNum" sz="quarter" idx="12"/>
-          </p:nvPr>
-        </p:nvSpPr>
-        <p:spPr/>
-        <p:txBody>
-          <a:bodyPr/>
-          <a:lstStyle/>
-          <a:p>
-            <a:fld id="{C52ED629-2BC0-4D25-969E-9ED78B40D7C7}" type="slidenum">
-              <a:rPr lang="fr-FR" smtClean="0"/>
-              <a:t>62</a:t>
-            </a:fld>
-            <a:endParaRPr lang="fr-FR"/>
-          </a:p>
-        </p:txBody>
-      </p:sp>
-      <p:pic>
-        <p:nvPicPr>
-          <p:cNvPr id="6" name="Picture 5">
-            <a:extLst>
-              <a:ext uri="{FF2B5EF4-FFF2-40B4-BE49-F238E27FC236}">
-                <a16:creationId xmlns:a16="http://schemas.microsoft.com/office/drawing/2014/main" id="{029ADD83-45D3-4EB6-891C-37580FB15501}"/>
-              </a:ext>
-            </a:extLst>
-          </p:cNvPr>
-          <p:cNvPicPr>
-            <a:picLocks noChangeAspect="1"/>
-          </p:cNvPicPr>
-          <p:nvPr/>
-        </p:nvPicPr>
-        <p:blipFill>
-          <a:blip r:embed="rId2"/>
-          <a:stretch>
-            <a:fillRect/>
-          </a:stretch>
-        </p:blipFill>
-        <p:spPr>
-          <a:xfrm>
-            <a:off x="4858014" y="1121911"/>
-            <a:ext cx="6655134" cy="4320000"/>
-          </a:xfrm>
-          <a:prstGeom prst="rect">
-            <a:avLst/>
-          </a:prstGeom>
-        </p:spPr>
-      </p:pic>
-    </p:spTree>
-    <p:extLst>
-      <p:ext uri="{BB962C8B-B14F-4D97-AF65-F5344CB8AC3E}">
-        <p14:creationId xmlns:p14="http://schemas.microsoft.com/office/powerpoint/2010/main" val="2618588910"/>
-      </p:ext>
-    </p:extLst>
-  </p:cSld>
-  <p:clrMapOvr>
-    <a:masterClrMapping/>
-  </p:clrMapOvr>
-</p:sld>
-</file>
-
-<file path=ppt/slides/slide63.xml><?xml version="1.0" encoding="utf-8"?>
-<p:sld xmlns:a="http://schemas.openxmlformats.org/drawingml/2006/main" xmlns:r="http://schemas.openxmlformats.org/officeDocument/2006/relationships" xmlns:p="http://schemas.openxmlformats.org/presentationml/2006/main">
-  <p:cSld>
-    <p:spTree>
-      <p:nvGrpSpPr>
-        <p:cNvPr id="1" name=""/>
-        <p:cNvGrpSpPr/>
-        <p:nvPr/>
-      </p:nvGrpSpPr>
-      <p:grpSpPr>
-        <a:xfrm>
-          <a:off x="0" y="0"/>
-          <a:ext cx="0" cy="0"/>
-          <a:chOff x="0" y="0"/>
-          <a:chExt cx="0" cy="0"/>
-        </a:xfrm>
-      </p:grpSpPr>
-      <p:sp>
-        <p:nvSpPr>
-          <p:cNvPr id="2" name="Title 1">
-            <a:extLst>
-              <a:ext uri="{FF2B5EF4-FFF2-40B4-BE49-F238E27FC236}">
-                <a16:creationId xmlns:a16="http://schemas.microsoft.com/office/drawing/2014/main" id="{B6824682-5D06-47BE-9321-79D004AB9B84}"/>
-              </a:ext>
-            </a:extLst>
-          </p:cNvPr>
-          <p:cNvSpPr>
-            <a:spLocks noGrp="1"/>
-          </p:cNvSpPr>
-          <p:nvPr>
-            <p:ph type="title"/>
-          </p:nvPr>
-        </p:nvSpPr>
-        <p:spPr>
-          <a:xfrm>
-            <a:off x="1143000" y="609600"/>
-            <a:ext cx="9875520" cy="365125"/>
-          </a:xfrm>
-        </p:spPr>
-        <p:txBody>
-          <a:bodyPr>
-            <a:normAutofit fontScale="90000"/>
-          </a:bodyPr>
-          <a:lstStyle/>
-          <a:p>
-            <a:r>
-              <a:rPr lang="fr-FR" dirty="0"/>
-              <a:t>Pylint avec le module lint.py</a:t>
-            </a:r>
-          </a:p>
-        </p:txBody>
-      </p:sp>
-      <p:pic>
-        <p:nvPicPr>
-          <p:cNvPr id="8" name="Content Placeholder 7">
-            <a:extLst>
-              <a:ext uri="{FF2B5EF4-FFF2-40B4-BE49-F238E27FC236}">
-                <a16:creationId xmlns:a16="http://schemas.microsoft.com/office/drawing/2014/main" id="{AD0BD107-A7C9-4063-BEFB-883029507206}"/>
-              </a:ext>
-            </a:extLst>
-          </p:cNvPr>
-          <p:cNvPicPr>
-            <a:picLocks noGrp="1" noChangeAspect="1"/>
-          </p:cNvPicPr>
-          <p:nvPr>
-            <p:ph idx="1"/>
-          </p:nvPr>
-        </p:nvPicPr>
-        <p:blipFill>
-          <a:blip r:embed="rId2"/>
-          <a:stretch>
-            <a:fillRect/>
-          </a:stretch>
-        </p:blipFill>
-        <p:spPr>
-          <a:xfrm>
-            <a:off x="1748382" y="1201556"/>
-            <a:ext cx="8664756" cy="5121275"/>
-          </a:xfrm>
-        </p:spPr>
-      </p:pic>
-      <p:sp>
-        <p:nvSpPr>
-          <p:cNvPr id="4" name="Slide Number Placeholder 3">
-            <a:extLst>
-              <a:ext uri="{FF2B5EF4-FFF2-40B4-BE49-F238E27FC236}">
-                <a16:creationId xmlns:a16="http://schemas.microsoft.com/office/drawing/2014/main" id="{E1539F83-44F9-4179-B706-6F653B33D0DE}"/>
-              </a:ext>
-            </a:extLst>
-          </p:cNvPr>
-          <p:cNvSpPr>
-            <a:spLocks noGrp="1"/>
-          </p:cNvSpPr>
-          <p:nvPr>
-            <p:ph type="sldNum" sz="quarter" idx="12"/>
-          </p:nvPr>
-        </p:nvSpPr>
-        <p:spPr/>
-        <p:txBody>
-          <a:bodyPr/>
-          <a:lstStyle/>
-          <a:p>
-            <a:fld id="{C52ED629-2BC0-4D25-969E-9ED78B40D7C7}" type="slidenum">
-              <a:rPr lang="fr-FR" smtClean="0"/>
-              <a:t>63</a:t>
-            </a:fld>
-            <a:endParaRPr lang="fr-FR"/>
-          </a:p>
-        </p:txBody>
-      </p:sp>
-    </p:spTree>
-    <p:extLst>
-      <p:ext uri="{BB962C8B-B14F-4D97-AF65-F5344CB8AC3E}">
-        <p14:creationId xmlns:p14="http://schemas.microsoft.com/office/powerpoint/2010/main" val="1752756735"/>
-      </p:ext>
-    </p:extLst>
-  </p:cSld>
-  <p:clrMapOvr>
-    <a:masterClrMapping/>
-  </p:clrMapOvr>
-</p:sld>
-</file>
-
-<file path=ppt/slides/slide64.xml><?xml version="1.0" encoding="utf-8"?>
-<p:sld xmlns:a="http://schemas.openxmlformats.org/drawingml/2006/main" xmlns:r="http://schemas.openxmlformats.org/officeDocument/2006/relationships" xmlns:p="http://schemas.openxmlformats.org/presentationml/2006/main">
-  <p:cSld>
-    <p:spTree>
-      <p:nvGrpSpPr>
-        <p:cNvPr id="1" name=""/>
-        <p:cNvGrpSpPr/>
-        <p:nvPr/>
-      </p:nvGrpSpPr>
-      <p:grpSpPr>
-        <a:xfrm>
-          <a:off x="0" y="0"/>
-          <a:ext cx="0" cy="0"/>
-          <a:chOff x="0" y="0"/>
-          <a:chExt cx="0" cy="0"/>
-        </a:xfrm>
-      </p:grpSpPr>
-      <p:sp>
-        <p:nvSpPr>
-          <p:cNvPr id="2" name="Title 1">
-            <a:extLst>
-              <a:ext uri="{FF2B5EF4-FFF2-40B4-BE49-F238E27FC236}">
-                <a16:creationId xmlns:a16="http://schemas.microsoft.com/office/drawing/2014/main" id="{2D9BE37F-9AF0-44C0-886D-14D92A5E9052}"/>
-              </a:ext>
-            </a:extLst>
-          </p:cNvPr>
-          <p:cNvSpPr>
-            <a:spLocks noGrp="1"/>
-          </p:cNvSpPr>
-          <p:nvPr>
-            <p:ph type="title"/>
-          </p:nvPr>
-        </p:nvSpPr>
-        <p:spPr>
-          <a:xfrm>
-            <a:off x="1143000" y="609600"/>
-            <a:ext cx="9875520" cy="704850"/>
-          </a:xfrm>
-        </p:spPr>
-        <p:txBody>
-          <a:bodyPr/>
-          <a:lstStyle/>
-          <a:p>
-            <a:r>
-              <a:rPr lang="fr-FR" dirty="0"/>
-              <a:t>Conclusion</a:t>
-            </a:r>
-          </a:p>
-        </p:txBody>
-      </p:sp>
-      <p:sp>
-        <p:nvSpPr>
-          <p:cNvPr id="3" name="Content Placeholder 2">
-            <a:extLst>
-              <a:ext uri="{FF2B5EF4-FFF2-40B4-BE49-F238E27FC236}">
-                <a16:creationId xmlns:a16="http://schemas.microsoft.com/office/drawing/2014/main" id="{CE097B3D-BE10-49DA-8991-C23783BC9299}"/>
-              </a:ext>
-            </a:extLst>
-          </p:cNvPr>
-          <p:cNvSpPr>
-            <a:spLocks noGrp="1"/>
-          </p:cNvSpPr>
-          <p:nvPr>
-            <p:ph idx="1"/>
-          </p:nvPr>
-        </p:nvSpPr>
-        <p:spPr>
-          <a:xfrm>
-            <a:off x="1143000" y="1457325"/>
-            <a:ext cx="9872871" cy="4638675"/>
-          </a:xfrm>
-        </p:spPr>
-        <p:txBody>
-          <a:bodyPr>
-            <a:normAutofit/>
-          </a:bodyPr>
-          <a:lstStyle/>
-          <a:p>
-            <a:pPr marL="45720" indent="0" algn="just">
-              <a:buNone/>
-            </a:pPr>
-            <a:r>
-              <a:rPr lang="fr-FR" dirty="0"/>
-              <a:t>L’application web est en ligne avec la partie principale du backend en fonction (historisation et recherche), tout en ayant rempli un certains nombres de tests et de critères concernant le code.</a:t>
-            </a:r>
-          </a:p>
-          <a:p>
-            <a:pPr marL="45720" indent="0">
-              <a:buNone/>
-            </a:pPr>
-            <a:r>
-              <a:rPr lang="fr-FR" dirty="0"/>
-              <a:t>Vu la durée du stage (2 mois) et le temps nécessaire pour me former reste à faire :</a:t>
-            </a:r>
-          </a:p>
-          <a:p>
-            <a:pPr>
-              <a:buFont typeface="Wingdings" panose="05000000000000000000" pitchFamily="2" charset="2"/>
-              <a:buChar char="§"/>
-            </a:pPr>
-            <a:r>
-              <a:rPr lang="fr-FR" dirty="0"/>
-              <a:t>Compléter le Backend.</a:t>
-            </a:r>
-          </a:p>
-          <a:p>
-            <a:pPr>
-              <a:buFont typeface="Wingdings" panose="05000000000000000000" pitchFamily="2" charset="2"/>
-              <a:buChar char="§"/>
-            </a:pPr>
-            <a:r>
-              <a:rPr lang="fr-FR" dirty="0"/>
-              <a:t>Le Frontend : L’</a:t>
-            </a:r>
-            <a:r>
-              <a:rPr lang="fr-FR" dirty="0" err="1"/>
-              <a:t>authentication</a:t>
-            </a:r>
-            <a:r>
-              <a:rPr lang="fr-FR" dirty="0"/>
-              <a:t>.</a:t>
-            </a:r>
-          </a:p>
-          <a:p>
-            <a:pPr>
-              <a:buFont typeface="Wingdings" panose="05000000000000000000" pitchFamily="2" charset="2"/>
-              <a:buChar char="§"/>
-            </a:pPr>
-            <a:r>
-              <a:rPr lang="fr-FR" dirty="0"/>
-              <a:t>Mettre en place une base de données SAP Hana.</a:t>
-            </a:r>
-            <a:endParaRPr lang="fr-FR" b="1" dirty="0"/>
-          </a:p>
-        </p:txBody>
-      </p:sp>
-      <p:sp>
-        <p:nvSpPr>
-          <p:cNvPr id="4" name="Slide Number Placeholder 3">
-            <a:extLst>
-              <a:ext uri="{FF2B5EF4-FFF2-40B4-BE49-F238E27FC236}">
-                <a16:creationId xmlns:a16="http://schemas.microsoft.com/office/drawing/2014/main" id="{E2D53EDA-94B6-4BC2-9CF2-C2CE6F0E0F88}"/>
-              </a:ext>
-            </a:extLst>
-          </p:cNvPr>
-          <p:cNvSpPr>
-            <a:spLocks noGrp="1"/>
-          </p:cNvSpPr>
-          <p:nvPr>
-            <p:ph type="sldNum" sz="quarter" idx="12"/>
-          </p:nvPr>
-        </p:nvSpPr>
-        <p:spPr/>
-        <p:txBody>
-          <a:bodyPr/>
-          <a:lstStyle/>
-          <a:p>
-            <a:fld id="{C52ED629-2BC0-4D25-969E-9ED78B40D7C7}" type="slidenum">
-              <a:rPr lang="fr-FR" smtClean="0"/>
-              <a:t>64</a:t>
-            </a:fld>
-            <a:endParaRPr lang="fr-FR"/>
-          </a:p>
-        </p:txBody>
-      </p:sp>
-    </p:spTree>
-    <p:extLst>
-      <p:ext uri="{BB962C8B-B14F-4D97-AF65-F5344CB8AC3E}">
-        <p14:creationId xmlns:p14="http://schemas.microsoft.com/office/powerpoint/2010/main" val="898043026"/>
       </p:ext>
     </p:extLst>
   </p:cSld>
@@ -18017,11 +16416,7 @@
             </a:r>
             <a:r>
               <a:rPr lang="fr-FR" sz="1900" b="1" dirty="0" smtClean="0"/>
-              <a:t> </a:t>
-            </a:r>
-            <a:r>
-              <a:rPr lang="fr-FR" sz="1900" b="1" dirty="0" smtClean="0"/>
-              <a:t>2.5.4</a:t>
+              <a:t> 2.5.4</a:t>
             </a:r>
             <a:r>
               <a:rPr lang="fr-FR" sz="1900" dirty="0"/>
@@ -18033,11 +16428,7 @@
             </a:r>
             <a:r>
               <a:rPr lang="fr-FR" sz="1900" dirty="0" smtClean="0"/>
-              <a:t> </a:t>
-            </a:r>
-            <a:r>
-              <a:rPr lang="fr-FR" sz="1900" dirty="0" smtClean="0"/>
-              <a:t>Un </a:t>
+              <a:t> Un </a:t>
             </a:r>
             <a:r>
               <a:rPr lang="fr-FR" sz="1900" dirty="0" err="1" smtClean="0"/>
@@ -18097,15 +16488,7 @@
                   <a:srgbClr val="4A66AC"/>
                 </a:solidFill>
               </a:rPr>
-              <a:t> </a:t>
-            </a:r>
-            <a:r>
-              <a:rPr lang="fr-FR" dirty="0" smtClean="0">
-                <a:solidFill>
-                  <a:srgbClr val="4A66AC"/>
-                </a:solidFill>
-              </a:rPr>
-              <a:t>utilisées</a:t>
+              <a:t> utilisées</a:t>
             </a:r>
             <a:r>
               <a:rPr lang="fr-FR" sz="2200" dirty="0" smtClean="0">
@@ -18115,11 +16498,6 @@
               </a:rPr>
               <a:t>:</a:t>
             </a:r>
-            <a:endParaRPr lang="fr-FR" sz="2200" dirty="0" smtClean="0">
-              <a:solidFill>
-                <a:srgbClr val="4A66AC"/>
-              </a:solidFill>
-            </a:endParaRPr>
           </a:p>
           <a:p>
             <a:pPr lvl="2">
@@ -18136,11 +16514,7 @@
             </a:r>
             <a:r>
               <a:rPr lang="fr-FR" dirty="0"/>
-              <a:t> </a:t>
-            </a:r>
-            <a:r>
-              <a:rPr lang="fr-FR" dirty="0"/>
-              <a:t>—</a:t>
+              <a:t> —</a:t>
             </a:r>
             <a:r>
               <a:rPr lang="fr-FR" dirty="0" smtClean="0"/>
@@ -18207,15 +16581,7 @@
                   <a:srgbClr val="4A66AC"/>
                 </a:solidFill>
               </a:rPr>
-              <a:t> </a:t>
-            </a:r>
-            <a:r>
-              <a:rPr lang="fr-FR" sz="2000" b="1" dirty="0" smtClean="0">
-                <a:solidFill>
-                  <a:srgbClr val="4A66AC"/>
-                </a:solidFill>
-              </a:rPr>
-              <a:t>12</a:t>
+              <a:t> 12</a:t>
             </a:r>
             <a:r>
               <a:rPr lang="fr-FR" sz="2000" dirty="0">
@@ -19788,21 +18154,6 @@
 </file>
 
 <file path=customXml/item1.xml><?xml version="1.0" encoding="utf-8"?>
-<?mso-contentType ?>
-<FormTemplates xmlns="http://schemas.microsoft.com/sharepoint/v3/contenttype/forms">
-  <Display>DocumentLibraryForm</Display>
-  <Edit>DocumentLibraryForm</Edit>
-  <New>DocumentLibraryForm</New>
-</FormTemplates>
-</file>
-
-<file path=customXml/item2.xml><?xml version="1.0" encoding="utf-8"?>
-<p:properties xmlns:p="http://schemas.microsoft.com/office/2006/metadata/properties" xmlns:xsi="http://www.w3.org/2001/XMLSchema-instance" xmlns:pc="http://schemas.microsoft.com/office/infopath/2007/PartnerControls">
-  <documentManagement/>
-</p:properties>
-</file>
-
-<file path=customXml/item3.xml><?xml version="1.0" encoding="utf-8"?>
 <ct:contentTypeSchema xmlns:ct="http://schemas.microsoft.com/office/2006/metadata/contentType" xmlns:ma="http://schemas.microsoft.com/office/2006/metadata/properties/metaAttributes" ct:_="" ma:_="" ma:contentTypeName="Document" ma:contentTypeID="0x010100CA2FD6F1506F564BB79A97F9C245AD34" ma:contentTypeVersion="11" ma:contentTypeDescription="Create a new document." ma:contentTypeScope="" ma:versionID="62e164dc57e6337fb0bd5548eaf0c6d8">
   <xsd:schema xmlns:xsd="http://www.w3.org/2001/XMLSchema" xmlns:xs="http://www.w3.org/2001/XMLSchema" xmlns:p="http://schemas.microsoft.com/office/2006/metadata/properties" xmlns:ns3="386f4720-9db4-4950-8ffd-cd1ef4b846d5" xmlns:ns4="025efd7d-4e1d-49ec-b269-b81537660960" targetNamespace="http://schemas.microsoft.com/office/2006/metadata/properties" ma:root="true" ma:fieldsID="2653329da7d3ee0d0965a72fb4ee83ab" ns3:_="" ns4:_="">
     <xsd:import namespace="386f4720-9db4-4950-8ffd-cd1ef4b846d5"/>
@@ -20011,32 +18362,22 @@
 </ct:contentTypeSchema>
 </file>
 
-<file path=customXml/itemProps1.xml><?xml version="1.0" encoding="utf-8"?>
-<ds:datastoreItem xmlns:ds="http://schemas.openxmlformats.org/officeDocument/2006/customXml" ds:itemID="{FA2ECFDE-CCCD-4184-981F-FCB1A88E5D9B}">
-  <ds:schemaRefs>
-    <ds:schemaRef ds:uri="http://schemas.microsoft.com/sharepoint/v3/contenttype/forms"/>
-  </ds:schemaRefs>
-</ds:datastoreItem>
+<file path=customXml/item2.xml><?xml version="1.0" encoding="utf-8"?>
+<?mso-contentType ?>
+<FormTemplates xmlns="http://schemas.microsoft.com/sharepoint/v3/contenttype/forms">
+  <Display>DocumentLibraryForm</Display>
+  <Edit>DocumentLibraryForm</Edit>
+  <New>DocumentLibraryForm</New>
+</FormTemplates>
 </file>
 
-<file path=customXml/itemProps2.xml><?xml version="1.0" encoding="utf-8"?>
-<ds:datastoreItem xmlns:ds="http://schemas.openxmlformats.org/officeDocument/2006/customXml" ds:itemID="{F277AA4F-207B-4045-A452-6C98BA7AB2BD}">
-  <ds:schemaRefs>
-    <ds:schemaRef ds:uri="http://schemas.openxmlformats.org/package/2006/metadata/core-properties"/>
-    <ds:schemaRef ds:uri="http://purl.org/dc/dcmitype/"/>
-    <ds:schemaRef ds:uri="386f4720-9db4-4950-8ffd-cd1ef4b846d5"/>
-    <ds:schemaRef ds:uri="http://schemas.microsoft.com/office/2006/metadata/properties"/>
-    <ds:schemaRef ds:uri="http://purl.org/dc/terms/"/>
-    <ds:schemaRef ds:uri="http://schemas.microsoft.com/office/infopath/2007/PartnerControls"/>
-    <ds:schemaRef ds:uri="http://www.w3.org/XML/1998/namespace"/>
-    <ds:schemaRef ds:uri="http://schemas.microsoft.com/office/2006/documentManagement/types"/>
-    <ds:schemaRef ds:uri="025efd7d-4e1d-49ec-b269-b81537660960"/>
-    <ds:schemaRef ds:uri="http://purl.org/dc/elements/1.1/"/>
-  </ds:schemaRefs>
-</ds:datastoreItem>
+<file path=customXml/item3.xml><?xml version="1.0" encoding="utf-8"?>
+<p:properties xmlns:p="http://schemas.microsoft.com/office/2006/metadata/properties" xmlns:xsi="http://www.w3.org/2001/XMLSchema-instance" xmlns:pc="http://schemas.microsoft.com/office/infopath/2007/PartnerControls">
+  <documentManagement/>
+</p:properties>
 </file>
 
-<file path=customXml/itemProps3.xml><?xml version="1.0" encoding="utf-8"?>
+<file path=customXml/itemProps1.xml><?xml version="1.0" encoding="utf-8"?>
 <ds:datastoreItem xmlns:ds="http://schemas.openxmlformats.org/officeDocument/2006/customXml" ds:itemID="{92BA7C88-2CFC-403E-9565-3952D53463F0}">
   <ds:schemaRefs>
     <ds:schemaRef ds:uri="http://schemas.microsoft.com/office/2006/metadata/contentType"/>
@@ -20053,4 +18394,29 @@
     <ds:schemaRef ds:uri="http://schemas.microsoft.com/internal/obd"/>
   </ds:schemaRefs>
 </ds:datastoreItem>
+</file>
+
+<file path=customXml/itemProps2.xml><?xml version="1.0" encoding="utf-8"?>
+<ds:datastoreItem xmlns:ds="http://schemas.openxmlformats.org/officeDocument/2006/customXml" ds:itemID="{FA2ECFDE-CCCD-4184-981F-FCB1A88E5D9B}">
+  <ds:schemaRefs>
+    <ds:schemaRef ds:uri="http://schemas.microsoft.com/sharepoint/v3/contenttype/forms"/>
+  </ds:schemaRefs>
+</ds:datastoreItem>
+</file>
+
+<file path=customXml/itemProps3.xml><?xml version="1.0" encoding="utf-8"?>
+<ds:datastoreItem xmlns:ds="http://schemas.openxmlformats.org/officeDocument/2006/customXml" ds:itemID="{F277AA4F-207B-4045-A452-6C98BA7AB2BD}">
+  <ds:schemaRefs>
+    <ds:schemaRef ds:uri="http://schemas.openxmlformats.org/package/2006/metadata/core-properties"/>
+    <ds:schemaRef ds:uri="http://purl.org/dc/dcmitype/"/>
+    <ds:schemaRef ds:uri="386f4720-9db4-4950-8ffd-cd1ef4b846d5"/>
+    <ds:schemaRef ds:uri="http://schemas.microsoft.com/office/2006/metadata/properties"/>
+    <ds:schemaRef ds:uri="http://purl.org/dc/terms/"/>
+    <ds:schemaRef ds:uri="http://schemas.microsoft.com/office/infopath/2007/PartnerControls"/>
+    <ds:schemaRef ds:uri="http://www.w3.org/XML/1998/namespace"/>
+    <ds:schemaRef ds:uri="http://schemas.microsoft.com/office/2006/documentManagement/types"/>
+    <ds:schemaRef ds:uri="025efd7d-4e1d-49ec-b269-b81537660960"/>
+    <ds:schemaRef ds:uri="http://purl.org/dc/elements/1.1/"/>
+  </ds:schemaRefs>
+</ds:datastoreItem>
 </file>
</xml_diff>

<commit_message>
format code, change post page layout, use dto mappers wherever possible
</commit_message>
<xml_diff>
--- a/rapport.PPTX
+++ b/rapport.PPTX
@@ -389,7 +389,7 @@
           <a:p>
             <a:fld id="{8E9E7A7A-AB17-487C-9EC3-81C5DE33C772}" type="datetimeFigureOut">
               <a:rPr lang="fr-FR" smtClean="0"/>
-              <a:t>31/08/2021</a:t>
+              <a:t>03/09/2021</a:t>
             </a:fld>
             <a:endParaRPr lang="fr-FR"/>
           </a:p>
@@ -467,7 +467,7 @@
           <a:p>
             <a:fld id="{71F4787E-EE81-4ACC-921B-63D7167AD32A}" type="slidenum">
               <a:rPr lang="fr-FR" smtClean="0"/>
-              <a:t>‹N°›</a:t>
+              <a:t>‹#›</a:t>
             </a:fld>
             <a:endParaRPr lang="fr-FR"/>
           </a:p>
@@ -567,7 +567,7 @@
           <a:p>
             <a:fld id="{4A3D6330-6607-4266-91C5-92E4A45F29CC}" type="datetimeFigureOut">
               <a:rPr lang="fr-FR" smtClean="0"/>
-              <a:t>31/08/2021</a:t>
+              <a:t>03/09/2021</a:t>
             </a:fld>
             <a:endParaRPr lang="fr-FR"/>
           </a:p>
@@ -726,7 +726,7 @@
           <a:p>
             <a:fld id="{CA344FEA-621B-4B81-A1B3-BC018540DB26}" type="slidenum">
               <a:rPr lang="fr-FR" smtClean="0"/>
-              <a:t>‹N°›</a:t>
+              <a:t>‹#›</a:t>
             </a:fld>
             <a:endParaRPr lang="fr-FR"/>
           </a:p>
@@ -1702,7 +1702,7 @@
           </a:lstStyle>
           <a:p>
             <a:r>
-              <a:rPr lang="fr-FR" smtClean="0"/>
+              <a:rPr lang="fr-FR"/>
               <a:t>Modifiez le style du titre</a:t>
             </a:r>
             <a:endParaRPr lang="en-US" dirty="0"/>
@@ -1773,7 +1773,7 @@
           </a:lstStyle>
           <a:p>
             <a:r>
-              <a:rPr lang="fr-FR" smtClean="0"/>
+              <a:rPr lang="fr-FR"/>
               <a:t>Modifier le style des sous-titres du masque</a:t>
             </a:r>
             <a:endParaRPr lang="en-US" dirty="0"/>
@@ -1805,7 +1805,7 @@
           <a:p>
             <a:fld id="{FF5FEE95-2E83-4D45-987C-F0DA7B5E64B4}" type="datetime1">
               <a:rPr lang="fr-FR" smtClean="0"/>
-              <a:t>31/08/2021</a:t>
+              <a:t>03/09/2021</a:t>
             </a:fld>
             <a:endParaRPr lang="fr-FR"/>
           </a:p>
@@ -1863,7 +1863,7 @@
           <a:p>
             <a:fld id="{C52ED629-2BC0-4D25-969E-9ED78B40D7C7}" type="slidenum">
               <a:rPr lang="fr-FR" smtClean="0"/>
-              <a:t>‹N°›</a:t>
+              <a:t>‹#›</a:t>
             </a:fld>
             <a:endParaRPr lang="fr-FR"/>
           </a:p>
@@ -1951,7 +1951,7 @@
           <a:lstStyle/>
           <a:p>
             <a:r>
-              <a:rPr lang="fr-FR" smtClean="0"/>
+              <a:rPr lang="fr-FR"/>
               <a:t>Modifiez le style du titre</a:t>
             </a:r>
             <a:endParaRPr lang="en-US" dirty="0"/>
@@ -1975,35 +1975,35 @@
           <a:p>
             <a:pPr lvl="0"/>
             <a:r>
-              <a:rPr lang="fr-FR" smtClean="0"/>
+              <a:rPr lang="fr-FR"/>
               <a:t>Modifier les styles du texte du masque</a:t>
             </a:r>
           </a:p>
           <a:p>
             <a:pPr lvl="1"/>
             <a:r>
-              <a:rPr lang="fr-FR" smtClean="0"/>
+              <a:rPr lang="fr-FR"/>
               <a:t>Deuxième niveau</a:t>
             </a:r>
           </a:p>
           <a:p>
             <a:pPr lvl="2"/>
             <a:r>
-              <a:rPr lang="fr-FR" smtClean="0"/>
+              <a:rPr lang="fr-FR"/>
               <a:t>Troisième niveau</a:t>
             </a:r>
           </a:p>
           <a:p>
             <a:pPr lvl="3"/>
             <a:r>
-              <a:rPr lang="fr-FR" smtClean="0"/>
+              <a:rPr lang="fr-FR"/>
               <a:t>Quatrième niveau</a:t>
             </a:r>
           </a:p>
           <a:p>
             <a:pPr lvl="4"/>
             <a:r>
-              <a:rPr lang="fr-FR" smtClean="0"/>
+              <a:rPr lang="fr-FR"/>
               <a:t>Cinquième niveau</a:t>
             </a:r>
             <a:endParaRPr lang="en-US" dirty="0"/>
@@ -2027,7 +2027,7 @@
           <a:p>
             <a:fld id="{FF5FEE95-2E83-4D45-987C-F0DA7B5E64B4}" type="datetime1">
               <a:rPr lang="fr-FR" smtClean="0"/>
-              <a:t>31/08/2021</a:t>
+              <a:t>03/09/2021</a:t>
             </a:fld>
             <a:endParaRPr lang="fr-FR"/>
           </a:p>
@@ -2069,7 +2069,7 @@
           <a:p>
             <a:fld id="{C52ED629-2BC0-4D25-969E-9ED78B40D7C7}" type="slidenum">
               <a:rPr lang="fr-FR" smtClean="0"/>
-              <a:t>‹N°›</a:t>
+              <a:t>‹#›</a:t>
             </a:fld>
             <a:endParaRPr lang="fr-FR"/>
           </a:p>
@@ -2127,7 +2127,7 @@
           <a:lstStyle/>
           <a:p>
             <a:r>
-              <a:rPr lang="fr-FR" smtClean="0"/>
+              <a:rPr lang="fr-FR"/>
               <a:t>Modifiez le style du titre</a:t>
             </a:r>
             <a:endParaRPr lang="en-US" dirty="0"/>
@@ -2156,35 +2156,35 @@
           <a:p>
             <a:pPr lvl="0"/>
             <a:r>
-              <a:rPr lang="fr-FR" smtClean="0"/>
+              <a:rPr lang="fr-FR"/>
               <a:t>Modifier les styles du texte du masque</a:t>
             </a:r>
           </a:p>
           <a:p>
             <a:pPr lvl="1"/>
             <a:r>
-              <a:rPr lang="fr-FR" smtClean="0"/>
+              <a:rPr lang="fr-FR"/>
               <a:t>Deuxième niveau</a:t>
             </a:r>
           </a:p>
           <a:p>
             <a:pPr lvl="2"/>
             <a:r>
-              <a:rPr lang="fr-FR" smtClean="0"/>
+              <a:rPr lang="fr-FR"/>
               <a:t>Troisième niveau</a:t>
             </a:r>
           </a:p>
           <a:p>
             <a:pPr lvl="3"/>
             <a:r>
-              <a:rPr lang="fr-FR" smtClean="0"/>
+              <a:rPr lang="fr-FR"/>
               <a:t>Quatrième niveau</a:t>
             </a:r>
           </a:p>
           <a:p>
             <a:pPr lvl="4"/>
             <a:r>
-              <a:rPr lang="fr-FR" smtClean="0"/>
+              <a:rPr lang="fr-FR"/>
               <a:t>Cinquième niveau</a:t>
             </a:r>
             <a:endParaRPr lang="en-US" dirty="0"/>
@@ -2208,7 +2208,7 @@
           <a:p>
             <a:fld id="{FF5FEE95-2E83-4D45-987C-F0DA7B5E64B4}" type="datetime1">
               <a:rPr lang="fr-FR" smtClean="0"/>
-              <a:t>31/08/2021</a:t>
+              <a:t>03/09/2021</a:t>
             </a:fld>
             <a:endParaRPr lang="fr-FR"/>
           </a:p>
@@ -2250,7 +2250,7 @@
           <a:p>
             <a:fld id="{C52ED629-2BC0-4D25-969E-9ED78B40D7C7}" type="slidenum">
               <a:rPr lang="fr-FR" smtClean="0"/>
-              <a:t>‹N°›</a:t>
+              <a:t>‹#›</a:t>
             </a:fld>
             <a:endParaRPr lang="fr-FR"/>
           </a:p>
@@ -2303,7 +2303,7 @@
           <a:lstStyle/>
           <a:p>
             <a:r>
-              <a:rPr lang="fr-FR" smtClean="0"/>
+              <a:rPr lang="fr-FR"/>
               <a:t>Modifiez le style du titre</a:t>
             </a:r>
             <a:endParaRPr lang="en-US" dirty="0"/>
@@ -2327,35 +2327,35 @@
           <a:p>
             <a:pPr lvl="0"/>
             <a:r>
-              <a:rPr lang="fr-FR" smtClean="0"/>
+              <a:rPr lang="fr-FR"/>
               <a:t>Modifier les styles du texte du masque</a:t>
             </a:r>
           </a:p>
           <a:p>
             <a:pPr lvl="1"/>
             <a:r>
-              <a:rPr lang="fr-FR" smtClean="0"/>
+              <a:rPr lang="fr-FR"/>
               <a:t>Deuxième niveau</a:t>
             </a:r>
           </a:p>
           <a:p>
             <a:pPr lvl="2"/>
             <a:r>
-              <a:rPr lang="fr-FR" smtClean="0"/>
+              <a:rPr lang="fr-FR"/>
               <a:t>Troisième niveau</a:t>
             </a:r>
           </a:p>
           <a:p>
             <a:pPr lvl="3"/>
             <a:r>
-              <a:rPr lang="fr-FR" smtClean="0"/>
+              <a:rPr lang="fr-FR"/>
               <a:t>Quatrième niveau</a:t>
             </a:r>
           </a:p>
           <a:p>
             <a:pPr lvl="4"/>
             <a:r>
-              <a:rPr lang="fr-FR" smtClean="0"/>
+              <a:rPr lang="fr-FR"/>
               <a:t>Cinquième niveau</a:t>
             </a:r>
             <a:endParaRPr lang="en-US" dirty="0"/>
@@ -2379,7 +2379,7 @@
           <a:p>
             <a:fld id="{FF5FEE95-2E83-4D45-987C-F0DA7B5E64B4}" type="datetime1">
               <a:rPr lang="fr-FR" smtClean="0"/>
-              <a:t>31/08/2021</a:t>
+              <a:t>03/09/2021</a:t>
             </a:fld>
             <a:endParaRPr lang="fr-FR"/>
           </a:p>
@@ -2421,7 +2421,7 @@
           <a:p>
             <a:fld id="{C52ED629-2BC0-4D25-969E-9ED78B40D7C7}" type="slidenum">
               <a:rPr lang="fr-FR" smtClean="0"/>
-              <a:t>‹N°›</a:t>
+              <a:t>‹#›</a:t>
             </a:fld>
             <a:endParaRPr lang="fr-FR"/>
           </a:p>
@@ -2488,7 +2488,7 @@
           </a:lstStyle>
           <a:p>
             <a:r>
-              <a:rPr lang="fr-FR" smtClean="0"/>
+              <a:rPr lang="fr-FR"/>
               <a:t>Modifiez le style du titre</a:t>
             </a:r>
             <a:endParaRPr lang="en-US" dirty="0"/>
@@ -2608,7 +2608,7 @@
           <a:p>
             <a:pPr lvl="0"/>
             <a:r>
-              <a:rPr lang="fr-FR" smtClean="0"/>
+              <a:rPr lang="fr-FR"/>
               <a:t>Modifier les styles du texte du masque</a:t>
             </a:r>
           </a:p>
@@ -2631,7 +2631,7 @@
           <a:p>
             <a:fld id="{FF5FEE95-2E83-4D45-987C-F0DA7B5E64B4}" type="datetime1">
               <a:rPr lang="fr-FR" smtClean="0"/>
-              <a:t>31/08/2021</a:t>
+              <a:t>03/09/2021</a:t>
             </a:fld>
             <a:endParaRPr lang="fr-FR"/>
           </a:p>
@@ -2673,7 +2673,7 @@
           <a:p>
             <a:fld id="{C52ED629-2BC0-4D25-969E-9ED78B40D7C7}" type="slidenum">
               <a:rPr lang="fr-FR" smtClean="0"/>
-              <a:t>‹N°›</a:t>
+              <a:t>‹#›</a:t>
             </a:fld>
             <a:endParaRPr lang="fr-FR"/>
           </a:p>
@@ -2761,7 +2761,7 @@
           <a:lstStyle/>
           <a:p>
             <a:r>
-              <a:rPr lang="fr-FR" smtClean="0"/>
+              <a:rPr lang="fr-FR"/>
               <a:t>Modifiez le style du titre</a:t>
             </a:r>
             <a:endParaRPr lang="en-US" dirty="0"/>
@@ -2818,35 +2818,35 @@
           <a:p>
             <a:pPr lvl="0"/>
             <a:r>
-              <a:rPr lang="fr-FR" smtClean="0"/>
+              <a:rPr lang="fr-FR"/>
               <a:t>Modifier les styles du texte du masque</a:t>
             </a:r>
           </a:p>
           <a:p>
             <a:pPr lvl="1"/>
             <a:r>
-              <a:rPr lang="fr-FR" smtClean="0"/>
+              <a:rPr lang="fr-FR"/>
               <a:t>Deuxième niveau</a:t>
             </a:r>
           </a:p>
           <a:p>
             <a:pPr lvl="2"/>
             <a:r>
-              <a:rPr lang="fr-FR" smtClean="0"/>
+              <a:rPr lang="fr-FR"/>
               <a:t>Troisième niveau</a:t>
             </a:r>
           </a:p>
           <a:p>
             <a:pPr lvl="3"/>
             <a:r>
-              <a:rPr lang="fr-FR" smtClean="0"/>
+              <a:rPr lang="fr-FR"/>
               <a:t>Quatrième niveau</a:t>
             </a:r>
           </a:p>
           <a:p>
             <a:pPr lvl="4"/>
             <a:r>
-              <a:rPr lang="fr-FR" smtClean="0"/>
+              <a:rPr lang="fr-FR"/>
               <a:t>Cinquième niveau</a:t>
             </a:r>
             <a:endParaRPr lang="en-US" dirty="0"/>
@@ -2903,35 +2903,35 @@
           <a:p>
             <a:pPr lvl="0"/>
             <a:r>
-              <a:rPr lang="fr-FR" smtClean="0"/>
+              <a:rPr lang="fr-FR"/>
               <a:t>Modifier les styles du texte du masque</a:t>
             </a:r>
           </a:p>
           <a:p>
             <a:pPr lvl="1"/>
             <a:r>
-              <a:rPr lang="fr-FR" smtClean="0"/>
+              <a:rPr lang="fr-FR"/>
               <a:t>Deuxième niveau</a:t>
             </a:r>
           </a:p>
           <a:p>
             <a:pPr lvl="2"/>
             <a:r>
-              <a:rPr lang="fr-FR" smtClean="0"/>
+              <a:rPr lang="fr-FR"/>
               <a:t>Troisième niveau</a:t>
             </a:r>
           </a:p>
           <a:p>
             <a:pPr lvl="3"/>
             <a:r>
-              <a:rPr lang="fr-FR" smtClean="0"/>
+              <a:rPr lang="fr-FR"/>
               <a:t>Quatrième niveau</a:t>
             </a:r>
           </a:p>
           <a:p>
             <a:pPr lvl="4"/>
             <a:r>
-              <a:rPr lang="fr-FR" smtClean="0"/>
+              <a:rPr lang="fr-FR"/>
               <a:t>Cinquième niveau</a:t>
             </a:r>
             <a:endParaRPr lang="en-US" dirty="0"/>
@@ -2955,7 +2955,7 @@
           <a:p>
             <a:fld id="{FF5FEE95-2E83-4D45-987C-F0DA7B5E64B4}" type="datetime1">
               <a:rPr lang="fr-FR" smtClean="0"/>
-              <a:t>31/08/2021</a:t>
+              <a:t>03/09/2021</a:t>
             </a:fld>
             <a:endParaRPr lang="fr-FR"/>
           </a:p>
@@ -2997,7 +2997,7 @@
           <a:p>
             <a:fld id="{C52ED629-2BC0-4D25-969E-9ED78B40D7C7}" type="slidenum">
               <a:rPr lang="fr-FR" smtClean="0"/>
-              <a:t>‹N°›</a:t>
+              <a:t>‹#›</a:t>
             </a:fld>
             <a:endParaRPr lang="fr-FR"/>
           </a:p>
@@ -3050,7 +3050,7 @@
           <a:lstStyle/>
           <a:p>
             <a:r>
-              <a:rPr lang="fr-FR" smtClean="0"/>
+              <a:rPr lang="fr-FR"/>
               <a:t>Modifiez le style du titre</a:t>
             </a:r>
             <a:endParaRPr lang="en-US" dirty="0"/>
@@ -3119,7 +3119,7 @@
           <a:p>
             <a:pPr lvl="0"/>
             <a:r>
-              <a:rPr lang="fr-FR" smtClean="0"/>
+              <a:rPr lang="fr-FR"/>
               <a:t>Modifier les styles du texte du masque</a:t>
             </a:r>
           </a:p>
@@ -3175,35 +3175,35 @@
           <a:p>
             <a:pPr lvl="0"/>
             <a:r>
-              <a:rPr lang="fr-FR" smtClean="0"/>
+              <a:rPr lang="fr-FR"/>
               <a:t>Modifier les styles du texte du masque</a:t>
             </a:r>
           </a:p>
           <a:p>
             <a:pPr lvl="1"/>
             <a:r>
-              <a:rPr lang="fr-FR" smtClean="0"/>
+              <a:rPr lang="fr-FR"/>
               <a:t>Deuxième niveau</a:t>
             </a:r>
           </a:p>
           <a:p>
             <a:pPr lvl="2"/>
             <a:r>
-              <a:rPr lang="fr-FR" smtClean="0"/>
+              <a:rPr lang="fr-FR"/>
               <a:t>Troisième niveau</a:t>
             </a:r>
           </a:p>
           <a:p>
             <a:pPr lvl="3"/>
             <a:r>
-              <a:rPr lang="fr-FR" smtClean="0"/>
+              <a:rPr lang="fr-FR"/>
               <a:t>Quatrième niveau</a:t>
             </a:r>
           </a:p>
           <a:p>
             <a:pPr lvl="4"/>
             <a:r>
-              <a:rPr lang="fr-FR" smtClean="0"/>
+              <a:rPr lang="fr-FR"/>
               <a:t>Cinquième niveau</a:t>
             </a:r>
             <a:endParaRPr lang="en-US" dirty="0"/>
@@ -3272,7 +3272,7 @@
           <a:p>
             <a:pPr lvl="0"/>
             <a:r>
-              <a:rPr lang="fr-FR" smtClean="0"/>
+              <a:rPr lang="fr-FR"/>
               <a:t>Modifier les styles du texte du masque</a:t>
             </a:r>
           </a:p>
@@ -3328,35 +3328,35 @@
           <a:p>
             <a:pPr lvl="0"/>
             <a:r>
-              <a:rPr lang="fr-FR" smtClean="0"/>
+              <a:rPr lang="fr-FR"/>
               <a:t>Modifier les styles du texte du masque</a:t>
             </a:r>
           </a:p>
           <a:p>
             <a:pPr lvl="1"/>
             <a:r>
-              <a:rPr lang="fr-FR" smtClean="0"/>
+              <a:rPr lang="fr-FR"/>
               <a:t>Deuxième niveau</a:t>
             </a:r>
           </a:p>
           <a:p>
             <a:pPr lvl="2"/>
             <a:r>
-              <a:rPr lang="fr-FR" smtClean="0"/>
+              <a:rPr lang="fr-FR"/>
               <a:t>Troisième niveau</a:t>
             </a:r>
           </a:p>
           <a:p>
             <a:pPr lvl="3"/>
             <a:r>
-              <a:rPr lang="fr-FR" smtClean="0"/>
+              <a:rPr lang="fr-FR"/>
               <a:t>Quatrième niveau</a:t>
             </a:r>
           </a:p>
           <a:p>
             <a:pPr lvl="4"/>
             <a:r>
-              <a:rPr lang="fr-FR" smtClean="0"/>
+              <a:rPr lang="fr-FR"/>
               <a:t>Cinquième niveau</a:t>
             </a:r>
             <a:endParaRPr lang="en-US" dirty="0"/>
@@ -3380,7 +3380,7 @@
           <a:p>
             <a:fld id="{FF5FEE95-2E83-4D45-987C-F0DA7B5E64B4}" type="datetime1">
               <a:rPr lang="fr-FR" smtClean="0"/>
-              <a:t>31/08/2021</a:t>
+              <a:t>03/09/2021</a:t>
             </a:fld>
             <a:endParaRPr lang="fr-FR"/>
           </a:p>
@@ -3422,7 +3422,7 @@
           <a:p>
             <a:fld id="{C52ED629-2BC0-4D25-969E-9ED78B40D7C7}" type="slidenum">
               <a:rPr lang="fr-FR" smtClean="0"/>
-              <a:t>‹N°›</a:t>
+              <a:t>‹#›</a:t>
             </a:fld>
             <a:endParaRPr lang="fr-FR"/>
           </a:p>
@@ -3475,7 +3475,7 @@
           <a:lstStyle/>
           <a:p>
             <a:r>
-              <a:rPr lang="fr-FR" smtClean="0"/>
+              <a:rPr lang="fr-FR"/>
               <a:t>Modifiez le style du titre</a:t>
             </a:r>
             <a:endParaRPr lang="en-US" dirty="0"/>
@@ -3499,7 +3499,7 @@
           <a:p>
             <a:fld id="{FF5FEE95-2E83-4D45-987C-F0DA7B5E64B4}" type="datetime1">
               <a:rPr lang="fr-FR" smtClean="0"/>
-              <a:t>31/08/2021</a:t>
+              <a:t>03/09/2021</a:t>
             </a:fld>
             <a:endParaRPr lang="fr-FR"/>
           </a:p>
@@ -3541,7 +3541,7 @@
           <a:p>
             <a:fld id="{C52ED629-2BC0-4D25-969E-9ED78B40D7C7}" type="slidenum">
               <a:rPr lang="fr-FR" smtClean="0"/>
-              <a:t>‹N°›</a:t>
+              <a:t>‹#›</a:t>
             </a:fld>
             <a:endParaRPr lang="fr-FR"/>
           </a:p>
@@ -3595,7 +3595,7 @@
           <a:p>
             <a:fld id="{FF5FEE95-2E83-4D45-987C-F0DA7B5E64B4}" type="datetime1">
               <a:rPr lang="fr-FR" smtClean="0"/>
-              <a:t>31/08/2021</a:t>
+              <a:t>03/09/2021</a:t>
             </a:fld>
             <a:endParaRPr lang="fr-FR"/>
           </a:p>
@@ -3637,7 +3637,7 @@
           <a:p>
             <a:fld id="{C52ED629-2BC0-4D25-969E-9ED78B40D7C7}" type="slidenum">
               <a:rPr lang="fr-FR" smtClean="0"/>
-              <a:t>‹N°›</a:t>
+              <a:t>‹#›</a:t>
             </a:fld>
             <a:endParaRPr lang="fr-FR"/>
           </a:p>
@@ -3704,7 +3704,7 @@
           </a:lstStyle>
           <a:p>
             <a:r>
-              <a:rPr lang="fr-FR" smtClean="0"/>
+              <a:rPr lang="fr-FR"/>
               <a:t>Modifiez le style du titre</a:t>
             </a:r>
             <a:endParaRPr lang="en-US" dirty="0"/>
@@ -3761,35 +3761,35 @@
           <a:p>
             <a:pPr lvl="0"/>
             <a:r>
-              <a:rPr lang="fr-FR" smtClean="0"/>
+              <a:rPr lang="fr-FR"/>
               <a:t>Modifier les styles du texte du masque</a:t>
             </a:r>
           </a:p>
           <a:p>
             <a:pPr lvl="1"/>
             <a:r>
-              <a:rPr lang="fr-FR" smtClean="0"/>
+              <a:rPr lang="fr-FR"/>
               <a:t>Deuxième niveau</a:t>
             </a:r>
           </a:p>
           <a:p>
             <a:pPr lvl="2"/>
             <a:r>
-              <a:rPr lang="fr-FR" smtClean="0"/>
+              <a:rPr lang="fr-FR"/>
               <a:t>Troisième niveau</a:t>
             </a:r>
           </a:p>
           <a:p>
             <a:pPr lvl="3"/>
             <a:r>
-              <a:rPr lang="fr-FR" smtClean="0"/>
+              <a:rPr lang="fr-FR"/>
               <a:t>Quatrième niveau</a:t>
             </a:r>
           </a:p>
           <a:p>
             <a:pPr lvl="4"/>
             <a:r>
-              <a:rPr lang="fr-FR" smtClean="0"/>
+              <a:rPr lang="fr-FR"/>
               <a:t>Cinquième niveau</a:t>
             </a:r>
             <a:endParaRPr lang="en-US" dirty="0"/>
@@ -3863,7 +3863,7 @@
           <a:p>
             <a:pPr lvl="0"/>
             <a:r>
-              <a:rPr lang="fr-FR" smtClean="0"/>
+              <a:rPr lang="fr-FR"/>
               <a:t>Modifier les styles du texte du masque</a:t>
             </a:r>
           </a:p>
@@ -3886,7 +3886,7 @@
           <a:p>
             <a:fld id="{FF5FEE95-2E83-4D45-987C-F0DA7B5E64B4}" type="datetime1">
               <a:rPr lang="fr-FR" smtClean="0"/>
-              <a:t>31/08/2021</a:t>
+              <a:t>03/09/2021</a:t>
             </a:fld>
             <a:endParaRPr lang="fr-FR"/>
           </a:p>
@@ -3928,7 +3928,7 @@
           <a:p>
             <a:fld id="{C52ED629-2BC0-4D25-969E-9ED78B40D7C7}" type="slidenum">
               <a:rPr lang="fr-FR" smtClean="0"/>
-              <a:t>‹N°›</a:t>
+              <a:t>‹#›</a:t>
             </a:fld>
             <a:endParaRPr lang="fr-FR"/>
           </a:p>
@@ -3995,7 +3995,7 @@
           </a:lstStyle>
           <a:p>
             <a:r>
-              <a:rPr lang="fr-FR" smtClean="0"/>
+              <a:rPr lang="fr-FR"/>
               <a:t>Modifiez le style du titre</a:t>
             </a:r>
             <a:endParaRPr lang="en-US" dirty="0"/>
@@ -4062,7 +4062,7 @@
           </a:lstStyle>
           <a:p>
             <a:r>
-              <a:rPr lang="fr-FR" smtClean="0"/>
+              <a:rPr lang="fr-FR"/>
               <a:t>Cliquez sur l'icône pour ajouter une image</a:t>
             </a:r>
             <a:endParaRPr lang="en-US" dirty="0"/>
@@ -4136,7 +4136,7 @@
           <a:p>
             <a:pPr lvl="0"/>
             <a:r>
-              <a:rPr lang="fr-FR" smtClean="0"/>
+              <a:rPr lang="fr-FR"/>
               <a:t>Modifier les styles du texte du masque</a:t>
             </a:r>
           </a:p>
@@ -4159,7 +4159,7 @@
           <a:p>
             <a:fld id="{FF5FEE95-2E83-4D45-987C-F0DA7B5E64B4}" type="datetime1">
               <a:rPr lang="fr-FR" smtClean="0"/>
-              <a:t>31/08/2021</a:t>
+              <a:t>03/09/2021</a:t>
             </a:fld>
             <a:endParaRPr lang="fr-FR"/>
           </a:p>
@@ -4201,7 +4201,7 @@
           <a:p>
             <a:fld id="{C52ED629-2BC0-4D25-969E-9ED78B40D7C7}" type="slidenum">
               <a:rPr lang="fr-FR" smtClean="0"/>
-              <a:t>‹N°›</a:t>
+              <a:t>‹#›</a:t>
             </a:fld>
             <a:endParaRPr lang="fr-FR"/>
           </a:p>
@@ -4312,7 +4312,7 @@
           <a:lstStyle/>
           <a:p>
             <a:r>
-              <a:rPr lang="fr-FR" smtClean="0"/>
+              <a:rPr lang="fr-FR"/>
               <a:t>Modifiez le style du titre</a:t>
             </a:r>
             <a:endParaRPr lang="en-US" dirty="0"/>
@@ -4346,35 +4346,35 @@
           <a:p>
             <a:pPr lvl="0"/>
             <a:r>
-              <a:rPr lang="fr-FR" smtClean="0"/>
+              <a:rPr lang="fr-FR"/>
               <a:t>Modifier les styles du texte du masque</a:t>
             </a:r>
           </a:p>
           <a:p>
             <a:pPr lvl="1"/>
             <a:r>
-              <a:rPr lang="fr-FR" smtClean="0"/>
+              <a:rPr lang="fr-FR"/>
               <a:t>Deuxième niveau</a:t>
             </a:r>
           </a:p>
           <a:p>
             <a:pPr lvl="2"/>
             <a:r>
-              <a:rPr lang="fr-FR" smtClean="0"/>
+              <a:rPr lang="fr-FR"/>
               <a:t>Troisième niveau</a:t>
             </a:r>
           </a:p>
           <a:p>
             <a:pPr lvl="3"/>
             <a:r>
-              <a:rPr lang="fr-FR" smtClean="0"/>
+              <a:rPr lang="fr-FR"/>
               <a:t>Quatrième niveau</a:t>
             </a:r>
           </a:p>
           <a:p>
             <a:pPr lvl="4"/>
             <a:r>
-              <a:rPr lang="fr-FR" smtClean="0"/>
+              <a:rPr lang="fr-FR"/>
               <a:t>Cinquième niveau</a:t>
             </a:r>
             <a:endParaRPr lang="en-US" dirty="0"/>
@@ -4414,7 +4414,7 @@
           <a:p>
             <a:fld id="{FF5FEE95-2E83-4D45-987C-F0DA7B5E64B4}" type="datetime1">
               <a:rPr lang="fr-FR" smtClean="0"/>
-              <a:t>31/08/2021</a:t>
+              <a:t>03/09/2021</a:t>
             </a:fld>
             <a:endParaRPr lang="fr-FR"/>
           </a:p>
@@ -4488,7 +4488,7 @@
           <a:p>
             <a:fld id="{C52ED629-2BC0-4D25-969E-9ED78B40D7C7}" type="slidenum">
               <a:rPr lang="fr-FR" smtClean="0"/>
-              <a:t>‹N°›</a:t>
+              <a:t>‹#›</a:t>
             </a:fld>
             <a:endParaRPr lang="fr-FR"/>
           </a:p>
@@ -4906,10 +4906,6 @@
             <a:br>
               <a:rPr lang="fr-FR" sz="3200" dirty="0"/>
             </a:br>
-            <a:r>
-              <a:rPr lang="fr-FR" sz="3200" dirty="0"/>
-              <a:t/>
-            </a:r>
             <a:br>
               <a:rPr lang="fr-FR" sz="3200" dirty="0"/>
             </a:br>
@@ -4949,36 +4945,23 @@
           <a:p>
             <a:r>
               <a:rPr lang="fr-FR" sz="2400" dirty="0"/>
-              <a:t>Du </a:t>
-            </a:r>
-            <a:r>
-              <a:rPr lang="fr-FR" sz="2400" dirty="0" smtClean="0"/>
-              <a:t>16 </a:t>
-            </a:r>
-            <a:r>
-              <a:rPr lang="fr-FR" sz="2400" dirty="0" err="1" smtClean="0"/>
+              <a:t>Du 16 </a:t>
+            </a:r>
+            <a:r>
+              <a:rPr lang="fr-FR" sz="2400" dirty="0" err="1"/>
               <a:t>decembre</a:t>
             </a:r>
             <a:r>
-              <a:rPr lang="fr-FR" sz="2400" dirty="0" smtClean="0"/>
-              <a:t> 2020 </a:t>
-            </a:r>
-            <a:r>
               <a:rPr lang="fr-FR" sz="2400" dirty="0"/>
-              <a:t>au </a:t>
-            </a:r>
-            <a:r>
-              <a:rPr lang="fr-FR" sz="2400" dirty="0" smtClean="0"/>
-              <a:t>31 aout 2021</a:t>
+              <a:t> 2020 au 31 aout 2021</a:t>
             </a:r>
             <a:endParaRPr lang="fr-FR" dirty="0"/>
           </a:p>
           <a:p>
             <a:r>
-              <a:rPr lang="fr-FR" dirty="0" smtClean="0"/>
+              <a:rPr lang="fr-FR" dirty="0"/>
               <a:t>Vladislav PITENTII</a:t>
             </a:r>
-            <a:endParaRPr lang="fr-FR" dirty="0"/>
           </a:p>
         </p:txBody>
       </p:sp>
@@ -5040,14 +5023,6 @@
           </a:bodyPr>
           <a:lstStyle/>
           <a:p>
-            <a:r>
-              <a:rPr lang="fr-FR" sz="1400" dirty="0">
-                <a:solidFill>
-                  <a:schemeClr val="bg1"/>
-                </a:solidFill>
-              </a:rPr>
-              <a:t/>
-            </a:r>
             <a:br>
               <a:rPr lang="fr-FR" sz="1400" dirty="0">
                 <a:solidFill>
@@ -5061,21 +5036,8 @@
                   <a:schemeClr val="bg1"/>
                 </a:solidFill>
               </a:rPr>
-              <a:t>Centre de formation : </a:t>
-            </a:r>
-            <a:r>
-              <a:rPr lang="fr-FR" sz="1400" dirty="0" smtClean="0">
-                <a:solidFill>
-                  <a:schemeClr val="bg1"/>
-                </a:solidFill>
-              </a:rPr>
-              <a:t>AFPA, Paris Politzer 75012</a:t>
-            </a:r>
-            <a:endParaRPr lang="fr-FR" sz="1400" dirty="0">
-              <a:solidFill>
-                <a:schemeClr val="bg1"/>
-              </a:solidFill>
-            </a:endParaRPr>
+              <a:t>Centre de formation : AFPA, Paris Politzer 75012</a:t>
+            </a:r>
           </a:p>
         </p:txBody>
       </p:sp>
@@ -5176,13 +5138,6 @@
   <p:clrMapOvr>
     <a:masterClrMapping/>
   </p:clrMapOvr>
-  <p:timing>
-    <p:tnLst>
-      <p:par>
-        <p:cTn id="1" dur="indefinite" restart="never" nodeType="tmRoot"/>
-      </p:par>
-    </p:tnLst>
-  </p:timing>
 </p:sld>
 </file>
 
@@ -5279,16 +5234,12 @@
             </a:r>
             <a:r>
               <a:rPr lang="fr-FR" dirty="0"/>
-              <a:t> </a:t>
-            </a:r>
-            <a:r>
-              <a:rPr lang="fr-FR" dirty="0" smtClean="0"/>
-              <a:t>versions :</a:t>
+              <a:t> versions :</a:t>
             </a:r>
             <a:br>
-              <a:rPr lang="fr-FR" dirty="0" smtClean="0"/>
+              <a:rPr lang="fr-FR" dirty="0"/>
             </a:br>
-            <a:endParaRPr lang="fr-FR" dirty="0" smtClean="0"/>
+            <a:endParaRPr lang="fr-FR" dirty="0"/>
           </a:p>
           <a:p>
             <a:pPr lvl="1">
@@ -5296,12 +5247,8 @@
               <a:buChar char="§"/>
             </a:pPr>
             <a:r>
-              <a:rPr lang="fr-FR" dirty="0" smtClean="0"/>
-              <a:t>Squelette </a:t>
-            </a:r>
-            <a:r>
               <a:rPr lang="fr-FR" dirty="0"/>
-              <a:t>de base du projet. Interfaces requises, composants pour la page de connexion, la page d'inscription, la page d'accueil et la page de profil. Services pour les composants qui doivent communiquer avec le </a:t>
+              <a:t>Squelette de base du projet. Interfaces requises, composants pour la page de connexion, la page d'inscription, la page d'accueil et la page de profil. Services pour les composants qui doivent communiquer avec le </a:t>
             </a:r>
             <a:r>
               <a:rPr lang="fr-FR" dirty="0" err="1"/>
@@ -5368,12 +5315,8 @@
               <a:buChar char="§"/>
             </a:pPr>
             <a:r>
-              <a:rPr lang="fr-FR" dirty="0" smtClean="0"/>
-              <a:t>Ajout </a:t>
-            </a:r>
-            <a:r>
               <a:rPr lang="fr-FR" dirty="0"/>
-              <a:t>d'un gestionnaire d'exception pour gérer les exceptions qui sont lancées par l'application pendant le traitement des demandes, ce qui permet au client de recevoir des erreurs d'api lisibles par l'homme.</a:t>
+              <a:t>Ajout d'un gestionnaire d'exception pour gérer les exceptions qui sont lancées par l'application pendant le traitement des demandes, ce qui permet au client de recevoir des erreurs d'api lisibles par l'homme.</a:t>
             </a:r>
             <a:br>
               <a:rPr lang="fr-FR" dirty="0"/>
@@ -5386,20 +5329,8 @@
               <a:buChar char="§"/>
             </a:pPr>
             <a:r>
-              <a:rPr lang="fr-FR" dirty="0" smtClean="0"/>
-              <a:t>Ajouter </a:t>
-            </a:r>
-            <a:r>
               <a:rPr lang="fr-FR" dirty="0"/>
-              <a:t>la possibilité de télécharger des photos, d'aimer les photos et de laisser des </a:t>
-            </a:r>
-            <a:r>
-              <a:rPr lang="fr-FR" dirty="0" smtClean="0"/>
-              <a:t>commentaires.</a:t>
-            </a:r>
-            <a:r>
-              <a:rPr lang="fr-FR" dirty="0"/>
-              <a:t/>
+              <a:t>Ajouter la possibilité de télécharger des photos, d'aimer les photos et de laisser des commentaires.</a:t>
             </a:r>
             <a:br>
               <a:rPr lang="fr-FR" dirty="0"/>
@@ -5413,15 +5344,7 @@
             </a:pPr>
             <a:r>
               <a:rPr lang="fr-FR" dirty="0"/>
-              <a:t>Ajout de la possibilité de supprimer les photos, de s'abonner et de se désabonner, ainsi que de visualiser les photos aimées et les informations de base de l'utilisateur</a:t>
-            </a:r>
-            <a:r>
-              <a:rPr lang="fr-FR" dirty="0" smtClean="0"/>
-              <a:t>. Ainsi changer le photo de profil.</a:t>
-            </a:r>
-            <a:r>
-              <a:rPr lang="fr-FR" dirty="0"/>
-              <a:t/>
+              <a:t>Ajout de la possibilité de supprimer les photos, de s'abonner et de se désabonner, ainsi que de visualiser les photos aimées et les informations de base de l'utilisateur. Ainsi changer le photo de profil.</a:t>
             </a:r>
             <a:br>
               <a:rPr lang="fr-FR" dirty="0"/>
@@ -5434,7 +5357,7 @@
               <a:buChar char="§"/>
             </a:pPr>
             <a:r>
-              <a:rPr lang="fr-FR" dirty="0" smtClean="0"/>
+              <a:rPr lang="fr-FR" dirty="0"/>
               <a:t>Ajout de la pagination.</a:t>
             </a:r>
           </a:p>
@@ -5443,7 +5366,7 @@
               <a:buFont typeface="Wingdings" panose="05000000000000000000" pitchFamily="2" charset="2"/>
               <a:buChar char="§"/>
             </a:pPr>
-            <a:endParaRPr lang="fr-FR" dirty="0" smtClean="0"/>
+            <a:endParaRPr lang="fr-FR" dirty="0"/>
           </a:p>
           <a:p>
             <a:pPr lvl="1">
@@ -5451,40 +5374,20 @@
               <a:buChar char="§"/>
             </a:pPr>
             <a:r>
-              <a:rPr lang="fr-FR" dirty="0" smtClean="0"/>
-              <a:t>Ajouter </a:t>
-            </a:r>
-            <a:r>
               <a:rPr lang="fr-FR" dirty="0"/>
-              <a:t>des tâches pour s'occuper des publications </a:t>
-            </a:r>
-            <a:r>
-              <a:rPr lang="fr-FR" dirty="0" smtClean="0"/>
-              <a:t>ou les photos de profil supprimées</a:t>
-            </a:r>
-            <a:r>
-              <a:rPr lang="fr-FR" dirty="0"/>
-              <a:t>.</a:t>
+              <a:t>Ajouter des tâches pour s'occuper des publications ou les photos de profil supprimées.</a:t>
             </a:r>
           </a:p>
           <a:p>
             <a:pPr marL="45720" indent="0">
               <a:buNone/>
             </a:pPr>
-            <a:r>
-              <a:rPr lang="fr-FR" dirty="0" smtClean="0"/>
-              <a:t/>
-            </a:r>
             <a:br>
-              <a:rPr lang="fr-FR" dirty="0" smtClean="0"/>
+              <a:rPr lang="fr-FR" dirty="0"/>
             </a:br>
             <a:r>
-              <a:rPr lang="fr-FR" dirty="0" smtClean="0"/>
-              <a:t>La version utilisée pour le rapport du stage est avec MySQL</a:t>
-            </a:r>
-            <a:r>
               <a:rPr lang="fr-FR" dirty="0"/>
-              <a:t>.</a:t>
+              <a:t>La version utilisée pour le rapport du stage est avec MySQL.</a:t>
             </a:r>
           </a:p>
           <a:p>
@@ -5542,13 +5445,6 @@
   <p:clrMapOvr>
     <a:masterClrMapping/>
   </p:clrMapOvr>
-  <p:timing>
-    <p:tnLst>
-      <p:par>
-        <p:cTn id="1" dur="indefinite" restart="never" nodeType="tmRoot"/>
-      </p:par>
-    </p:tnLst>
-  </p:timing>
 </p:sld>
 </file>
 
@@ -5671,13 +5567,6 @@
   <p:clrMapOvr>
     <a:masterClrMapping/>
   </p:clrMapOvr>
-  <p:timing>
-    <p:tnLst>
-      <p:par>
-        <p:cTn id="1" dur="indefinite" restart="never" nodeType="tmRoot"/>
-      </p:par>
-    </p:tnLst>
-  </p:timing>
 </p:sld>
 </file>
 
@@ -5765,13 +5654,6 @@
   <p:clrMapOvr>
     <a:masterClrMapping/>
   </p:clrMapOvr>
-  <p:timing>
-    <p:tnLst>
-      <p:par>
-        <p:cTn id="1" dur="indefinite" restart="never" nodeType="tmRoot"/>
-      </p:par>
-    </p:tnLst>
-  </p:timing>
 </p:sld>
 </file>
 
@@ -5814,15 +5696,15 @@
           <a:lstStyle/>
           <a:p>
             <a:r>
-              <a:rPr lang="fr-FR" dirty="0" err="1" smtClean="0"/>
+              <a:rPr lang="fr-FR" dirty="0" err="1"/>
               <a:t>Spring</a:t>
             </a:r>
             <a:r>
-              <a:rPr lang="fr-FR" dirty="0" smtClean="0"/>
+              <a:rPr lang="fr-FR" dirty="0"/>
               <a:t> Boot et </a:t>
             </a:r>
             <a:r>
-              <a:rPr lang="fr-FR" dirty="0" err="1" smtClean="0"/>
+              <a:rPr lang="fr-FR" dirty="0" err="1"/>
               <a:t>Angular</a:t>
             </a:r>
             <a:endParaRPr lang="fr-FR" dirty="0"/>
@@ -5886,49 +5768,25 @@
             </a:r>
             <a:r>
               <a:rPr lang="fr-FR" dirty="0"/>
-              <a:t>. J'ai lu beaucoup de documentation pour comprendre comment chacun d'eux fonctionne indépendamment et comment les faire fonctionner ensemble. La documentation facile à comprendre, les exemples et les guides disponibles sur le web m'ont beaucoup aidé à créer ce projet</a:t>
-            </a:r>
-            <a:r>
-              <a:rPr lang="fr-FR" dirty="0" smtClean="0"/>
-              <a:t>. </a:t>
+              <a:t>. J'ai lu beaucoup de documentation pour comprendre comment chacun d'eux fonctionne indépendamment et comment les faire fonctionner ensemble. La documentation facile à comprendre, les exemples et les guides disponibles sur le web m'ont beaucoup aidé à créer ce projet. </a:t>
             </a:r>
           </a:p>
           <a:p>
             <a:r>
               <a:rPr lang="fr-FR" dirty="0"/>
-              <a:t>l</a:t>
-            </a:r>
-            <a:r>
-              <a:rPr lang="fr-FR" dirty="0" smtClean="0"/>
-              <a:t>a </a:t>
-            </a:r>
+              <a:t>la meilleure façon de mapper les entités</a:t>
+            </a:r>
+          </a:p>
+          <a:p>
             <a:r>
               <a:rPr lang="fr-FR" dirty="0"/>
-              <a:t>meilleure </a:t>
-            </a:r>
-            <a:r>
-              <a:rPr lang="fr-FR" dirty="0" smtClean="0"/>
-              <a:t>façon de mapper les entités</a:t>
+              <a:t>transfert de la logique aux services</a:t>
             </a:r>
           </a:p>
           <a:p>
             <a:r>
               <a:rPr lang="fr-FR" dirty="0"/>
-              <a:t>transfert de la logique aux </a:t>
-            </a:r>
-            <a:r>
-              <a:rPr lang="fr-FR" dirty="0" smtClean="0"/>
-              <a:t>services</a:t>
-            </a:r>
-          </a:p>
-          <a:p>
-            <a:r>
-              <a:rPr lang="fr-FR" dirty="0"/>
-              <a:t>traitement des exceptions et des réponses </a:t>
-            </a:r>
-            <a:r>
-              <a:rPr lang="fr-FR" dirty="0" smtClean="0"/>
-              <a:t>api</a:t>
+              <a:t>traitement des exceptions et des réponses api</a:t>
             </a:r>
           </a:p>
           <a:p>
@@ -5937,7 +5795,7 @@
               <a:t>observables </a:t>
             </a:r>
             <a:r>
-              <a:rPr lang="fr-FR" dirty="0" err="1" smtClean="0"/>
+              <a:rPr lang="fr-FR" dirty="0" err="1"/>
               <a:t>rxjs</a:t>
             </a:r>
             <a:endParaRPr lang="fr-FR" dirty="0"/>
@@ -5983,13 +5841,6 @@
   <p:clrMapOvr>
     <a:masterClrMapping/>
   </p:clrMapOvr>
-  <p:timing>
-    <p:tnLst>
-      <p:par>
-        <p:cTn id="1" dur="indefinite" restart="never" nodeType="tmRoot"/>
-      </p:par>
-    </p:tnLst>
-  </p:timing>
 </p:sld>
 </file>
 
@@ -6077,13 +5928,6 @@
   <p:clrMapOvr>
     <a:masterClrMapping/>
   </p:clrMapOvr>
-  <p:timing>
-    <p:tnLst>
-      <p:par>
-        <p:cTn id="1" dur="indefinite" restart="never" nodeType="tmRoot"/>
-      </p:par>
-    </p:tnLst>
-  </p:timing>
 </p:sld>
 </file>
 
@@ -6269,7 +6113,7 @@
           <a:blip r:embed="rId3">
             <a:extLst>
               <a:ext uri="{96DAC541-7B7A-43D3-8B79-37D633B846F1}">
-                <asvg:svgBlip xmlns="" xmlns:asvg="http://schemas.microsoft.com/office/drawing/2016/SVG/main" r:embed="rId6"/>
+                <asvg:svgBlip xmlns:asvg="http://schemas.microsoft.com/office/drawing/2016/SVG/main" r:embed="rId4"/>
               </a:ext>
             </a:extLst>
           </a:blip>
@@ -6389,18 +6233,13 @@
           <a:p>
             <a:pPr algn="ctr"/>
             <a:r>
-              <a:rPr lang="fr-FR" sz="1200" dirty="0" smtClean="0">
+              <a:rPr lang="fr-FR" sz="1200" dirty="0">
                 <a:solidFill>
                   <a:schemeClr val="tx1"/>
                 </a:solidFill>
               </a:rPr>
               <a:t>entités</a:t>
             </a:r>
-            <a:endParaRPr lang="fr-FR" sz="1200" dirty="0">
-              <a:solidFill>
-                <a:schemeClr val="tx1"/>
-              </a:solidFill>
-            </a:endParaRPr>
           </a:p>
         </p:txBody>
       </p:sp>
@@ -6450,18 +6289,13 @@
           <a:p>
             <a:pPr algn="ctr"/>
             <a:r>
-              <a:rPr lang="fr-FR" sz="1200" dirty="0" smtClean="0">
+              <a:rPr lang="fr-FR" sz="1200" dirty="0">
                 <a:solidFill>
                   <a:schemeClr val="tx1"/>
                 </a:solidFill>
               </a:rPr>
               <a:t>service</a:t>
             </a:r>
-            <a:endParaRPr lang="fr-FR" sz="1200" dirty="0">
-              <a:solidFill>
-                <a:schemeClr val="tx1"/>
-              </a:solidFill>
-            </a:endParaRPr>
           </a:p>
         </p:txBody>
       </p:sp>
@@ -6698,29 +6532,7 @@
                   </a:schemeClr>
                 </a:solidFill>
               </a:rPr>
-              <a:t>« </a:t>
-            </a:r>
-            <a:r>
-              <a:rPr lang="fr-FR" i="1" dirty="0" smtClean="0">
-                <a:solidFill>
-                  <a:schemeClr val="tx2">
-                    <a:lumMod val="60000"/>
-                    <a:lumOff val="40000"/>
-                  </a:schemeClr>
-                </a:solidFill>
-              </a:rPr>
-              <a:t>REST API</a:t>
-            </a:r>
-            <a:r>
-              <a:rPr lang="fr-FR" i="1" dirty="0">
-                <a:solidFill>
-                  <a:schemeClr val="tx2">
-                    <a:lumMod val="60000"/>
-                    <a:lumOff val="40000"/>
-                  </a:schemeClr>
-                </a:solidFill>
-              </a:rPr>
-              <a:t> »</a:t>
+              <a:t>« REST API »</a:t>
             </a:r>
           </a:p>
         </p:txBody>
@@ -6774,18 +6586,13 @@
           <a:p>
             <a:pPr algn="ctr"/>
             <a:r>
-              <a:rPr lang="fr-FR" sz="1200" dirty="0" smtClean="0">
+              <a:rPr lang="fr-FR" sz="1200" dirty="0">
                 <a:solidFill>
                   <a:schemeClr val="tx1"/>
                 </a:solidFill>
               </a:rPr>
               <a:t>dao</a:t>
             </a:r>
-            <a:endParaRPr lang="fr-FR" sz="1200" dirty="0">
-              <a:solidFill>
-                <a:schemeClr val="tx1"/>
-              </a:solidFill>
-            </a:endParaRPr>
           </a:p>
         </p:txBody>
       </p:sp>
@@ -6940,7 +6747,7 @@
           <a:lstStyle/>
           <a:p>
             <a:r>
-              <a:rPr lang="en-US" dirty="0" err="1" smtClean="0"/>
+              <a:rPr lang="en-US" dirty="0" err="1"/>
               <a:t>Navigateur</a:t>
             </a:r>
             <a:endParaRPr lang="fr-FR" dirty="0"/>
@@ -7019,14 +6826,14 @@
           <a:p>
             <a:pPr algn="ctr"/>
             <a:r>
-              <a:rPr lang="en-US" dirty="0" smtClean="0"/>
+              <a:rPr lang="en-US" dirty="0"/>
               <a:t>HTML</a:t>
             </a:r>
           </a:p>
           <a:p>
             <a:pPr algn="ctr"/>
             <a:r>
-              <a:rPr lang="en-US" dirty="0" smtClean="0"/>
+              <a:rPr lang="en-US" dirty="0"/>
               <a:t>Template</a:t>
             </a:r>
             <a:endParaRPr lang="fr-FR" dirty="0"/>
@@ -7104,7 +6911,7 @@
           <a:lstStyle/>
           <a:p>
             <a:r>
-              <a:rPr lang="en-US" dirty="0" smtClean="0"/>
+              <a:rPr lang="en-US" dirty="0"/>
               <a:t>Component</a:t>
             </a:r>
             <a:endParaRPr lang="fr-FR" dirty="0"/>
@@ -7182,7 +6989,7 @@
           <a:lstStyle/>
           <a:p>
             <a:r>
-              <a:rPr lang="en-US" dirty="0" smtClean="0"/>
+              <a:rPr lang="en-US" dirty="0"/>
               <a:t>Service</a:t>
             </a:r>
             <a:endParaRPr lang="fr-FR" dirty="0"/>
@@ -7234,7 +7041,7 @@
           <a:p>
             <a:pPr algn="ctr"/>
             <a:r>
-              <a:rPr lang="en-US" dirty="0" smtClean="0">
+              <a:rPr lang="en-US" dirty="0">
                 <a:solidFill>
                   <a:schemeClr val="tx1"/>
                 </a:solidFill>
@@ -7294,7 +7101,7 @@
           <a:p>
             <a:pPr algn="ctr"/>
             <a:r>
-              <a:rPr lang="en-US" dirty="0" smtClean="0">
+              <a:rPr lang="en-US" dirty="0">
                 <a:solidFill>
                   <a:schemeClr val="tx1"/>
                 </a:solidFill>
@@ -7733,13 +7540,6 @@
   <p:clrMapOvr>
     <a:masterClrMapping/>
   </p:clrMapOvr>
-  <p:timing>
-    <p:tnLst>
-      <p:par>
-        <p:cTn id="1" dur="indefinite" restart="never" nodeType="tmRoot"/>
-      </p:par>
-    </p:tnLst>
-  </p:timing>
 </p:sld>
 </file>
 
@@ -7830,19 +7630,14 @@
             </a:lvl1pPr>
           </a:lstStyle>
           <a:p>
-            <a:endParaRPr lang="fr-FR" sz="3200" dirty="0" smtClean="0"/>
+            <a:endParaRPr lang="fr-FR" sz="3200" dirty="0"/>
           </a:p>
           <a:p>
             <a:pPr algn="ctr"/>
             <a:r>
-              <a:rPr lang="fr-FR" sz="3200" dirty="0" smtClean="0"/>
-              <a:t>Structure </a:t>
-            </a:r>
-            <a:r>
-              <a:rPr lang="fr-FR" sz="3200" dirty="0" smtClean="0"/>
-              <a:t>de Back-End</a:t>
-            </a:r>
-            <a:endParaRPr lang="fr-FR" sz="3200" dirty="0" smtClean="0"/>
+              <a:rPr lang="fr-FR" sz="3200" dirty="0"/>
+              <a:t>Structure de Back-End</a:t>
+            </a:r>
           </a:p>
           <a:p>
             <a:endParaRPr lang="fr-FR" sz="3200" dirty="0"/>
@@ -7896,7 +7691,7 @@
             </a:lvl1pPr>
           </a:lstStyle>
           <a:p>
-            <a:endParaRPr lang="fr-FR" sz="3200" dirty="0" smtClean="0"/>
+            <a:endParaRPr lang="fr-FR" sz="3200" dirty="0"/>
           </a:p>
           <a:p>
             <a:endParaRPr lang="fr-FR" sz="3200" dirty="0"/>
@@ -8000,18 +7795,40 @@
                   </a:schemeClr>
                 </a:solidFill>
               </a:rPr>
-              <a:t>c</a:t>
-            </a:r>
-            <a:r>
-              <a:rPr lang="fr-FR" sz="1200" dirty="0" smtClean="0">
-                <a:solidFill>
-                  <a:schemeClr val="accent1">
-                    <a:lumMod val="75000"/>
-                  </a:schemeClr>
-                </a:solidFill>
-              </a:rPr>
-              <a:t>ontient </a:t>
-            </a:r>
+              <a:t>contient des écouteurs d'événements et des événements qui sont publiés lorsque l'utilisateur a terminé l'enregistrement ou demandé une réinitialisation du mot de passe</a:t>
+            </a:r>
+            <a:endParaRPr lang="fr-FR" sz="1200" b="1" dirty="0">
+              <a:solidFill>
+                <a:schemeClr val="accent1">
+                  <a:lumMod val="75000"/>
+                </a:schemeClr>
+              </a:solidFill>
+            </a:endParaRPr>
+          </a:p>
+        </p:txBody>
+      </p:sp>
+      <p:sp>
+        <p:nvSpPr>
+          <p:cNvPr id="16" name="ZoneTexte 15"/>
+          <p:cNvSpPr txBox="1"/>
+          <p:nvPr/>
+        </p:nvSpPr>
+        <p:spPr>
+          <a:xfrm>
+            <a:off x="460933" y="2368631"/>
+            <a:ext cx="3379316" cy="1015663"/>
+          </a:xfrm>
+          <a:prstGeom prst="rect">
+            <a:avLst/>
+          </a:prstGeom>
+          <a:noFill/>
+        </p:spPr>
+        <p:txBody>
+          <a:bodyPr wrap="square" rtlCol="0">
+            <a:spAutoFit/>
+          </a:bodyPr>
+          <a:lstStyle/>
+          <a:p>
             <a:r>
               <a:rPr lang="fr-FR" sz="1200" dirty="0">
                 <a:solidFill>
@@ -8020,79 +7837,7 @@
                   </a:schemeClr>
                 </a:solidFill>
               </a:rPr>
-              <a:t>des écouteurs d'événements et des événements qui sont publiés lorsque l'utilisateur a terminé l'enregistrement ou demandé une réinitialisation du mot de </a:t>
-            </a:r>
-            <a:r>
-              <a:rPr lang="fr-FR" sz="1200" dirty="0" smtClean="0">
-                <a:solidFill>
-                  <a:schemeClr val="accent1">
-                    <a:lumMod val="75000"/>
-                  </a:schemeClr>
-                </a:solidFill>
-              </a:rPr>
-              <a:t>passe</a:t>
-            </a:r>
-            <a:endParaRPr lang="fr-FR" sz="1200" b="1" dirty="0">
-              <a:solidFill>
-                <a:schemeClr val="accent1">
-                  <a:lumMod val="75000"/>
-                </a:schemeClr>
-              </a:solidFill>
-            </a:endParaRPr>
-          </a:p>
-        </p:txBody>
-      </p:sp>
-      <p:sp>
-        <p:nvSpPr>
-          <p:cNvPr id="16" name="ZoneTexte 15"/>
-          <p:cNvSpPr txBox="1"/>
-          <p:nvPr/>
-        </p:nvSpPr>
-        <p:spPr>
-          <a:xfrm>
-            <a:off x="460933" y="2368631"/>
-            <a:ext cx="3379316" cy="1015663"/>
-          </a:xfrm>
-          <a:prstGeom prst="rect">
-            <a:avLst/>
-          </a:prstGeom>
-          <a:noFill/>
-        </p:spPr>
-        <p:txBody>
-          <a:bodyPr wrap="square" rtlCol="0">
-            <a:spAutoFit/>
-          </a:bodyPr>
-          <a:lstStyle/>
-          <a:p>
-            <a:r>
-              <a:rPr lang="fr-FR" sz="1200" dirty="0">
-                <a:solidFill>
-                  <a:schemeClr val="accent1">
-                    <a:lumMod val="75000"/>
-                  </a:schemeClr>
-                </a:solidFill>
-              </a:rPr>
-              <a:t>c</a:t>
-            </a:r>
-            <a:r>
-              <a:rPr lang="fr-FR" sz="1200" dirty="0" smtClean="0">
-                <a:solidFill>
-                  <a:schemeClr val="accent1">
-                    <a:lumMod val="75000"/>
-                  </a:schemeClr>
-                </a:solidFill>
-              </a:rPr>
-              <a:t>ontient </a:t>
-            </a:r>
-            <a:r>
-              <a:rPr lang="fr-FR" sz="1200" dirty="0">
-                <a:solidFill>
-                  <a:schemeClr val="accent1">
-                    <a:lumMod val="75000"/>
-                  </a:schemeClr>
-                </a:solidFill>
-              </a:rPr>
-              <a:t>des filtres de requête, des points d'entrée d'authentification, un objet de réponse </a:t>
+              <a:t>contient des filtres de requête, des points d'entrée d'authentification, un objet de réponse </a:t>
             </a:r>
             <a:r>
               <a:rPr lang="fr-FR" sz="1200" dirty="0" err="1">
@@ -8132,25 +7877,8 @@
                   </a:schemeClr>
                 </a:solidFill>
               </a:rPr>
-              <a:t>, les envoyer à l'utilisateur, et lire et valider à partir des en-têtes de </a:t>
-            </a:r>
-            <a:r>
-              <a:rPr lang="fr-FR" sz="1200" dirty="0" smtClean="0">
-                <a:solidFill>
-                  <a:schemeClr val="accent1">
-                    <a:lumMod val="75000"/>
-                  </a:schemeClr>
-                </a:solidFill>
-              </a:rPr>
-              <a:t>requête</a:t>
-            </a:r>
-            <a:endParaRPr lang="fr-FR" sz="1200" dirty="0">
-              <a:solidFill>
-                <a:schemeClr val="accent1">
-                  <a:lumMod val="75000"/>
-                </a:schemeClr>
-              </a:solidFill>
-            </a:endParaRPr>
+              <a:t>, les envoyer à l'utilisateur, et lire et valider à partir des en-têtes de requête</a:t>
+            </a:r>
           </a:p>
         </p:txBody>
       </p:sp>
@@ -8227,17 +7955,17 @@
                   </a:schemeClr>
                 </a:solidFill>
               </a:rPr>
-              <a:t>c</a:t>
-            </a:r>
-            <a:r>
-              <a:rPr lang="fr-FR" sz="1200" dirty="0" smtClean="0">
+              <a:t>contient des entités, qui sont stockées dans la base de données, et le dao (</a:t>
+            </a:r>
+            <a:r>
+              <a:rPr lang="fr-FR" sz="1200" dirty="0" err="1">
                 <a:solidFill>
                   <a:schemeClr val="accent1">
                     <a:lumMod val="75000"/>
                   </a:schemeClr>
                 </a:solidFill>
               </a:rPr>
-              <a:t>ontient </a:t>
+              <a:t>repository</a:t>
             </a:r>
             <a:r>
               <a:rPr lang="fr-FR" sz="1200" dirty="0">
@@ -8247,65 +7975,8 @@
                   </a:schemeClr>
                 </a:solidFill>
               </a:rPr>
-              <a:t>des entités, qui sont stockées dans la base de données, et le </a:t>
-            </a:r>
-            <a:r>
-              <a:rPr lang="fr-FR" sz="1200" dirty="0" smtClean="0">
-                <a:solidFill>
-                  <a:schemeClr val="accent1">
-                    <a:lumMod val="75000"/>
-                  </a:schemeClr>
-                </a:solidFill>
-              </a:rPr>
-              <a:t>dao (</a:t>
-            </a:r>
-            <a:r>
-              <a:rPr lang="fr-FR" sz="1200" dirty="0" err="1" smtClean="0">
-                <a:solidFill>
-                  <a:schemeClr val="accent1">
-                    <a:lumMod val="75000"/>
-                  </a:schemeClr>
-                </a:solidFill>
-              </a:rPr>
-              <a:t>repository</a:t>
-            </a:r>
-            <a:r>
-              <a:rPr lang="fr-FR" sz="1200" dirty="0" smtClean="0">
-                <a:solidFill>
-                  <a:schemeClr val="accent1">
-                    <a:lumMod val="75000"/>
-                  </a:schemeClr>
-                </a:solidFill>
-              </a:rPr>
-              <a:t>) - mécanisme </a:t>
-            </a:r>
-            <a:r>
-              <a:rPr lang="fr-FR" sz="1200" dirty="0">
-                <a:solidFill>
-                  <a:schemeClr val="accent1">
-                    <a:lumMod val="75000"/>
-                  </a:schemeClr>
-                </a:solidFill>
-              </a:rPr>
-              <a:t>pour encapsuler le stockage, la récupération et le comportement de </a:t>
-            </a:r>
-            <a:r>
-              <a:rPr lang="fr-FR" sz="1200" dirty="0" smtClean="0">
-                <a:solidFill>
-                  <a:schemeClr val="accent1">
-                    <a:lumMod val="75000"/>
-                  </a:schemeClr>
-                </a:solidFill>
-              </a:rPr>
-              <a:t>recherche</a:t>
-            </a:r>
-            <a:endParaRPr lang="fr-FR" sz="1200" dirty="0">
-              <a:solidFill>
-                <a:schemeClr val="accent1">
-                  <a:lumMod val="75000"/>
-                </a:schemeClr>
-              </a:solidFill>
-            </a:endParaRPr>
+              <a:t>) - mécanisme pour encapsuler le stockage, la récupération et le comportement de recherche</a:t>
+            </a:r>
           </a:p>
         </p:txBody>
       </p:sp>
@@ -8382,45 +8053,8 @@
                   </a:schemeClr>
                 </a:solidFill>
               </a:rPr>
-              <a:t>c</a:t>
-            </a:r>
-            <a:r>
-              <a:rPr lang="fr-FR" sz="1200" dirty="0" smtClean="0">
-                <a:solidFill>
-                  <a:schemeClr val="accent1">
-                    <a:lumMod val="75000"/>
-                  </a:schemeClr>
-                </a:solidFill>
-              </a:rPr>
-              <a:t>ontient </a:t>
-            </a:r>
-            <a:r>
-              <a:rPr lang="fr-FR" sz="1200" dirty="0">
-                <a:solidFill>
-                  <a:schemeClr val="accent1">
-                    <a:lumMod val="75000"/>
-                  </a:schemeClr>
-                </a:solidFill>
-              </a:rPr>
-              <a:t>des services qui sont utilisés pour écrire la logique dans une couche différente, séparée des contrôleurs </a:t>
-            </a:r>
-            <a:r>
-              <a:rPr lang="fr-FR" sz="1200" dirty="0" smtClean="0">
-                <a:solidFill>
-                  <a:schemeClr val="accent1">
-                    <a:lumMod val="75000"/>
-                  </a:schemeClr>
-                </a:solidFill>
-              </a:rPr>
-              <a:t>REST</a:t>
-            </a:r>
-            <a:endParaRPr lang="fr-FR" sz="1200" dirty="0">
-              <a:solidFill>
-                <a:schemeClr val="accent1">
-                  <a:lumMod val="75000"/>
-                </a:schemeClr>
-              </a:solidFill>
-            </a:endParaRPr>
+              <a:t>contient des services qui sont utilisés pour écrire la logique dans une couche différente, séparée des contrôleurs REST</a:t>
+            </a:r>
           </a:p>
         </p:txBody>
       </p:sp>
@@ -8497,17 +8131,17 @@
                   </a:schemeClr>
                 </a:solidFill>
               </a:rPr>
-              <a:t>c</a:t>
-            </a:r>
-            <a:r>
-              <a:rPr lang="fr-FR" sz="1200" dirty="0" smtClean="0">
+              <a:t>contient des configurations </a:t>
+            </a:r>
+            <a:r>
+              <a:rPr lang="fr-FR" sz="1200" dirty="0" err="1">
                 <a:solidFill>
                   <a:schemeClr val="accent1">
                     <a:lumMod val="75000"/>
                   </a:schemeClr>
                 </a:solidFill>
               </a:rPr>
-              <a:t>ontient </a:t>
+              <a:t>Spring</a:t>
             </a:r>
             <a:r>
               <a:rPr lang="fr-FR" sz="1200" dirty="0">
@@ -8517,37 +8151,7 @@
                   </a:schemeClr>
                 </a:solidFill>
               </a:rPr>
-              <a:t>des configurations </a:t>
-            </a:r>
-            <a:r>
-              <a:rPr lang="fr-FR" sz="1200" dirty="0" err="1" smtClean="0">
-                <a:solidFill>
-                  <a:schemeClr val="accent1">
-                    <a:lumMod val="75000"/>
-                  </a:schemeClr>
-                </a:solidFill>
-              </a:rPr>
-              <a:t>Spring</a:t>
-            </a:r>
-            <a:r>
-              <a:rPr lang="fr-FR" sz="1200" dirty="0" smtClean="0">
-                <a:solidFill>
-                  <a:schemeClr val="accent1">
-                    <a:lumMod val="75000"/>
-                  </a:schemeClr>
-                </a:solidFill>
-              </a:rPr>
-              <a:t>. </a:t>
-            </a:r>
-            <a:r>
-              <a:rPr lang="fr-FR" sz="1200" dirty="0">
-                <a:solidFill>
-                  <a:schemeClr val="accent1">
-                    <a:lumMod val="75000"/>
-                  </a:schemeClr>
-                </a:solidFill>
-              </a:rPr>
-              <a:t>Une configuration Web pour permettre l'accès aux contrôleurs en fonction des autorisations, et la configuration qui permet la planification des tâches</a:t>
+              <a:t>. Une configuration Web pour permettre l'accès aux contrôleurs en fonction des autorisations, et la configuration qui permet la planification des tâches</a:t>
             </a:r>
           </a:p>
         </p:txBody>
@@ -8625,25 +8229,8 @@
                   </a:schemeClr>
                 </a:solidFill>
               </a:rPr>
-              <a:t>contient des tâches de planification qui prennent en charge la suppression des fichiers, qui ne sont plus référencés dans la base de données, du stockage du </a:t>
-            </a:r>
-            <a:r>
-              <a:rPr lang="fr-FR" sz="1200" dirty="0" smtClean="0">
-                <a:solidFill>
-                  <a:schemeClr val="accent1">
-                    <a:lumMod val="75000"/>
-                  </a:schemeClr>
-                </a:solidFill>
-              </a:rPr>
-              <a:t>serveur</a:t>
-            </a:r>
-            <a:endParaRPr lang="fr-FR" sz="1200" dirty="0">
-              <a:solidFill>
-                <a:schemeClr val="accent1">
-                  <a:lumMod val="75000"/>
-                </a:schemeClr>
-              </a:solidFill>
-            </a:endParaRPr>
+              <a:t>contient des tâches de planification qui prennent en charge la suppression des fichiers, qui ne sont plus référencés dans la base de données, du stockage du serveur</a:t>
+            </a:r>
           </a:p>
         </p:txBody>
       </p:sp>
@@ -8720,25 +8307,8 @@
                   </a:schemeClr>
                 </a:solidFill>
               </a:rPr>
-              <a:t>contient des validateurs de contraintes, utilisés pour valider les demandes d'inscription, les demandes de connexion et les jetons de récupération de mot de </a:t>
-            </a:r>
-            <a:r>
-              <a:rPr lang="fr-FR" sz="1200" dirty="0" smtClean="0">
-                <a:solidFill>
-                  <a:schemeClr val="accent1">
-                    <a:lumMod val="75000"/>
-                  </a:schemeClr>
-                </a:solidFill>
-              </a:rPr>
-              <a:t>passe</a:t>
-            </a:r>
-            <a:endParaRPr lang="fr-FR" sz="1200" dirty="0">
-              <a:solidFill>
-                <a:schemeClr val="accent1">
-                  <a:lumMod val="75000"/>
-                </a:schemeClr>
-              </a:solidFill>
-            </a:endParaRPr>
+              <a:t>contient des validateurs de contraintes, utilisés pour valider les demandes d'inscription, les demandes de connexion et les jetons de récupération de mot de passe</a:t>
+            </a:r>
           </a:p>
         </p:txBody>
       </p:sp>
@@ -8893,27 +8463,7 @@
                   </a:schemeClr>
                 </a:solidFill>
               </a:rPr>
-              <a:t>c</a:t>
-            </a:r>
-            <a:r>
-              <a:rPr lang="en-US" sz="1200" dirty="0" err="1" smtClean="0">
-                <a:solidFill>
-                  <a:schemeClr val="accent1">
-                    <a:lumMod val="75000"/>
-                  </a:schemeClr>
-                </a:solidFill>
-              </a:rPr>
-              <a:t>ontient</a:t>
-            </a:r>
-            <a:r>
-              <a:rPr lang="en-US" sz="1200" dirty="0" smtClean="0">
-                <a:solidFill>
-                  <a:schemeClr val="accent1">
-                    <a:lumMod val="75000"/>
-                  </a:schemeClr>
-                </a:solidFill>
-              </a:rPr>
-              <a:t> </a:t>
+              <a:t>contient</a:t>
             </a:r>
             <a:r>
               <a:rPr lang="en-US" sz="1200" dirty="0">
@@ -8923,10 +8473,10 @@
                   </a:schemeClr>
                 </a:solidFill>
               </a:rPr>
-              <a:t>les </a:t>
-            </a:r>
-            <a:r>
-              <a:rPr lang="en-US" sz="1200" dirty="0" err="1" smtClean="0">
+              <a:t> les </a:t>
+            </a:r>
+            <a:r>
+              <a:rPr lang="en-US" sz="1200" dirty="0" err="1">
                 <a:solidFill>
                   <a:schemeClr val="accent1">
                     <a:lumMod val="75000"/>
@@ -8936,7 +8486,7 @@
               <a:t>contrôleurs</a:t>
             </a:r>
             <a:r>
-              <a:rPr lang="en-US" sz="1200" dirty="0" smtClean="0">
+              <a:rPr lang="en-US" sz="1200" dirty="0">
                 <a:solidFill>
                   <a:schemeClr val="accent1">
                     <a:lumMod val="75000"/>
@@ -9021,7 +8571,7 @@
           <a:lstStyle/>
           <a:p>
             <a:r>
-              <a:rPr lang="fr-FR" sz="1200" dirty="0" smtClean="0">
+              <a:rPr lang="fr-FR" sz="1200" dirty="0">
                 <a:solidFill>
                   <a:schemeClr val="accent1">
                     <a:lumMod val="75000"/>
@@ -9031,7 +8581,7 @@
               <a:t>des objets de transfert de données qui ne contiennent pas de logique mais des mécanismes de sérialisation et de </a:t>
             </a:r>
             <a:r>
-              <a:rPr lang="fr-FR" sz="1200" dirty="0" err="1" smtClean="0">
+              <a:rPr lang="fr-FR" sz="1200" dirty="0" err="1">
                 <a:solidFill>
                   <a:schemeClr val="accent1">
                     <a:lumMod val="75000"/>
@@ -9041,7 +8591,7 @@
               <a:t>désérialisation</a:t>
             </a:r>
             <a:r>
-              <a:rPr lang="fr-FR" sz="1200" dirty="0" smtClean="0">
+              <a:rPr lang="fr-FR" sz="1200" dirty="0">
                 <a:solidFill>
                   <a:schemeClr val="accent1">
                     <a:lumMod val="75000"/>
@@ -9050,13 +8600,6 @@
               </a:rPr>
               <a:t> pour le transfert de données.</a:t>
             </a:r>
-            <a:endParaRPr lang="fr-FR" sz="1200" dirty="0">
-              <a:solidFill>
-                <a:schemeClr val="accent1">
-                  <a:lumMod val="75000"/>
-                </a:schemeClr>
-              </a:solidFill>
-            </a:endParaRPr>
           </a:p>
         </p:txBody>
       </p:sp>
@@ -9126,7 +8669,7 @@
           <a:lstStyle/>
           <a:p>
             <a:r>
-              <a:rPr lang="fr-FR" sz="1200" dirty="0" smtClean="0">
+              <a:rPr lang="fr-FR" sz="1200" dirty="0">
                 <a:solidFill>
                   <a:schemeClr val="accent1">
                     <a:lumMod val="75000"/>
@@ -9136,7 +8679,7 @@
               <a:t>contient les exceptions qui sont lancées pendant le traitement des demandes, et un gestionnaire d'exception, qui gère toutes les exceptions et envoie au client une erreur lisible par l'homme au lieu d'un </a:t>
             </a:r>
             <a:r>
-              <a:rPr lang="fr-FR" sz="1200" dirty="0" err="1" smtClean="0">
+              <a:rPr lang="fr-FR" sz="1200" dirty="0" err="1">
                 <a:solidFill>
                   <a:schemeClr val="accent1">
                     <a:lumMod val="75000"/>
@@ -9146,7 +8689,7 @@
               <a:t>backtrace</a:t>
             </a:r>
             <a:r>
-              <a:rPr lang="fr-FR" sz="1200" dirty="0" smtClean="0">
+              <a:rPr lang="fr-FR" sz="1200" dirty="0">
                 <a:solidFill>
                   <a:schemeClr val="accent1">
                     <a:lumMod val="75000"/>
@@ -9156,7 +8699,7 @@
               <a:t>, en utilisant l'objet </a:t>
             </a:r>
             <a:r>
-              <a:rPr lang="fr-FR" sz="1200" dirty="0" err="1" smtClean="0">
+              <a:rPr lang="fr-FR" sz="1200" dirty="0" err="1">
                 <a:solidFill>
                   <a:schemeClr val="accent1">
                     <a:lumMod val="75000"/>
@@ -9166,7 +8709,7 @@
               <a:t>ApiError</a:t>
             </a:r>
             <a:r>
-              <a:rPr lang="fr-FR" sz="1200" dirty="0" smtClean="0">
+              <a:rPr lang="fr-FR" sz="1200" dirty="0">
                 <a:solidFill>
                   <a:schemeClr val="accent1">
                     <a:lumMod val="75000"/>
@@ -9175,13 +8718,6 @@
               </a:rPr>
               <a:t>.</a:t>
             </a:r>
-            <a:endParaRPr lang="fr-FR" sz="1200" dirty="0">
-              <a:solidFill>
-                <a:schemeClr val="accent1">
-                  <a:lumMod val="75000"/>
-                </a:schemeClr>
-              </a:solidFill>
-            </a:endParaRPr>
           </a:p>
         </p:txBody>
       </p:sp>
@@ -9336,13 +8872,6 @@
   <p:clrMapOvr>
     <a:masterClrMapping/>
   </p:clrMapOvr>
-  <p:timing>
-    <p:tnLst>
-      <p:par>
-        <p:cTn id="1" dur="indefinite" restart="never" nodeType="tmRoot"/>
-      </p:par>
-    </p:tnLst>
-  </p:timing>
 </p:sld>
 </file>
 
@@ -9508,13 +9037,6 @@
   <p:clrMapOvr>
     <a:masterClrMapping/>
   </p:clrMapOvr>
-  <p:timing>
-    <p:tnLst>
-      <p:par>
-        <p:cTn id="1" dur="indefinite" restart="never" nodeType="tmRoot"/>
-      </p:par>
-    </p:tnLst>
-  </p:timing>
 </p:sld>
 </file>
 
@@ -9676,13 +9198,6 @@
   <p:clrMapOvr>
     <a:masterClrMapping/>
   </p:clrMapOvr>
-  <p:timing>
-    <p:tnLst>
-      <p:par>
-        <p:cTn id="1" dur="indefinite" restart="never" nodeType="tmRoot"/>
-      </p:par>
-    </p:tnLst>
-  </p:timing>
 </p:sld>
 </file>
 
@@ -9779,20 +9294,12 @@
               <a:buAutoNum type="romanUcPeriod"/>
             </a:pPr>
             <a:r>
-              <a:rPr lang="fr-FR" sz="2400" dirty="0" smtClean="0"/>
+              <a:rPr lang="fr-FR" sz="2400" dirty="0"/>
               <a:t>Remerciements </a:t>
             </a:r>
             <a:r>
-              <a:rPr lang="fr-FR" sz="1600" dirty="0" smtClean="0"/>
-              <a:t>……………………………....................... .p</a:t>
-            </a:r>
-            <a:r>
               <a:rPr lang="fr-FR" sz="1600" dirty="0"/>
-              <a:t>. 3</a:t>
-            </a:r>
-            <a:r>
-              <a:rPr lang="fr-FR" sz="2400" dirty="0"/>
-              <a:t/>
+              <a:t>……………………………....................... .p. 3</a:t>
             </a:r>
             <a:br>
               <a:rPr lang="fr-FR" sz="2400" dirty="0"/>
@@ -9808,10 +9315,6 @@
               <a:rPr lang="fr-FR" sz="2400" dirty="0"/>
               <a:t>Introduction</a:t>
             </a:r>
-            <a:r>
-              <a:rPr lang="fr-FR" dirty="0"/>
-              <a:t/>
-            </a:r>
             <a:br>
               <a:rPr lang="fr-FR" dirty="0"/>
             </a:br>
@@ -9823,22 +9326,13 @@
               <a:buChar char="§"/>
             </a:pPr>
             <a:r>
-              <a:rPr lang="fr-FR" sz="1700" dirty="0" smtClean="0"/>
+              <a:rPr lang="fr-FR" sz="1700" dirty="0"/>
               <a:t>Période préformation</a:t>
             </a:r>
             <a:r>
-              <a:rPr lang="fr-FR" sz="1600" dirty="0" smtClean="0"/>
-              <a:t>………………………………………………..p</a:t>
-            </a:r>
-            <a:r>
               <a:rPr lang="fr-FR" sz="1600" dirty="0"/>
-              <a:t>. </a:t>
-            </a:r>
-            <a:r>
-              <a:rPr lang="fr-FR" sz="1600" dirty="0" smtClean="0"/>
-              <a:t>4</a:t>
-            </a:r>
-            <a:endParaRPr lang="fr-FR" sz="1600" dirty="0"/>
+              <a:t>………………………………………………..p. 4</a:t>
+            </a:r>
           </a:p>
           <a:p>
             <a:pPr lvl="2">
@@ -9846,16 +9340,12 @@
               <a:buChar char="§"/>
             </a:pPr>
             <a:r>
-              <a:rPr lang="fr-FR" sz="1700" dirty="0" smtClean="0"/>
+              <a:rPr lang="fr-FR" sz="1700" dirty="0"/>
               <a:t>Période de recherche de stage</a:t>
             </a:r>
             <a:r>
-              <a:rPr lang="fr-FR" sz="1600" dirty="0" smtClean="0"/>
-              <a:t>……………………………………p</a:t>
-            </a:r>
-            <a:r>
               <a:rPr lang="fr-FR" sz="1600" dirty="0"/>
-              <a:t>. 4</a:t>
+              <a:t>……………………………………p. 4</a:t>
             </a:r>
             <a:br>
               <a:rPr lang="fr-FR" sz="1600" dirty="0"/>
@@ -9871,10 +9361,6 @@
               <a:rPr lang="fr-FR" sz="2400" dirty="0"/>
               <a:t>Environnement de travail</a:t>
             </a:r>
-            <a:r>
-              <a:rPr lang="fr-FR" dirty="0"/>
-              <a:t/>
-            </a:r>
             <a:br>
               <a:rPr lang="fr-FR" dirty="0"/>
             </a:br>
@@ -9890,18 +9376,9 @@
               <a:t>Langages et base de données </a:t>
             </a:r>
             <a:r>
-              <a:rPr lang="fr-FR" sz="1600" dirty="0" smtClean="0"/>
-              <a:t>…………………………….. ……p</a:t>
-            </a:r>
-            <a:r>
               <a:rPr lang="fr-FR" sz="1600" dirty="0"/>
-              <a:t>. </a:t>
-            </a:r>
-            <a:r>
-              <a:rPr lang="fr-FR" sz="1600" dirty="0" smtClean="0"/>
-              <a:t>6</a:t>
-            </a:r>
-            <a:endParaRPr lang="fr-FR" sz="1600" dirty="0"/>
+              <a:t>…………………………….. ……p. 6</a:t>
+            </a:r>
           </a:p>
           <a:p>
             <a:pPr lvl="2">
@@ -9909,34 +9386,25 @@
               <a:buChar char="§"/>
             </a:pPr>
             <a:r>
-              <a:rPr lang="fr-FR" sz="1700" dirty="0" err="1" smtClean="0"/>
+              <a:rPr lang="fr-FR" sz="1700" dirty="0" err="1"/>
               <a:t>Frameworks</a:t>
             </a:r>
             <a:r>
-              <a:rPr lang="fr-FR" sz="1700" dirty="0" smtClean="0"/>
+              <a:rPr lang="fr-FR" sz="1700" dirty="0"/>
               <a:t> et bibliothèques</a:t>
             </a:r>
             <a:r>
-              <a:rPr lang="fr-FR" sz="1600" dirty="0" smtClean="0"/>
+              <a:rPr lang="fr-FR" sz="1600" dirty="0"/>
               <a:t>………………………</a:t>
             </a:r>
             <a:r>
-              <a:rPr lang="en-US" sz="1600" dirty="0" smtClean="0"/>
+              <a:rPr lang="en-US" sz="1600" dirty="0"/>
               <a:t>…………….</a:t>
             </a:r>
             <a:r>
-              <a:rPr lang="fr-FR" sz="1600" dirty="0" smtClean="0"/>
-              <a:t>p</a:t>
-            </a:r>
-            <a:r>
               <a:rPr lang="fr-FR" sz="1600" dirty="0"/>
-              <a:t>. </a:t>
-            </a:r>
-            <a:r>
-              <a:rPr lang="fr-FR" sz="1600" dirty="0" smtClean="0"/>
-              <a:t>7</a:t>
-            </a:r>
-            <a:endParaRPr lang="fr-FR" sz="1600" dirty="0"/>
+              <a:t>p. 7</a:t>
+            </a:r>
           </a:p>
           <a:p>
             <a:pPr lvl="2">
@@ -9944,24 +9412,20 @@
               <a:buChar char="§"/>
             </a:pPr>
             <a:r>
-              <a:rPr lang="fr-FR" sz="1700" dirty="0" smtClean="0"/>
+              <a:rPr lang="fr-FR" sz="1700" dirty="0"/>
               <a:t>Git </a:t>
             </a:r>
             <a:r>
-              <a:rPr lang="en-US" sz="1700" dirty="0" smtClean="0"/>
+              <a:rPr lang="en-US" sz="1700" dirty="0"/>
               <a:t>&amp; </a:t>
             </a:r>
             <a:r>
-              <a:rPr lang="en-US" sz="1700" dirty="0" err="1" smtClean="0"/>
+              <a:rPr lang="en-US" sz="1700" dirty="0" err="1"/>
               <a:t>Github</a:t>
             </a:r>
             <a:r>
-              <a:rPr lang="fr-FR" sz="1600" dirty="0" smtClean="0"/>
-              <a:t>………………………………............................……..p</a:t>
-            </a:r>
-            <a:r>
               <a:rPr lang="fr-FR" sz="1600" dirty="0"/>
-              <a:t>. 8</a:t>
+              <a:t>………………………………............................……..p. 8</a:t>
             </a:r>
           </a:p>
           <a:p>
@@ -9970,24 +9434,20 @@
               <a:buChar char="§"/>
             </a:pPr>
             <a:r>
-              <a:rPr lang="fr-FR" sz="1700" dirty="0" smtClean="0"/>
+              <a:rPr lang="fr-FR" sz="1700" dirty="0"/>
               <a:t>Editeur de </a:t>
             </a:r>
             <a:r>
-              <a:rPr lang="fr-FR" sz="1700" dirty="0" err="1" smtClean="0"/>
+              <a:rPr lang="fr-FR" sz="1700" dirty="0" err="1"/>
               <a:t>text</a:t>
             </a:r>
             <a:r>
-              <a:rPr lang="fr-FR" sz="1700" dirty="0" smtClean="0"/>
+              <a:rPr lang="fr-FR" sz="1700" dirty="0"/>
               <a:t>, IDE et quelques outils</a:t>
             </a:r>
             <a:r>
-              <a:rPr lang="fr-FR" sz="1600" dirty="0" smtClean="0"/>
-              <a:t>……………..............p</a:t>
-            </a:r>
-            <a:r>
               <a:rPr lang="fr-FR" sz="1600" dirty="0"/>
-              <a:t>. 9</a:t>
+              <a:t>……………..............p. 9</a:t>
             </a:r>
           </a:p>
           <a:p>
@@ -10160,21 +9620,7 @@
                 <a:ea typeface="+mn-lt"/>
                 <a:cs typeface="+mn-lt"/>
               </a:rPr>
-              <a:t>Diagrammes package et cas d’utilisations « Consultation » </a:t>
-            </a:r>
-            <a:r>
-              <a:rPr lang="fr-FR" sz="1600" dirty="0" smtClean="0">
-                <a:ea typeface="+mn-lt"/>
-                <a:cs typeface="+mn-lt"/>
-              </a:rPr>
-              <a:t>… p</a:t>
-            </a:r>
-            <a:r>
-              <a:rPr lang="fr-FR" sz="1600" dirty="0">
-                <a:ea typeface="+mn-lt"/>
-                <a:cs typeface="+mn-lt"/>
-              </a:rPr>
-              <a:t>. 22</a:t>
+              <a:t>Diagrammes package et cas d’utilisations « Consultation » … p. 22</a:t>
             </a:r>
           </a:p>
           <a:p>
@@ -10236,48 +9682,20 @@
                 <a:ea typeface="+mn-lt"/>
                 <a:cs typeface="+mn-lt"/>
               </a:rPr>
-              <a:t>Paramètres de connexion à la base de données </a:t>
-            </a:r>
-            <a:r>
-              <a:rPr lang="fr-FR" sz="1600" dirty="0" smtClean="0">
-                <a:ea typeface="+mn-lt"/>
-                <a:cs typeface="+mn-lt"/>
-              </a:rPr>
-              <a:t>………………… </a:t>
-            </a:r>
+              <a:t>Paramètres de connexion à la base de données ………………… p. 26</a:t>
+            </a:r>
+          </a:p>
+          <a:p>
+            <a:pPr lvl="2">
+              <a:buFont typeface="Wingdings" panose="05000000000000000000" pitchFamily="2" charset="2"/>
+              <a:buChar char="§"/>
+            </a:pPr>
             <a:r>
               <a:rPr lang="fr-FR" sz="1600" dirty="0">
                 <a:ea typeface="+mn-lt"/>
                 <a:cs typeface="+mn-lt"/>
               </a:rPr>
-              <a:t>p. 26</a:t>
-            </a:r>
-          </a:p>
-          <a:p>
-            <a:pPr lvl="2">
-              <a:buFont typeface="Wingdings" panose="05000000000000000000" pitchFamily="2" charset="2"/>
-              <a:buChar char="§"/>
-            </a:pPr>
-            <a:r>
-              <a:rPr lang="fr-FR" sz="1600" dirty="0">
-                <a:ea typeface="+mn-lt"/>
-                <a:cs typeface="+mn-lt"/>
-              </a:rPr>
-              <a:t>Création de l’objet application </a:t>
-            </a:r>
-            <a:r>
-              <a:rPr lang="fr-FR" sz="1600" dirty="0" smtClean="0">
-                <a:ea typeface="+mn-lt"/>
-                <a:cs typeface="+mn-lt"/>
-              </a:rPr>
-              <a:t>………………………………………… </a:t>
-            </a:r>
-            <a:r>
-              <a:rPr lang="fr-FR" sz="1600" dirty="0">
-                <a:ea typeface="+mn-lt"/>
-                <a:cs typeface="+mn-lt"/>
-              </a:rPr>
-              <a:t>p. 27</a:t>
+              <a:t>Création de l’objet application ………………………………………… p. 27</a:t>
             </a:r>
           </a:p>
           <a:p>
@@ -10316,21 +9734,7 @@
                 <a:ea typeface="+mn-lt"/>
                 <a:cs typeface="+mn-lt"/>
               </a:rPr>
-              <a:t>Cas d’utilisation « List » </a:t>
-            </a:r>
-            <a:r>
-              <a:rPr lang="fr-FR" sz="1600" dirty="0" smtClean="0">
-                <a:ea typeface="+mn-lt"/>
-                <a:cs typeface="+mn-lt"/>
-              </a:rPr>
-              <a:t>…………………………………………………. </a:t>
-            </a:r>
-            <a:r>
-              <a:rPr lang="fr-FR" sz="1600" dirty="0">
-                <a:ea typeface="+mn-lt"/>
-                <a:cs typeface="+mn-lt"/>
-              </a:rPr>
-              <a:t>p. 38</a:t>
+              <a:t>Cas d’utilisation « List » …………………………………………………. p. 38</a:t>
             </a:r>
           </a:p>
           <a:p>
@@ -10369,21 +9773,7 @@
                 <a:ea typeface="+mn-lt"/>
                 <a:cs typeface="+mn-lt"/>
               </a:rPr>
-              <a:t>Lancement application + scheduler </a:t>
-            </a:r>
-            <a:r>
-              <a:rPr lang="fr-FR" sz="1600" dirty="0" smtClean="0">
-                <a:ea typeface="+mn-lt"/>
-                <a:cs typeface="+mn-lt"/>
-              </a:rPr>
-              <a:t>…………………………………. </a:t>
-            </a:r>
-            <a:r>
-              <a:rPr lang="fr-FR" sz="1600" dirty="0">
-                <a:ea typeface="+mn-lt"/>
-                <a:cs typeface="+mn-lt"/>
-              </a:rPr>
-              <a:t>p. 56</a:t>
+              <a:t>Lancement application + scheduler …………………………………. p. 56</a:t>
             </a:r>
           </a:p>
           <a:p>
@@ -10516,13 +9906,6 @@
   <p:clrMapOvr>
     <a:masterClrMapping/>
   </p:clrMapOvr>
-  <p:timing>
-    <p:tnLst>
-      <p:par>
-        <p:cTn id="1" dur="indefinite" restart="never" nodeType="tmRoot"/>
-      </p:par>
-    </p:tnLst>
-  </p:timing>
 </p:sld>
 </file>
 
@@ -10650,6 +10033,7 @@
           <a:prstGeom prst="rect">
             <a:avLst/>
           </a:prstGeom>
+          <a:noFill/>
         </p:spPr>
         <p:style>
           <a:lnRef idx="2">
@@ -10694,6 +10078,7 @@
           <a:prstGeom prst="rect">
             <a:avLst/>
           </a:prstGeom>
+          <a:noFill/>
         </p:spPr>
         <p:style>
           <a:lnRef idx="2">
@@ -10855,13 +10240,6 @@
   <p:clrMapOvr>
     <a:masterClrMapping/>
   </p:clrMapOvr>
-  <p:timing>
-    <p:tnLst>
-      <p:par>
-        <p:cTn id="1" dur="indefinite" restart="never" nodeType="tmRoot"/>
-      </p:par>
-    </p:tnLst>
-  </p:timing>
 </p:sld>
 </file>
 
@@ -10949,13 +10327,6 @@
   <p:clrMapOvr>
     <a:masterClrMapping/>
   </p:clrMapOvr>
-  <p:timing>
-    <p:tnLst>
-      <p:par>
-        <p:cTn id="1" dur="indefinite" restart="never" nodeType="tmRoot"/>
-      </p:par>
-    </p:tnLst>
-  </p:timing>
 </p:sld>
 </file>
 
@@ -11149,13 +10520,6 @@
   <p:clrMapOvr>
     <a:masterClrMapping/>
   </p:clrMapOvr>
-  <p:timing>
-    <p:tnLst>
-      <p:par>
-        <p:cTn id="1" dur="indefinite" restart="never" nodeType="tmRoot"/>
-      </p:par>
-    </p:tnLst>
-  </p:timing>
 </p:sld>
 </file>
 
@@ -11473,13 +10837,6 @@
   <p:clrMapOvr>
     <a:masterClrMapping/>
   </p:clrMapOvr>
-  <p:timing>
-    <p:tnLst>
-      <p:par>
-        <p:cTn id="1" dur="indefinite" restart="never" nodeType="tmRoot"/>
-      </p:par>
-    </p:tnLst>
-  </p:timing>
 </p:sld>
 </file>
 
@@ -11679,13 +11036,6 @@
   <p:clrMapOvr>
     <a:masterClrMapping/>
   </p:clrMapOvr>
-  <p:timing>
-    <p:tnLst>
-      <p:par>
-        <p:cTn id="1" dur="indefinite" restart="never" nodeType="tmRoot"/>
-      </p:par>
-    </p:tnLst>
-  </p:timing>
 </p:sld>
 </file>
 
@@ -12008,13 +11358,6 @@
   <p:clrMapOvr>
     <a:masterClrMapping/>
   </p:clrMapOvr>
-  <p:timing>
-    <p:tnLst>
-      <p:par>
-        <p:cTn id="1" dur="indefinite" restart="never" nodeType="tmRoot"/>
-      </p:par>
-    </p:tnLst>
-  </p:timing>
 </p:sld>
 </file>
 
@@ -12104,13 +11447,6 @@
   <p:clrMapOvr>
     <a:masterClrMapping/>
   </p:clrMapOvr>
-  <p:timing>
-    <p:tnLst>
-      <p:par>
-        <p:cTn id="1" dur="indefinite" restart="never" nodeType="tmRoot"/>
-      </p:par>
-    </p:tnLst>
-  </p:timing>
 </p:sld>
 </file>
 
@@ -12267,13 +11603,6 @@
   <p:clrMapOvr>
     <a:masterClrMapping/>
   </p:clrMapOvr>
-  <p:timing>
-    <p:tnLst>
-      <p:par>
-        <p:cTn id="1" dur="indefinite" restart="never" nodeType="tmRoot"/>
-      </p:par>
-    </p:tnLst>
-  </p:timing>
 </p:sld>
 </file>
 
@@ -12396,13 +11725,6 @@
   <p:clrMapOvr>
     <a:masterClrMapping/>
   </p:clrMapOvr>
-  <p:timing>
-    <p:tnLst>
-      <p:par>
-        <p:cTn id="1" dur="indefinite" restart="never" nodeType="tmRoot"/>
-      </p:par>
-    </p:tnLst>
-  </p:timing>
 </p:sld>
 </file>
 
@@ -12452,10 +11774,9 @@
           <a:lstStyle/>
           <a:p>
             <a:r>
-              <a:rPr lang="fr-FR" dirty="0" smtClean="0"/>
+              <a:rPr lang="fr-FR" dirty="0"/>
               <a:t>Remerciements</a:t>
             </a:r>
-            <a:endParaRPr lang="fr-FR" dirty="0"/>
           </a:p>
         </p:txBody>
       </p:sp>
@@ -12489,30 +11810,13 @@
           <a:p>
             <a:r>
               <a:rPr lang="fr-FR" dirty="0"/>
-              <a:t>Je tiens à remercier l'AFPA, pour </a:t>
-            </a:r>
-            <a:r>
-              <a:rPr lang="fr-FR" dirty="0" smtClean="0"/>
-              <a:t>m'avoir </a:t>
-            </a:r>
+              <a:t>Je tiens à remercier l'AFPA, pour m'avoir donné ma chance en validant ma candidature pour la formation.</a:t>
+            </a:r>
+          </a:p>
+          <a:p>
             <a:r>
               <a:rPr lang="fr-FR" dirty="0"/>
-              <a:t>donné ma chance en validant ma candidature pour la formation</a:t>
-            </a:r>
-            <a:r>
-              <a:rPr lang="fr-FR" dirty="0" smtClean="0"/>
-              <a:t>.</a:t>
-            </a:r>
-            <a:endParaRPr lang="fr-FR" dirty="0"/>
-          </a:p>
-          <a:p>
-            <a:r>
-              <a:rPr lang="fr-FR" dirty="0"/>
-              <a:t>Je remercie également Moussa Camara, mon formateur qui, par la qualité de son enseignement et sa pédagogie, m'a permis d'acquérir des bases solides en m'aidant pendant les cours et en consacrant son temps libre</a:t>
-            </a:r>
-            <a:r>
-              <a:rPr lang="fr-FR" dirty="0" smtClean="0"/>
-              <a:t>.</a:t>
+              <a:t>Je remercie également Moussa Camara, mon formateur qui, par la qualité de son enseignement et sa pédagogie, m'a permis d'acquérir des bases solides en m'aidant pendant les cours et en consacrant son temps libre.</a:t>
             </a:r>
           </a:p>
           <a:p>
@@ -12521,22 +11825,13 @@
               <a:t>Un mot en particulier sur notre professeur d’anglais </a:t>
             </a:r>
             <a:r>
-              <a:rPr lang="fr-FR" sz="2400" dirty="0" err="1" smtClean="0"/>
+              <a:rPr lang="fr-FR" sz="2400" dirty="0" err="1"/>
               <a:t>Susannah</a:t>
             </a:r>
             <a:r>
-              <a:rPr lang="fr-FR" sz="2400" dirty="0" smtClean="0"/>
-              <a:t> </a:t>
-            </a:r>
-            <a:r>
               <a:rPr lang="fr-FR" sz="2400" dirty="0"/>
-              <a:t>pour ses cours intelligents et </a:t>
-            </a:r>
-            <a:r>
-              <a:rPr lang="fr-FR" sz="2400" dirty="0" smtClean="0"/>
-              <a:t>intéressants.</a:t>
-            </a:r>
-            <a:endParaRPr lang="fr-FR" sz="2400" dirty="0"/>
+              <a:t> pour ses cours intelligents et intéressants.</a:t>
+            </a:r>
           </a:p>
           <a:p>
             <a:endParaRPr lang="fr-FR" dirty="0"/>
@@ -12582,13 +11877,6 @@
   <p:clrMapOvr>
     <a:masterClrMapping/>
   </p:clrMapOvr>
-  <p:timing>
-    <p:tnLst>
-      <p:par>
-        <p:cTn id="1" dur="indefinite" restart="never" nodeType="tmRoot"/>
-      </p:par>
-    </p:tnLst>
-  </p:timing>
 </p:sld>
 </file>
 
@@ -12718,13 +12006,6 @@
   <p:clrMapOvr>
     <a:masterClrMapping/>
   </p:clrMapOvr>
-  <p:timing>
-    <p:tnLst>
-      <p:par>
-        <p:cTn id="1" dur="indefinite" restart="never" nodeType="tmRoot"/>
-      </p:par>
-    </p:tnLst>
-  </p:timing>
 </p:sld>
 </file>
 
@@ -12814,13 +12095,6 @@
   <p:clrMapOvr>
     <a:masterClrMapping/>
   </p:clrMapOvr>
-  <p:timing>
-    <p:tnLst>
-      <p:par>
-        <p:cTn id="1" dur="indefinite" restart="never" nodeType="tmRoot"/>
-      </p:par>
-    </p:tnLst>
-  </p:timing>
 </p:sld>
 </file>
 
@@ -12977,13 +12251,6 @@
   <p:clrMapOvr>
     <a:masterClrMapping/>
   </p:clrMapOvr>
-  <p:timing>
-    <p:tnLst>
-      <p:par>
-        <p:cTn id="1" dur="indefinite" restart="never" nodeType="tmRoot"/>
-      </p:par>
-    </p:tnLst>
-  </p:timing>
 </p:sld>
 </file>
 
@@ -13165,13 +12432,6 @@
   <p:clrMapOvr>
     <a:masterClrMapping/>
   </p:clrMapOvr>
-  <p:timing>
-    <p:tnLst>
-      <p:par>
-        <p:cTn id="1" dur="indefinite" restart="never" nodeType="tmRoot"/>
-      </p:par>
-    </p:tnLst>
-  </p:timing>
 </p:sld>
 </file>
 
@@ -13289,13 +12549,6 @@
   <p:clrMapOvr>
     <a:masterClrMapping/>
   </p:clrMapOvr>
-  <p:timing>
-    <p:tnLst>
-      <p:par>
-        <p:cTn id="1" dur="indefinite" restart="never" nodeType="tmRoot"/>
-      </p:par>
-    </p:tnLst>
-  </p:timing>
 </p:sld>
 </file>
 
@@ -13424,13 +12677,6 @@
   <p:clrMapOvr>
     <a:masterClrMapping/>
   </p:clrMapOvr>
-  <p:timing>
-    <p:tnLst>
-      <p:par>
-        <p:cTn id="1" dur="indefinite" restart="never" nodeType="tmRoot"/>
-      </p:par>
-    </p:tnLst>
-  </p:timing>
 </p:sld>
 </file>
 
@@ -13554,13 +12800,6 @@
   <p:clrMapOvr>
     <a:masterClrMapping/>
   </p:clrMapOvr>
-  <p:timing>
-    <p:tnLst>
-      <p:par>
-        <p:cTn id="1" dur="indefinite" restart="never" nodeType="tmRoot"/>
-      </p:par>
-    </p:tnLst>
-  </p:timing>
 </p:sld>
 </file>
 
@@ -13650,13 +12889,6 @@
   <p:clrMapOvr>
     <a:masterClrMapping/>
   </p:clrMapOvr>
-  <p:timing>
-    <p:tnLst>
-      <p:par>
-        <p:cTn id="1" dur="indefinite" restart="never" nodeType="tmRoot"/>
-      </p:par>
-    </p:tnLst>
-  </p:timing>
 </p:sld>
 </file>
 
@@ -13751,13 +12983,6 @@
   <p:clrMapOvr>
     <a:masterClrMapping/>
   </p:clrMapOvr>
-  <p:timing>
-    <p:tnLst>
-      <p:par>
-        <p:cTn id="1" dur="indefinite" restart="never" nodeType="tmRoot"/>
-      </p:par>
-    </p:tnLst>
-  </p:timing>
 </p:sld>
 </file>
 
@@ -13886,13 +13111,6 @@
   <p:clrMapOvr>
     <a:masterClrMapping/>
   </p:clrMapOvr>
-  <p:timing>
-    <p:tnLst>
-      <p:par>
-        <p:cTn id="1" dur="indefinite" restart="never" nodeType="tmRoot"/>
-      </p:par>
-    </p:tnLst>
-  </p:timing>
 </p:sld>
 </file>
 
@@ -13977,72 +13195,39 @@
           <a:lstStyle/>
           <a:p>
             <a:r>
-              <a:rPr lang="fr-FR" sz="2000" b="1" dirty="0" smtClean="0"/>
+              <a:rPr lang="fr-FR" sz="2000" b="1" dirty="0"/>
               <a:t>Période pré</a:t>
             </a:r>
             <a:r>
-              <a:rPr lang="en-US" sz="2000" b="1" dirty="0" smtClean="0"/>
+              <a:rPr lang="en-US" sz="2000" b="1" dirty="0"/>
               <a:t>formation</a:t>
             </a:r>
             <a:r>
-              <a:rPr lang="fr-FR" sz="2000" b="1" dirty="0" smtClean="0"/>
+              <a:rPr lang="fr-FR" sz="2000" b="1" dirty="0"/>
               <a:t>: </a:t>
             </a:r>
             <a:r>
-              <a:rPr lang="fr-FR" dirty="0" smtClean="0"/>
-              <a:t>Ayant </a:t>
-            </a:r>
-            <a:r>
               <a:rPr lang="fr-FR" dirty="0"/>
-              <a:t>déjà les connaissances en informatique </a:t>
-            </a:r>
-            <a:r>
-              <a:rPr lang="fr-FR" dirty="0" smtClean="0"/>
-              <a:t>j’avais décidé de </a:t>
+              <a:t>Ayant déjà les connaissances en informatique j’avais décidé de les approfondir par l'inscription en formation.  Parmi celles que j’ai trouvées, la formation “Concepteur Développeur d’Applications” proposée par l’AFPA m’a semblé être la plus prometteuse, et le centre Paris 12eme était la plus proche de chez moi.</a:t>
+            </a:r>
+          </a:p>
+          <a:p>
+            <a:r>
+              <a:rPr lang="fr-FR" sz="2000" b="1" dirty="0"/>
+              <a:t>Période de recherche de stage</a:t>
+            </a:r>
+            <a:r>
+              <a:rPr lang="en-US" b="1" dirty="0"/>
+              <a:t>: </a:t>
             </a:r>
             <a:r>
               <a:rPr lang="fr-FR" dirty="0"/>
-              <a:t>les approfondir par l'inscription en formation.  Parmi celles que j’ai trouvées, la formation “Concepteur Développeur d’Applications” proposée par l’AFPA m’a semblé être la plus prometteuse, et le centre Paris 12eme était la plus proche de chez moi</a:t>
-            </a:r>
-            <a:r>
-              <a:rPr lang="fr-FR" dirty="0" smtClean="0"/>
-              <a:t>.</a:t>
-            </a:r>
-          </a:p>
-          <a:p>
-            <a:r>
-              <a:rPr lang="fr-FR" sz="2000" b="1" dirty="0" smtClean="0"/>
-              <a:t>Période de recherche de stage</a:t>
-            </a:r>
-            <a:r>
-              <a:rPr lang="en-US" b="1" dirty="0" smtClean="0"/>
-              <a:t>: </a:t>
-            </a:r>
-            <a:r>
-              <a:rPr lang="fr-FR" dirty="0"/>
-              <a:t>Malgré mes recherches, je n’ai pas trouvé d’entreprise d’accueil pour effectuer un stage. J’ai donc dû entreprendre la création d’un projet afin de le présenter le jour de l’examen. </a:t>
-            </a:r>
-            <a:r>
-              <a:rPr lang="fr-FR" dirty="0" smtClean="0"/>
-              <a:t>Sous </a:t>
-            </a:r>
-            <a:r>
-              <a:rPr lang="fr-FR" dirty="0"/>
-              <a:t>les conseils de mon formateur, j’ai décidé de continuer le travail sur mon dernier projet en formation de type réseau sociale. </a:t>
-            </a:r>
-            <a:r>
-              <a:rPr lang="fr-FR" dirty="0" smtClean="0"/>
-              <a:t>Ce </a:t>
-            </a:r>
-            <a:r>
-              <a:rPr lang="fr-FR" dirty="0"/>
-              <a:t>type de projet était tout indiqué pour exposer l’ensemble des capacités que j‘ai acquises pendant la formation.</a:t>
-            </a:r>
-            <a:endParaRPr lang="fr-FR" dirty="0" smtClean="0"/>
+              <a:t>Malgré mes recherches, je n’ai pas trouvé d’entreprise d’accueil pour effectuer un stage. J’ai donc dû entreprendre la création d’un projet afin de le présenter le jour de l’examen. Sous les conseils de mon formateur, j’ai décidé de continuer le travail sur mon dernier projet en formation de type réseau sociale. Ce type de projet était tout indiqué pour exposer l’ensemble des capacités que j‘ai acquises pendant la formation.</a:t>
+            </a:r>
           </a:p>
           <a:p>
             <a:pPr algn="just"/>
-            <a:endParaRPr lang="fr-FR" sz="2000" b="1" dirty="0" smtClean="0"/>
+            <a:endParaRPr lang="fr-FR" sz="2000" b="1" dirty="0"/>
           </a:p>
           <a:p>
             <a:pPr algn="just"/>
@@ -14254,13 +13439,6 @@
   <p:clrMapOvr>
     <a:masterClrMapping/>
   </p:clrMapOvr>
-  <p:timing>
-    <p:tnLst>
-      <p:par>
-        <p:cTn id="1" dur="indefinite" restart="never" nodeType="tmRoot"/>
-      </p:par>
-    </p:tnLst>
-  </p:timing>
 </p:sld>
 </file>
 
@@ -14422,13 +13600,6 @@
   <p:clrMapOvr>
     <a:masterClrMapping/>
   </p:clrMapOvr>
-  <p:timing>
-    <p:tnLst>
-      <p:par>
-        <p:cTn id="1" dur="indefinite" restart="never" nodeType="tmRoot"/>
-      </p:par>
-    </p:tnLst>
-  </p:timing>
 </p:sld>
 </file>
 
@@ -14765,13 +13936,6 @@
   <p:clrMapOvr>
     <a:masterClrMapping/>
   </p:clrMapOvr>
-  <p:timing>
-    <p:tnLst>
-      <p:par>
-        <p:cTn id="1" dur="indefinite" restart="never" nodeType="tmRoot"/>
-      </p:par>
-    </p:tnLst>
-  </p:timing>
 </p:sld>
 </file>
 
@@ -14861,13 +14025,6 @@
   <p:clrMapOvr>
     <a:masterClrMapping/>
   </p:clrMapOvr>
-  <p:timing>
-    <p:tnLst>
-      <p:par>
-        <p:cTn id="1" dur="indefinite" restart="never" nodeType="tmRoot"/>
-      </p:par>
-    </p:tnLst>
-  </p:timing>
 </p:sld>
 </file>
 
@@ -15024,13 +14181,6 @@
   <p:clrMapOvr>
     <a:masterClrMapping/>
   </p:clrMapOvr>
-  <p:timing>
-    <p:tnLst>
-      <p:par>
-        <p:cTn id="1" dur="indefinite" restart="never" nodeType="tmRoot"/>
-      </p:par>
-    </p:tnLst>
-  </p:timing>
 </p:sld>
 </file>
 
@@ -15196,13 +14346,6 @@
   <p:clrMapOvr>
     <a:masterClrMapping/>
   </p:clrMapOvr>
-  <p:timing>
-    <p:tnLst>
-      <p:par>
-        <p:cTn id="1" dur="indefinite" restart="never" nodeType="tmRoot"/>
-      </p:par>
-    </p:tnLst>
-  </p:timing>
 </p:sld>
 </file>
 
@@ -15375,13 +14518,6 @@
   <p:clrMapOvr>
     <a:masterClrMapping/>
   </p:clrMapOvr>
-  <p:timing>
-    <p:tnLst>
-      <p:par>
-        <p:cTn id="1" dur="indefinite" restart="never" nodeType="tmRoot"/>
-      </p:par>
-    </p:tnLst>
-  </p:timing>
 </p:sld>
 </file>
 
@@ -15725,13 +14861,6 @@
   <p:clrMapOvr>
     <a:masterClrMapping/>
   </p:clrMapOvr>
-  <p:timing>
-    <p:tnLst>
-      <p:par>
-        <p:cTn id="1" dur="indefinite" restart="never" nodeType="tmRoot"/>
-      </p:par>
-    </p:tnLst>
-  </p:timing>
 </p:sld>
 </file>
 
@@ -15899,13 +15028,6 @@
   <p:clrMapOvr>
     <a:masterClrMapping/>
   </p:clrMapOvr>
-  <p:timing>
-    <p:tnLst>
-      <p:par>
-        <p:cTn id="1" dur="indefinite" restart="never" nodeType="tmRoot"/>
-      </p:par>
-    </p:tnLst>
-  </p:timing>
 </p:sld>
 </file>
 
@@ -16168,13 +15290,6 @@
   <p:clrMapOvr>
     <a:masterClrMapping/>
   </p:clrMapOvr>
-  <p:timing>
-    <p:tnLst>
-      <p:par>
-        <p:cTn id="1" dur="indefinite" restart="never" nodeType="tmRoot"/>
-      </p:par>
-    </p:tnLst>
-  </p:timing>
 </p:sld>
 </file>
 
@@ -16390,13 +15505,6 @@
   <p:clrMapOvr>
     <a:masterClrMapping/>
   </p:clrMapOvr>
-  <p:timing>
-    <p:tnLst>
-      <p:par>
-        <p:cTn id="1" dur="indefinite" restart="never" nodeType="tmRoot"/>
-      </p:par>
-    </p:tnLst>
-  </p:timing>
 </p:sld>
 </file>
 
@@ -16661,85 +15769,48 @@
           <a:p>
             <a:r>
               <a:rPr lang="fr-FR" sz="2000" b="1" dirty="0"/>
-              <a:t>Java SE </a:t>
-            </a:r>
-            <a:r>
-              <a:rPr lang="fr-FR" sz="2000" b="1" dirty="0" smtClean="0"/>
-              <a:t>11: </a:t>
-            </a:r>
-            <a:r>
-              <a:rPr lang="fr-FR" sz="2000" dirty="0" smtClean="0"/>
+              <a:t>Java SE 11: </a:t>
+            </a:r>
+            <a:r>
+              <a:rPr lang="fr-FR" sz="2000" dirty="0"/>
               <a:t>un</a:t>
             </a:r>
             <a:r>
-              <a:rPr lang="fr-FR" sz="2000" b="1" dirty="0" smtClean="0"/>
+              <a:rPr lang="fr-FR" sz="2000" b="1" dirty="0"/>
               <a:t> </a:t>
             </a:r>
             <a:r>
-              <a:rPr lang="fr-FR" sz="2000" dirty="0" smtClean="0"/>
-              <a:t>langage </a:t>
-            </a:r>
-            <a:r>
               <a:rPr lang="fr-FR" sz="2000" dirty="0"/>
-              <a:t>de programmation orienté </a:t>
-            </a:r>
-            <a:r>
-              <a:rPr lang="fr-FR" sz="2000" dirty="0" smtClean="0"/>
-              <a:t>objet.</a:t>
-            </a:r>
-            <a:endParaRPr lang="fr-FR" sz="2000" b="1" dirty="0" smtClean="0"/>
-          </a:p>
-          <a:p>
-            <a:r>
-              <a:rPr lang="en-US" sz="1800" b="1" dirty="0" smtClean="0"/>
+              <a:t>langage de programmation orienté objet.</a:t>
+            </a:r>
+            <a:endParaRPr lang="fr-FR" sz="2000" b="1" dirty="0"/>
+          </a:p>
+          <a:p>
+            <a:r>
+              <a:rPr lang="en-US" sz="1800" b="1" dirty="0"/>
               <a:t>Typescript 4: </a:t>
             </a:r>
             <a:r>
               <a:rPr lang="fr-FR" sz="1800" dirty="0"/>
-              <a:t>un langage de programmation libre et open source </a:t>
-            </a:r>
-            <a:r>
-              <a:rPr lang="fr-FR" sz="1800" dirty="0" smtClean="0"/>
-              <a:t>qui </a:t>
+              <a:t>un langage de programmation libre et open source qui a pour but d'améliorer et de sécuriser la production de code JavaScript.</a:t>
+            </a:r>
+            <a:endParaRPr lang="en-US" sz="1800" b="1" dirty="0"/>
+          </a:p>
+          <a:p>
+            <a:r>
+              <a:rPr lang="fr-FR" sz="1800" b="1" dirty="0"/>
+              <a:t>HTML5 et CSS3</a:t>
+            </a:r>
+          </a:p>
+          <a:p>
+            <a:r>
+              <a:rPr lang="en-US" sz="1800" b="1" dirty="0"/>
+              <a:t>MySQL 8 - </a:t>
             </a:r>
             <a:r>
               <a:rPr lang="fr-FR" sz="1800" dirty="0"/>
-              <a:t>a pour but d'améliorer et de sécuriser la production de code JavaScript.</a:t>
-            </a:r>
-            <a:endParaRPr lang="en-US" sz="1800" b="1" dirty="0" smtClean="0"/>
-          </a:p>
-          <a:p>
-            <a:r>
-              <a:rPr lang="fr-FR" sz="1800" b="1" dirty="0" smtClean="0"/>
-              <a:t>HTML5</a:t>
-            </a:r>
-            <a:r>
-              <a:rPr lang="fr-FR" sz="1800" b="1" dirty="0"/>
-              <a:t> et </a:t>
-            </a:r>
-            <a:r>
-              <a:rPr lang="fr-FR" sz="1800" b="1" dirty="0" smtClean="0"/>
-              <a:t>CSS3</a:t>
-            </a:r>
-          </a:p>
-          <a:p>
-            <a:r>
-              <a:rPr lang="en-US" sz="1800" b="1" dirty="0" smtClean="0"/>
-              <a:t>MySQL 8 - </a:t>
-            </a:r>
-            <a:r>
-              <a:rPr lang="fr-FR" sz="1800" dirty="0" smtClean="0"/>
-              <a:t>système </a:t>
-            </a:r>
-            <a:r>
-              <a:rPr lang="fr-FR" sz="1800" dirty="0"/>
-              <a:t>de gestion de bases de données relationnelles </a:t>
-            </a:r>
-            <a:r>
-              <a:rPr lang="fr-FR" sz="1800" dirty="0" smtClean="0"/>
-              <a:t>.</a:t>
-            </a:r>
-            <a:endParaRPr lang="fr-FR" sz="1800" dirty="0"/>
+              <a:t>système de gestion de bases de données relationnelles .</a:t>
+            </a:r>
           </a:p>
         </p:txBody>
       </p:sp>
@@ -16782,13 +15853,6 @@
   <p:clrMapOvr>
     <a:masterClrMapping/>
   </p:clrMapOvr>
-  <p:timing>
-    <p:tnLst>
-      <p:par>
-        <p:cTn id="1" dur="indefinite" restart="never" nodeType="tmRoot"/>
-      </p:par>
-    </p:tnLst>
-  </p:timing>
 </p:sld>
 </file>
 
@@ -16838,16 +15902,12 @@
           <a:lstStyle/>
           <a:p>
             <a:r>
-              <a:rPr lang="fr-FR" b="1" dirty="0" err="1" smtClean="0"/>
+              <a:rPr lang="fr-FR" b="1" dirty="0" err="1"/>
               <a:t>Frameworks</a:t>
             </a:r>
             <a:r>
-              <a:rPr lang="fr-FR" b="1" dirty="0" smtClean="0"/>
-              <a:t> </a:t>
-            </a:r>
-            <a:r>
               <a:rPr lang="fr-FR" b="1" dirty="0"/>
-              <a:t>et </a:t>
+              <a:t> et </a:t>
             </a:r>
             <a:r>
               <a:rPr lang="fr-FR" b="1" dirty="0">
@@ -16894,11 +15954,11 @@
           <a:lstStyle/>
           <a:p>
             <a:r>
-              <a:rPr lang="fr-FR" sz="1900" b="1" dirty="0" err="1" smtClean="0"/>
+              <a:rPr lang="fr-FR" sz="1900" b="1" dirty="0" err="1"/>
               <a:t>Springboot</a:t>
             </a:r>
             <a:r>
-              <a:rPr lang="fr-FR" sz="1900" b="1" dirty="0" smtClean="0"/>
+              <a:rPr lang="fr-FR" sz="1900" b="1" dirty="0"/>
               <a:t> 2.5.4</a:t>
             </a:r>
             <a:r>
@@ -16910,26 +15970,18 @@
               <a:t>—</a:t>
             </a:r>
             <a:r>
-              <a:rPr lang="fr-FR" sz="1900" dirty="0" smtClean="0"/>
+              <a:rPr lang="fr-FR" sz="1900" dirty="0"/>
               <a:t> Un </a:t>
             </a:r>
             <a:r>
-              <a:rPr lang="fr-FR" sz="1900" dirty="0" err="1" smtClean="0"/>
+              <a:rPr lang="fr-FR" sz="1900" dirty="0" err="1"/>
               <a:t>framework</a:t>
             </a:r>
             <a:r>
-              <a:rPr lang="fr-FR" sz="1900" dirty="0" smtClean="0"/>
-              <a:t> </a:t>
-            </a:r>
-            <a:r>
               <a:rPr lang="fr-FR" sz="1900" dirty="0"/>
-              <a:t>open source qui prisse en charge la création d’objets et la mise en relation d’objets par l’intermédiaire d’un fichier de </a:t>
-            </a:r>
-            <a:r>
-              <a:rPr lang="fr-FR" sz="1900" dirty="0" smtClean="0"/>
-              <a:t>configuration.</a:t>
-            </a:r>
-            <a:endParaRPr lang="fr-FR" sz="2200" dirty="0" smtClean="0">
+              <a:t> open source qui prisse en charge la création d’objets et la mise en relation d’objets par l’intermédiaire d’un fichier de configuration.</a:t>
+            </a:r>
+            <a:endParaRPr lang="fr-FR" sz="2200" dirty="0">
               <a:solidFill>
                 <a:srgbClr val="4A66AC"/>
               </a:solidFill>
@@ -16939,7 +15991,7 @@
             <a:pPr marL="274320" lvl="1" indent="0">
               <a:buNone/>
             </a:pPr>
-            <a:endParaRPr lang="fr-FR" dirty="0" smtClean="0">
+            <a:endParaRPr lang="fr-FR" dirty="0">
               <a:solidFill>
                 <a:srgbClr val="4A66AC"/>
               </a:solidFill>
@@ -16950,7 +16002,7 @@
               <a:buNone/>
             </a:pPr>
             <a:r>
-              <a:rPr lang="fr-FR" dirty="0" smtClean="0">
+              <a:rPr lang="fr-FR" dirty="0">
                 <a:solidFill>
                   <a:srgbClr val="4A66AC"/>
                 </a:solidFill>
@@ -16958,7 +16010,7 @@
               <a:t>Les </a:t>
             </a:r>
             <a:r>
-              <a:rPr lang="fr-FR" dirty="0" err="1" smtClean="0">
+              <a:rPr lang="fr-FR" dirty="0" err="1">
                 <a:solidFill>
                   <a:srgbClr val="4A66AC"/>
                 </a:solidFill>
@@ -16966,7 +16018,7 @@
               <a:t>libraries</a:t>
             </a:r>
             <a:r>
-              <a:rPr lang="fr-FR" dirty="0" smtClean="0">
+              <a:rPr lang="fr-FR" dirty="0">
                 <a:solidFill>
                   <a:srgbClr val="4A66AC"/>
                 </a:solidFill>
@@ -16974,7 +16026,7 @@
               <a:t> utilisées</a:t>
             </a:r>
             <a:r>
-              <a:rPr lang="fr-FR" sz="2200" dirty="0" smtClean="0">
+              <a:rPr lang="fr-FR" sz="2200" dirty="0">
                 <a:solidFill>
                   <a:srgbClr val="4A66AC"/>
                 </a:solidFill>
@@ -16992,20 +16044,12 @@
               <a:t>MySQL </a:t>
             </a:r>
             <a:r>
-              <a:rPr lang="fr-FR" dirty="0" err="1" smtClean="0"/>
+              <a:rPr lang="fr-FR" dirty="0" err="1"/>
               <a:t>Connector</a:t>
             </a:r>
             <a:r>
               <a:rPr lang="fr-FR" dirty="0"/>
-              <a:t> —</a:t>
-            </a:r>
-            <a:r>
-              <a:rPr lang="fr-FR" dirty="0" smtClean="0"/>
-              <a:t> </a:t>
-            </a:r>
-            <a:r>
-              <a:rPr lang="fr-FR" dirty="0"/>
-              <a:t>Pilote JDBC qui permet la connexion à la base de données MySQL.</a:t>
+              <a:t> — Pilote JDBC qui permet la connexion à la base de données MySQL.</a:t>
             </a:r>
           </a:p>
           <a:p>
@@ -17030,20 +16074,8 @@
               <a:t>Token</a:t>
             </a:r>
             <a:r>
-              <a:rPr lang="fr-FR" dirty="0" smtClean="0"/>
-              <a:t>) </a:t>
-            </a:r>
-            <a:r>
               <a:rPr lang="fr-FR" dirty="0"/>
-              <a:t>—</a:t>
-            </a:r>
-            <a:r>
-              <a:rPr lang="fr-FR" dirty="0" smtClean="0"/>
-              <a:t> </a:t>
-            </a:r>
-            <a:r>
-              <a:rPr lang="fr-FR" dirty="0"/>
-              <a:t>Bibliothèque la plus facile à utiliser et à comprendre pour créer et vérifier des jetons Web JSON (JWT) sur la JVM. </a:t>
+              <a:t>) — Bibliothèque la plus facile à utiliser et à comprendre pour créer et vérifier des jetons Web JSON (JWT) sur la JVM. </a:t>
             </a:r>
           </a:p>
           <a:p>
@@ -17051,7 +16083,7 @@
               <a:buNone/>
             </a:pPr>
             <a:r>
-              <a:rPr lang="fr-FR" sz="2000" b="1" dirty="0" err="1" smtClean="0">
+              <a:rPr lang="fr-FR" sz="2000" b="1" dirty="0" err="1">
                 <a:solidFill>
                   <a:srgbClr val="4A66AC"/>
                 </a:solidFill>
@@ -17059,7 +16091,7 @@
               <a:t>Angular</a:t>
             </a:r>
             <a:r>
-              <a:rPr lang="fr-FR" sz="2000" b="1" dirty="0" smtClean="0">
+              <a:rPr lang="fr-FR" sz="2000" b="1" dirty="0">
                 <a:solidFill>
                   <a:srgbClr val="4A66AC"/>
                 </a:solidFill>
@@ -17092,11 +16124,7 @@
             </a:r>
             <a:r>
               <a:rPr lang="fr-FR" sz="2000" dirty="0"/>
-              <a:t> </a:t>
-            </a:r>
-            <a:r>
-              <a:rPr lang="fr-FR" sz="2000" dirty="0" smtClean="0"/>
-              <a:t>».</a:t>
+              <a:t> ».</a:t>
             </a:r>
           </a:p>
           <a:p>
@@ -17104,19 +16132,19 @@
               <a:buNone/>
             </a:pPr>
             <a:r>
-              <a:rPr lang="en-US" sz="2000" dirty="0" smtClean="0"/>
+              <a:rPr lang="en-US" sz="2000" dirty="0"/>
               <a:t>    Les libraries </a:t>
             </a:r>
             <a:r>
-              <a:rPr lang="en-US" sz="2000" dirty="0" err="1" smtClean="0"/>
+              <a:rPr lang="en-US" sz="2000" dirty="0" err="1"/>
               <a:t>utilis</a:t>
             </a:r>
             <a:r>
-              <a:rPr lang="fr-FR" sz="2000" dirty="0" err="1" smtClean="0"/>
+              <a:rPr lang="fr-FR" sz="2000" dirty="0" err="1"/>
               <a:t>ées</a:t>
             </a:r>
             <a:r>
-              <a:rPr lang="en-US" sz="2000" dirty="0" smtClean="0"/>
+              <a:rPr lang="en-US" sz="2000" dirty="0"/>
               <a:t>:</a:t>
             </a:r>
             <a:endParaRPr lang="fr-FR" sz="2000" dirty="0"/>
@@ -17127,24 +16155,12 @@
               <a:buChar char="o"/>
             </a:pPr>
             <a:r>
-              <a:rPr lang="en-US" sz="1600" dirty="0" smtClean="0"/>
+              <a:rPr lang="en-US" sz="1600" dirty="0"/>
               <a:t>Angular Material </a:t>
             </a:r>
             <a:r>
               <a:rPr lang="fr-FR" sz="1600" dirty="0"/>
-              <a:t>—</a:t>
-            </a:r>
-            <a:r>
-              <a:rPr lang="fr-FR" sz="1600" dirty="0" smtClean="0"/>
-              <a:t> </a:t>
-            </a:r>
-            <a:r>
-              <a:rPr lang="fr-FR" sz="1600" dirty="0"/>
-              <a:t>Bibliothèque de composants </a:t>
-            </a:r>
-            <a:r>
-              <a:rPr lang="fr-FR" sz="1600" dirty="0" smtClean="0"/>
-              <a:t>UI</a:t>
+              <a:t>— Bibliothèque de composants UI</a:t>
             </a:r>
           </a:p>
           <a:p>
@@ -17153,16 +16169,12 @@
               <a:buChar char="o"/>
             </a:pPr>
             <a:r>
-              <a:rPr lang="en-US" sz="1600" dirty="0" smtClean="0"/>
+              <a:rPr lang="en-US" sz="1600" dirty="0"/>
               <a:t>ng-infinite-scroll </a:t>
             </a:r>
             <a:r>
-              <a:rPr lang="fr-FR" sz="1600" dirty="0" smtClean="0"/>
-              <a:t>— Directive </a:t>
-            </a:r>
-            <a:r>
               <a:rPr lang="fr-FR" sz="1600" dirty="0"/>
-              <a:t>"</a:t>
+              <a:t>— Directive "</a:t>
             </a:r>
             <a:r>
               <a:rPr lang="fr-FR" sz="1600" dirty="0" err="1"/>
@@ -17180,7 +16192,6 @@
               <a:rPr lang="fr-FR" sz="1600" dirty="0"/>
               <a:t> </a:t>
             </a:r>
-            <a:endParaRPr lang="fr-FR" sz="1600" dirty="0" smtClean="0"/>
           </a:p>
           <a:p>
             <a:pPr lvl="2">
@@ -17188,28 +16199,20 @@
               <a:buChar char="o"/>
             </a:pPr>
             <a:r>
-              <a:rPr lang="en-US" sz="1600" dirty="0" smtClean="0"/>
+              <a:rPr lang="en-US" sz="1600" dirty="0"/>
               <a:t>angular-</a:t>
             </a:r>
             <a:r>
-              <a:rPr lang="en-US" sz="1600" dirty="0" err="1" smtClean="0"/>
+              <a:rPr lang="en-US" sz="1600" dirty="0" err="1"/>
               <a:t>timesince</a:t>
             </a:r>
             <a:r>
-              <a:rPr lang="en-US" sz="1600" dirty="0" smtClean="0"/>
+              <a:rPr lang="en-US" sz="1600" dirty="0"/>
               <a:t> </a:t>
             </a:r>
             <a:r>
               <a:rPr lang="fr-FR" sz="1600" dirty="0"/>
-              <a:t>— </a:t>
-            </a:r>
-            <a:r>
-              <a:rPr lang="fr-FR" sz="1600" dirty="0" smtClean="0"/>
-              <a:t> une </a:t>
-            </a:r>
-            <a:r>
-              <a:rPr lang="fr-FR" sz="1600" dirty="0"/>
-              <a:t>bibliothèque simple et légère qui rend une date </a:t>
+              <a:t>—  une bibliothèque simple et légère qui rend une date </a:t>
             </a:r>
             <a:r>
               <a:rPr lang="fr-FR" sz="1600" dirty="0" err="1"/>
@@ -17219,7 +16222,7 @@
               <a:rPr lang="fr-FR" sz="1600" dirty="0"/>
               <a:t> lisible par l'homme</a:t>
             </a:r>
-            <a:endParaRPr lang="en-US" sz="1600" dirty="0" smtClean="0"/>
+            <a:endParaRPr lang="en-US" sz="1600" dirty="0"/>
           </a:p>
         </p:txBody>
       </p:sp>
@@ -17262,13 +16265,6 @@
   <p:clrMapOvr>
     <a:masterClrMapping/>
   </p:clrMapOvr>
-  <p:timing>
-    <p:tnLst>
-      <p:par>
-        <p:cTn id="1" dur="indefinite" restart="never" nodeType="tmRoot"/>
-      </p:par>
-    </p:tnLst>
-  </p:timing>
 </p:sld>
 </file>
 
@@ -17367,7 +16363,7 @@
               <a:t> </a:t>
             </a:r>
             <a:r>
-              <a:rPr lang="fr-FR" sz="1900" b="1" dirty="0" smtClean="0">
+              <a:rPr lang="fr-FR" sz="1900" b="1" dirty="0">
                 <a:solidFill>
                   <a:schemeClr val="tx2">
                     <a:lumMod val="60000"/>
@@ -17378,17 +16374,6 @@
               <a:t>2.33.0</a:t>
             </a:r>
             <a:r>
-              <a:rPr lang="fr-FR" sz="1900" dirty="0" smtClean="0">
-                <a:solidFill>
-                  <a:schemeClr val="tx2">
-                    <a:lumMod val="60000"/>
-                    <a:lumOff val="40000"/>
-                  </a:schemeClr>
-                </a:solidFill>
-              </a:rPr>
-              <a:t> </a:t>
-            </a:r>
-            <a:r>
               <a:rPr lang="fr-FR" sz="1900" dirty="0">
                 <a:solidFill>
                   <a:schemeClr val="tx2">
@@ -17397,7 +16382,7 @@
                   </a:schemeClr>
                 </a:solidFill>
               </a:rPr>
-              <a:t>: </a:t>
+              <a:t> : </a:t>
             </a:r>
             <a:r>
               <a:rPr lang="fr-FR" sz="1900" dirty="0"/>
@@ -17406,10 +16391,6 @@
             <a:br>
               <a:rPr lang="fr-FR" sz="1900" dirty="0"/>
             </a:br>
-            <a:r>
-              <a:rPr lang="fr-FR" sz="1900" dirty="0"/>
-              <a:t/>
-            </a:r>
             <a:br>
               <a:rPr lang="fr-FR" sz="1900" dirty="0"/>
             </a:br>
@@ -17469,31 +16450,15 @@
             </a:r>
             <a:r>
               <a:rPr lang="fr-FR" sz="1900" dirty="0"/>
-              <a:t> : L’outil de visualisation graphique de l’historique d’un projet. Il permet de voir </a:t>
-            </a:r>
-            <a:r>
-              <a:rPr lang="fr-FR" sz="1900" dirty="0" smtClean="0"/>
-              <a:t>l’arbre historique de notre </a:t>
-            </a:r>
-            <a:r>
-              <a:rPr lang="fr-FR" sz="1900" dirty="0" err="1" smtClean="0"/>
+              <a:t> : L’outil de visualisation graphique de l’historique d’un projet. Il permet de voir l’arbre historique de notre </a:t>
+            </a:r>
+            <a:r>
+              <a:rPr lang="fr-FR" sz="1900" dirty="0" err="1"/>
               <a:t>depot</a:t>
             </a:r>
             <a:r>
-              <a:rPr lang="fr-FR" sz="1900" dirty="0" smtClean="0"/>
-              <a:t>, </a:t>
-            </a:r>
-            <a:r>
               <a:rPr lang="fr-FR" sz="1900" dirty="0"/>
-              <a:t>les informations d’un commit (Id (SHA-1), auteur, </a:t>
-            </a:r>
-            <a:r>
-              <a:rPr lang="fr-FR" sz="1900" dirty="0" smtClean="0"/>
-              <a:t>le message, la liste de tags), </a:t>
-            </a:r>
-            <a:r>
-              <a:rPr lang="fr-FR" sz="1900" dirty="0"/>
-              <a:t>les fichiers d’un commit, la différence d’un fichier entre deux </a:t>
+              <a:t>, les informations d’un commit (Id (SHA-1), auteur, le message, la liste de tags), les fichiers d’un commit, la différence d’un fichier entre deux </a:t>
             </a:r>
             <a:r>
               <a:rPr lang="fr-FR" sz="1900" dirty="0" err="1"/>
@@ -17559,13 +16524,6 @@
   <p:clrMapOvr>
     <a:masterClrMapping/>
   </p:clrMapOvr>
-  <p:timing>
-    <p:tnLst>
-      <p:par>
-        <p:cTn id="1" dur="indefinite" restart="never" nodeType="tmRoot"/>
-      </p:par>
-    </p:tnLst>
-  </p:timing>
 </p:sld>
 </file>
 
@@ -17608,23 +16566,23 @@
           <a:lstStyle/>
           <a:p>
             <a:r>
-              <a:rPr lang="fr-FR" b="1" dirty="0" smtClean="0"/>
+              <a:rPr lang="fr-FR" b="1" dirty="0"/>
               <a:t>Les </a:t>
             </a:r>
             <a:r>
-              <a:rPr lang="fr-FR" b="1" dirty="0" err="1" smtClean="0"/>
+              <a:rPr lang="fr-FR" b="1" dirty="0" err="1"/>
               <a:t>editeurs</a:t>
             </a:r>
             <a:r>
-              <a:rPr lang="fr-FR" b="1" dirty="0" smtClean="0"/>
+              <a:rPr lang="fr-FR" b="1" dirty="0"/>
               <a:t> de </a:t>
             </a:r>
             <a:r>
-              <a:rPr lang="fr-FR" b="1" dirty="0" err="1" smtClean="0"/>
+              <a:rPr lang="fr-FR" b="1" dirty="0" err="1"/>
               <a:t>text</a:t>
             </a:r>
             <a:r>
-              <a:rPr lang="fr-FR" b="1" dirty="0" smtClean="0"/>
+              <a:rPr lang="fr-FR" b="1" dirty="0"/>
               <a:t>, outils et IDE</a:t>
             </a:r>
             <a:endParaRPr lang="fr-FR" dirty="0"/>
@@ -17659,125 +16617,121 @@
           <a:p>
             <a:pPr algn="just"/>
             <a:r>
-              <a:rPr lang="en-US" sz="2000" b="1" dirty="0" smtClean="0"/>
+              <a:rPr lang="en-US" sz="2000" b="1" dirty="0"/>
               <a:t>Eclipse IDE </a:t>
             </a:r>
             <a:r>
-              <a:rPr lang="fr-FR" sz="2000" dirty="0" smtClean="0"/>
+              <a:rPr lang="fr-FR" sz="2000" dirty="0"/>
               <a:t>— pour </a:t>
             </a:r>
             <a:r>
-              <a:rPr lang="fr-FR" sz="2000" dirty="0" err="1" smtClean="0"/>
+              <a:rPr lang="fr-FR" sz="2000" dirty="0" err="1"/>
               <a:t>gerer</a:t>
             </a:r>
             <a:r>
-              <a:rPr lang="fr-FR" sz="2000" dirty="0" smtClean="0"/>
+              <a:rPr lang="fr-FR" sz="2000" dirty="0"/>
               <a:t> la partie back-end en Java.</a:t>
             </a:r>
           </a:p>
           <a:p>
             <a:pPr algn="just"/>
             <a:r>
-              <a:rPr lang="en-US" sz="2000" b="1" dirty="0" err="1" smtClean="0"/>
+              <a:rPr lang="en-US" sz="2000" b="1" dirty="0" err="1"/>
               <a:t>VSCodium</a:t>
             </a:r>
             <a:r>
-              <a:rPr lang="en-US" sz="2000" b="1" dirty="0" smtClean="0"/>
+              <a:rPr lang="en-US" sz="2000" b="1" dirty="0"/>
               <a:t> </a:t>
             </a:r>
             <a:r>
-              <a:rPr lang="fr-FR" sz="2000" dirty="0" smtClean="0"/>
+              <a:rPr lang="fr-FR" sz="2000" dirty="0"/>
               <a:t>— un </a:t>
             </a:r>
             <a:r>
-              <a:rPr lang="fr-FR" sz="2000" dirty="0" err="1" smtClean="0"/>
+              <a:rPr lang="fr-FR" sz="2000" dirty="0" err="1"/>
               <a:t>editeur</a:t>
             </a:r>
             <a:r>
-              <a:rPr lang="fr-FR" sz="2000" dirty="0" smtClean="0"/>
+              <a:rPr lang="fr-FR" sz="2000" dirty="0"/>
               <a:t> </a:t>
             </a:r>
             <a:r>
-              <a:rPr lang="fr-FR" sz="2000" dirty="0" err="1" smtClean="0"/>
+              <a:rPr lang="fr-FR" sz="2000" dirty="0" err="1"/>
               <a:t>text</a:t>
             </a:r>
             <a:r>
-              <a:rPr lang="fr-FR" sz="2000" dirty="0" smtClean="0"/>
+              <a:rPr lang="fr-FR" sz="2000" dirty="0"/>
               <a:t>, qui permet de </a:t>
             </a:r>
             <a:r>
-              <a:rPr lang="fr-FR" sz="2000" dirty="0" err="1" smtClean="0"/>
+              <a:rPr lang="fr-FR" sz="2000" dirty="0" err="1"/>
               <a:t>gerer</a:t>
             </a:r>
             <a:r>
-              <a:rPr lang="fr-FR" sz="2000" dirty="0" smtClean="0"/>
+              <a:rPr lang="fr-FR" sz="2000" dirty="0"/>
               <a:t> tout types de fichiers, il vient avec le support </a:t>
             </a:r>
             <a:r>
-              <a:rPr lang="fr-FR" sz="2000" dirty="0" err="1" smtClean="0"/>
+              <a:rPr lang="fr-FR" sz="2000" dirty="0" err="1"/>
               <a:t>integré</a:t>
             </a:r>
             <a:r>
-              <a:rPr lang="fr-FR" sz="2000" dirty="0" smtClean="0"/>
+              <a:rPr lang="fr-FR" sz="2000" dirty="0"/>
               <a:t> d</a:t>
             </a:r>
             <a:r>
-              <a:rPr lang="en-US" sz="2000" dirty="0" smtClean="0"/>
+              <a:rPr lang="en-US" sz="2000" dirty="0"/>
               <a:t>’un terminal et </a:t>
             </a:r>
             <a:r>
-              <a:rPr lang="en-US" sz="2000" dirty="0" err="1" smtClean="0"/>
+              <a:rPr lang="en-US" sz="2000" dirty="0" err="1"/>
               <a:t>git</a:t>
             </a:r>
             <a:r>
-              <a:rPr lang="en-US" sz="2000" dirty="0" smtClean="0"/>
+              <a:rPr lang="en-US" sz="2000" dirty="0"/>
               <a:t>. </a:t>
             </a:r>
             <a:r>
-              <a:rPr lang="fr-FR" sz="2000" dirty="0" smtClean="0"/>
+              <a:rPr lang="fr-FR" sz="2000" dirty="0"/>
               <a:t>Je l’avais utilisé pour </a:t>
             </a:r>
             <a:r>
-              <a:rPr lang="fr-FR" sz="2000" dirty="0" err="1" smtClean="0"/>
+              <a:rPr lang="fr-FR" sz="2000" dirty="0" err="1"/>
               <a:t>developpeur</a:t>
             </a:r>
             <a:r>
-              <a:rPr lang="fr-FR" sz="2000" dirty="0" smtClean="0"/>
+              <a:rPr lang="fr-FR" sz="2000" dirty="0"/>
               <a:t> l</a:t>
             </a:r>
             <a:r>
-              <a:rPr lang="en-US" sz="2000" dirty="0" smtClean="0"/>
+              <a:rPr lang="en-US" sz="2000" dirty="0"/>
               <a:t>a </a:t>
             </a:r>
             <a:r>
-              <a:rPr lang="en-US" sz="2000" dirty="0" err="1" smtClean="0"/>
+              <a:rPr lang="en-US" sz="2000" dirty="0" err="1"/>
               <a:t>partie</a:t>
             </a:r>
             <a:r>
-              <a:rPr lang="en-US" sz="2000" dirty="0" smtClean="0"/>
+              <a:rPr lang="en-US" sz="2000" dirty="0"/>
               <a:t> front-end de mon </a:t>
             </a:r>
             <a:r>
-              <a:rPr lang="en-US" sz="2000" dirty="0" err="1" smtClean="0"/>
+              <a:rPr lang="en-US" sz="2000" dirty="0" err="1"/>
               <a:t>projet</a:t>
             </a:r>
             <a:r>
               <a:rPr lang="en-US" sz="2000" dirty="0"/>
-              <a:t> </a:t>
-            </a:r>
-            <a:r>
-              <a:rPr lang="en-US" sz="2000" dirty="0" smtClean="0"/>
-              <a:t>(html/</a:t>
-            </a:r>
-            <a:r>
-              <a:rPr lang="en-US" sz="2000" dirty="0" err="1" smtClean="0"/>
+              <a:t> (html/</a:t>
+            </a:r>
+            <a:r>
+              <a:rPr lang="en-US" sz="2000" dirty="0" err="1"/>
               <a:t>css</a:t>
             </a:r>
             <a:r>
-              <a:rPr lang="en-US" sz="2000" dirty="0" smtClean="0"/>
+              <a:rPr lang="en-US" sz="2000" dirty="0"/>
               <a:t>/typescript).</a:t>
             </a:r>
-            <a:endParaRPr lang="fr-FR" sz="2000" b="1" dirty="0" smtClean="0"/>
+            <a:endParaRPr lang="fr-FR" sz="2000" b="1" dirty="0"/>
           </a:p>
         </p:txBody>
       </p:sp>
@@ -17820,13 +16774,6 @@
   <p:clrMapOvr>
     <a:masterClrMapping/>
   </p:clrMapOvr>
-  <p:timing>
-    <p:tnLst>
-      <p:par>
-        <p:cTn id="1" dur="indefinite" restart="never" nodeType="tmRoot"/>
-      </p:par>
-    </p:tnLst>
-  </p:timing>
 </p:sld>
 </file>
 
@@ -18658,12 +17605,6 @@
 </file>
 
 <file path=customXml/item1.xml><?xml version="1.0" encoding="utf-8"?>
-<p:properties xmlns:p="http://schemas.microsoft.com/office/2006/metadata/properties" xmlns:xsi="http://www.w3.org/2001/XMLSchema-instance" xmlns:pc="http://schemas.microsoft.com/office/infopath/2007/PartnerControls">
-  <documentManagement/>
-</p:properties>
-</file>
-
-<file path=customXml/item2.xml><?xml version="1.0" encoding="utf-8"?>
 <ct:contentTypeSchema xmlns:ct="http://schemas.microsoft.com/office/2006/metadata/contentType" xmlns:ma="http://schemas.microsoft.com/office/2006/metadata/properties/metaAttributes" ct:_="" ma:_="" ma:contentTypeName="Document" ma:contentTypeID="0x010100CA2FD6F1506F564BB79A97F9C245AD34" ma:contentTypeVersion="11" ma:contentTypeDescription="Create a new document." ma:contentTypeScope="" ma:versionID="62e164dc57e6337fb0bd5548eaf0c6d8">
   <xsd:schema xmlns:xsd="http://www.w3.org/2001/XMLSchema" xmlns:xs="http://www.w3.org/2001/XMLSchema" xmlns:p="http://schemas.microsoft.com/office/2006/metadata/properties" xmlns:ns3="386f4720-9db4-4950-8ffd-cd1ef4b846d5" xmlns:ns4="025efd7d-4e1d-49ec-b269-b81537660960" targetNamespace="http://schemas.microsoft.com/office/2006/metadata/properties" ma:root="true" ma:fieldsID="2653329da7d3ee0d0965a72fb4ee83ab" ns3:_="" ns4:_="">
     <xsd:import namespace="386f4720-9db4-4950-8ffd-cd1ef4b846d5"/>
@@ -18872,7 +17813,7 @@
 </ct:contentTypeSchema>
 </file>
 
-<file path=customXml/item3.xml><?xml version="1.0" encoding="utf-8"?>
+<file path=customXml/item2.xml><?xml version="1.0" encoding="utf-8"?>
 <?mso-contentType ?>
 <FormTemplates xmlns="http://schemas.microsoft.com/sharepoint/v3/contenttype/forms">
   <Display>DocumentLibraryForm</Display>
@@ -18881,24 +17822,13 @@
 </FormTemplates>
 </file>
 
-<file path=customXml/itemProps1.xml><?xml version="1.0" encoding="utf-8"?>
-<ds:datastoreItem xmlns:ds="http://schemas.openxmlformats.org/officeDocument/2006/customXml" ds:itemID="{F277AA4F-207B-4045-A452-6C98BA7AB2BD}">
-  <ds:schemaRefs>
-    <ds:schemaRef ds:uri="025efd7d-4e1d-49ec-b269-b81537660960"/>
-    <ds:schemaRef ds:uri="http://schemas.microsoft.com/office/2006/metadata/properties"/>
-    <ds:schemaRef ds:uri="http://www.w3.org/XML/1998/namespace"/>
-    <ds:schemaRef ds:uri="http://purl.org/dc/dcmitype/"/>
-    <ds:schemaRef ds:uri="386f4720-9db4-4950-8ffd-cd1ef4b846d5"/>
-    <ds:schemaRef ds:uri="http://purl.org/dc/elements/1.1/"/>
-    <ds:schemaRef ds:uri="http://schemas.microsoft.com/office/2006/documentManagement/types"/>
-    <ds:schemaRef ds:uri="http://schemas.microsoft.com/office/infopath/2007/PartnerControls"/>
-    <ds:schemaRef ds:uri="http://schemas.openxmlformats.org/package/2006/metadata/core-properties"/>
-    <ds:schemaRef ds:uri="http://purl.org/dc/terms/"/>
-  </ds:schemaRefs>
-</ds:datastoreItem>
+<file path=customXml/item3.xml><?xml version="1.0" encoding="utf-8"?>
+<p:properties xmlns:p="http://schemas.microsoft.com/office/2006/metadata/properties" xmlns:xsi="http://www.w3.org/2001/XMLSchema-instance" xmlns:pc="http://schemas.microsoft.com/office/infopath/2007/PartnerControls">
+  <documentManagement/>
+</p:properties>
 </file>
 
-<file path=customXml/itemProps2.xml><?xml version="1.0" encoding="utf-8"?>
+<file path=customXml/itemProps1.xml><?xml version="1.0" encoding="utf-8"?>
 <ds:datastoreItem xmlns:ds="http://schemas.openxmlformats.org/officeDocument/2006/customXml" ds:itemID="{92BA7C88-2CFC-403E-9565-3952D53463F0}">
   <ds:schemaRefs>
     <ds:schemaRef ds:uri="http://schemas.microsoft.com/office/2006/metadata/contentType"/>
@@ -18917,10 +17847,27 @@
 </ds:datastoreItem>
 </file>
 
-<file path=customXml/itemProps3.xml><?xml version="1.0" encoding="utf-8"?>
+<file path=customXml/itemProps2.xml><?xml version="1.0" encoding="utf-8"?>
 <ds:datastoreItem xmlns:ds="http://schemas.openxmlformats.org/officeDocument/2006/customXml" ds:itemID="{FA2ECFDE-CCCD-4184-981F-FCB1A88E5D9B}">
   <ds:schemaRefs>
     <ds:schemaRef ds:uri="http://schemas.microsoft.com/sharepoint/v3/contenttype/forms"/>
   </ds:schemaRefs>
 </ds:datastoreItem>
+</file>
+
+<file path=customXml/itemProps3.xml><?xml version="1.0" encoding="utf-8"?>
+<ds:datastoreItem xmlns:ds="http://schemas.openxmlformats.org/officeDocument/2006/customXml" ds:itemID="{F277AA4F-207B-4045-A452-6C98BA7AB2BD}">
+  <ds:schemaRefs>
+    <ds:schemaRef ds:uri="025efd7d-4e1d-49ec-b269-b81537660960"/>
+    <ds:schemaRef ds:uri="http://schemas.microsoft.com/office/2006/metadata/properties"/>
+    <ds:schemaRef ds:uri="http://www.w3.org/XML/1998/namespace"/>
+    <ds:schemaRef ds:uri="http://purl.org/dc/dcmitype/"/>
+    <ds:schemaRef ds:uri="386f4720-9db4-4950-8ffd-cd1ef4b846d5"/>
+    <ds:schemaRef ds:uri="http://purl.org/dc/elements/1.1/"/>
+    <ds:schemaRef ds:uri="http://schemas.microsoft.com/office/2006/documentManagement/types"/>
+    <ds:schemaRef ds:uri="http://schemas.microsoft.com/office/infopath/2007/PartnerControls"/>
+    <ds:schemaRef ds:uri="http://schemas.openxmlformats.org/package/2006/metadata/core-properties"/>
+    <ds:schemaRef ds:uri="http://purl.org/dc/terms/"/>
+  </ds:schemaRefs>
+</ds:datastoreItem>
 </file>
</xml_diff>